<commit_message>
Uploaded a new and better presentation
</commit_message>
<xml_diff>
--- a/resources/Code for Good - Presentation.pptx
+++ b/resources/Code for Good - Presentation.pptx
@@ -22891,7 +22891,7 @@
         </p:spPr>
         <p:txBody>
           <a:bodyPr vert="horz" lIns="91440" tIns="45720" rIns="91440" bIns="45720" rtlCol="0">
-            <a:normAutofit fontScale="92500"/>
+            <a:normAutofit fontScale="92500" lnSpcReduction="10000"/>
           </a:bodyPr>
           <a:lstStyle/>
           <a:p>
@@ -22907,7 +22907,7 @@
               <a:buChar char=""/>
             </a:pPr>
             <a:r>
-              <a:rPr lang="en-US" sz="3000" dirty="0">
+              <a:rPr lang="en-US" sz="2600" dirty="0">
                 <a:solidFill>
                   <a:schemeClr val="tx1">
                     <a:lumMod val="75000"/>
@@ -22930,7 +22930,7 @@
               <a:buFont typeface="Wingdings 3" charset="2"/>
               <a:buChar char=""/>
             </a:pPr>
-            <a:endParaRPr lang="en-US" sz="3000" dirty="0">
+            <a:endParaRPr lang="en-US" sz="2600" dirty="0">
               <a:solidFill>
                 <a:schemeClr val="tx1">
                   <a:lumMod val="75000"/>
@@ -22952,7 +22952,7 @@
               <a:buChar char=""/>
             </a:pPr>
             <a:r>
-              <a:rPr lang="en-US" sz="3000" dirty="0">
+              <a:rPr lang="en-US" sz="2600" dirty="0">
                 <a:solidFill>
                   <a:schemeClr val="tx1">
                     <a:lumMod val="75000"/>
@@ -22976,7 +22976,7 @@
               <a:buChar char=""/>
             </a:pPr>
             <a:r>
-              <a:rPr lang="en-US" sz="3000" dirty="0">
+              <a:rPr lang="en-US" sz="2600" dirty="0">
                 <a:solidFill>
                   <a:schemeClr val="tx1">
                     <a:lumMod val="75000"/>
@@ -22997,7 +22997,7 @@
               </a:buClr>
               <a:buSzPct val="80000"/>
             </a:pPr>
-            <a:endParaRPr lang="en-US" sz="3000" dirty="0">
+            <a:endParaRPr lang="en-US" sz="2600" dirty="0">
               <a:solidFill>
                 <a:schemeClr val="tx1">
                   <a:lumMod val="75000"/>
@@ -23019,7 +23019,7 @@
               <a:buChar char=""/>
             </a:pPr>
             <a:r>
-              <a:rPr lang="en-US" sz="3000" dirty="0">
+              <a:rPr lang="en-US" sz="2600" dirty="0">
                 <a:solidFill>
                   <a:schemeClr val="tx1">
                     <a:lumMod val="75000"/>
@@ -23042,7 +23042,7 @@
               <a:buFont typeface="Wingdings 3" charset="2"/>
               <a:buChar char=""/>
             </a:pPr>
-            <a:endParaRPr lang="en-US" sz="3000" dirty="0">
+            <a:endParaRPr lang="en-US" sz="2600" dirty="0">
               <a:solidFill>
                 <a:schemeClr val="tx1">
                   <a:lumMod val="75000"/>
@@ -23064,7 +23064,7 @@
               <a:buChar char=""/>
             </a:pPr>
             <a:r>
-              <a:rPr lang="en-US" sz="3000" dirty="0">
+              <a:rPr lang="en-US" sz="2600" dirty="0">
                 <a:solidFill>
                   <a:schemeClr val="tx1">
                     <a:lumMod val="75000"/>
@@ -23073,6 +23073,51 @@
                 </a:solidFill>
               </a:rPr>
               <a:t>Make solution even more accessible for others e.g. deaf, blind</a:t>
+            </a:r>
+          </a:p>
+          <a:p>
+            <a:pPr marL="285750" indent="-285750">
+              <a:spcBef>
+                <a:spcPts val="1000"/>
+              </a:spcBef>
+              <a:buClr>
+                <a:schemeClr val="accent1"/>
+              </a:buClr>
+              <a:buSzPct val="80000"/>
+              <a:buFont typeface="Wingdings 3" charset="2"/>
+              <a:buChar char=""/>
+            </a:pPr>
+            <a:endParaRPr lang="en-US" sz="2600" dirty="0">
+              <a:solidFill>
+                <a:schemeClr val="tx1">
+                  <a:lumMod val="75000"/>
+                  <a:lumOff val="25000"/>
+                </a:schemeClr>
+              </a:solidFill>
+            </a:endParaRPr>
+          </a:p>
+          <a:p>
+            <a:pPr marL="285750" indent="-285750">
+              <a:spcBef>
+                <a:spcPts val="1000"/>
+              </a:spcBef>
+              <a:buClr>
+                <a:schemeClr val="accent1"/>
+              </a:buClr>
+              <a:buSzPct val="80000"/>
+              <a:buFont typeface="Wingdings 3" charset="2"/>
+              <a:buChar char=""/>
+            </a:pPr>
+            <a:r>
+              <a:rPr lang="en-US" sz="2600" dirty="0">
+                <a:solidFill>
+                  <a:schemeClr val="tx1">
+                    <a:lumMod val="75000"/>
+                    <a:lumOff val="25000"/>
+                  </a:schemeClr>
+                </a:solidFill>
+              </a:rPr>
+              <a:t>Improve gameplay feedback system</a:t>
             </a:r>
           </a:p>
           <a:p>

</xml_diff>

<commit_message>
added new slide into presentation
</commit_message>
<xml_diff>
--- a/resources/Code for Good - Presentation.pptx
+++ b/resources/Code for Good - Presentation.pptx
@@ -13,7 +13,8 @@
     <p:sldId id="261" r:id="rId7"/>
     <p:sldId id="263" r:id="rId8"/>
     <p:sldId id="262" r:id="rId9"/>
-    <p:sldId id="264" r:id="rId10"/>
+    <p:sldId id="266" r:id="rId10"/>
+    <p:sldId id="264" r:id="rId11"/>
   </p:sldIdLst>
   <p:sldSz cx="12192000" cy="6858000"/>
   <p:notesSz cx="6858000" cy="9144000"/>
@@ -2770,6 +2771,927 @@
     <dgm:txFillClrLst meth="repeat">
       <a:schemeClr val="dk1"/>
     </dgm:txFillClrLst>
+    <dgm:txEffectClrLst/>
+  </dgm:styleLbl>
+  <dgm:styleLbl name="dkBgShp">
+    <dgm:fillClrLst meth="repeat">
+      <a:schemeClr val="accent2">
+        <a:shade val="90000"/>
+      </a:schemeClr>
+    </dgm:fillClrLst>
+    <dgm:linClrLst meth="repeat">
+      <a:schemeClr val="dk1"/>
+    </dgm:linClrLst>
+    <dgm:effectClrLst/>
+    <dgm:txLinClrLst/>
+    <dgm:txFillClrLst meth="repeat">
+      <a:schemeClr val="lt1"/>
+    </dgm:txFillClrLst>
+    <dgm:txEffectClrLst/>
+  </dgm:styleLbl>
+  <dgm:styleLbl name="trBgShp">
+    <dgm:fillClrLst meth="repeat">
+      <a:schemeClr val="accent1">
+        <a:tint val="50000"/>
+        <a:alpha val="40000"/>
+      </a:schemeClr>
+    </dgm:fillClrLst>
+    <dgm:linClrLst meth="repeat">
+      <a:schemeClr val="accent2"/>
+    </dgm:linClrLst>
+    <dgm:effectClrLst/>
+    <dgm:txLinClrLst/>
+    <dgm:txFillClrLst meth="repeat">
+      <a:schemeClr val="lt1"/>
+    </dgm:txFillClrLst>
+    <dgm:txEffectClrLst/>
+  </dgm:styleLbl>
+  <dgm:styleLbl name="fgShp">
+    <dgm:fillClrLst meth="repeat">
+      <a:schemeClr val="accent2">
+        <a:tint val="40000"/>
+      </a:schemeClr>
+    </dgm:fillClrLst>
+    <dgm:linClrLst meth="repeat">
+      <a:schemeClr val="lt1"/>
+    </dgm:linClrLst>
+    <dgm:effectClrLst/>
+    <dgm:txLinClrLst/>
+    <dgm:txFillClrLst meth="repeat">
+      <a:schemeClr val="dk1"/>
+    </dgm:txFillClrLst>
+    <dgm:txEffectClrLst/>
+  </dgm:styleLbl>
+  <dgm:styleLbl name="revTx">
+    <dgm:fillClrLst meth="repeat">
+      <a:schemeClr val="lt1">
+        <a:alpha val="0"/>
+      </a:schemeClr>
+    </dgm:fillClrLst>
+    <dgm:linClrLst meth="repeat">
+      <a:schemeClr val="dk1">
+        <a:alpha val="0"/>
+      </a:schemeClr>
+    </dgm:linClrLst>
+    <dgm:effectClrLst/>
+    <dgm:txLinClrLst/>
+    <dgm:txFillClrLst meth="repeat">
+      <a:schemeClr val="tx1"/>
+    </dgm:txFillClrLst>
+    <dgm:txEffectClrLst/>
+  </dgm:styleLbl>
+</dgm:colorsDef>
+</file>
+
+<file path=ppt/diagrams/colors4.xml><?xml version="1.0" encoding="utf-8"?>
+<dgm:colorsDef xmlns:dgm="http://schemas.openxmlformats.org/drawingml/2006/diagram" xmlns:a="http://schemas.openxmlformats.org/drawingml/2006/main" uniqueId="urn:microsoft.com/office/officeart/2018/5/colors/Iconchunking_neutralicon_colorful1">
+  <dgm:title val=""/>
+  <dgm:desc val=""/>
+  <dgm:catLst>
+    <dgm:cat type="colorful" pri="10100"/>
+  </dgm:catLst>
+  <dgm:styleLbl name="node0">
+    <dgm:fillClrLst meth="repeat">
+      <a:schemeClr val="accent1"/>
+    </dgm:fillClrLst>
+    <dgm:linClrLst meth="repeat">
+      <a:schemeClr val="lt1"/>
+    </dgm:linClrLst>
+    <dgm:effectClrLst/>
+    <dgm:txLinClrLst/>
+    <dgm:txFillClrLst/>
+    <dgm:txEffectClrLst/>
+  </dgm:styleLbl>
+  <dgm:styleLbl name="node1">
+    <dgm:fillClrLst meth="repeat">
+      <a:schemeClr val="bg1"/>
+    </dgm:fillClrLst>
+    <dgm:linClrLst meth="repeat">
+      <a:schemeClr val="lt1">
+        <a:alpha val="0"/>
+      </a:schemeClr>
+    </dgm:linClrLst>
+    <dgm:effectClrLst/>
+    <dgm:txLinClrLst/>
+    <dgm:txFillClrLst meth="repeat">
+      <a:schemeClr val="dk1"/>
+    </dgm:txFillClrLst>
+    <dgm:txEffectClrLst/>
+  </dgm:styleLbl>
+  <dgm:styleLbl name="alignNode1">
+    <dgm:fillClrLst meth="repeat">
+      <a:schemeClr val="accent2"/>
+      <a:schemeClr val="accent3"/>
+      <a:schemeClr val="accent4"/>
+      <a:schemeClr val="accent5"/>
+      <a:schemeClr val="accent6"/>
+    </dgm:fillClrLst>
+    <dgm:linClrLst meth="repeat">
+      <a:schemeClr val="accent2"/>
+      <a:schemeClr val="accent3"/>
+      <a:schemeClr val="accent4"/>
+      <a:schemeClr val="accent5"/>
+      <a:schemeClr val="accent6"/>
+    </dgm:linClrLst>
+    <dgm:effectClrLst/>
+    <dgm:txLinClrLst/>
+    <dgm:txFillClrLst/>
+    <dgm:txEffectClrLst/>
+  </dgm:styleLbl>
+  <dgm:styleLbl name="lnNode1">
+    <dgm:fillClrLst meth="repeat">
+      <a:schemeClr val="accent2"/>
+      <a:schemeClr val="accent3"/>
+      <a:schemeClr val="accent4"/>
+      <a:schemeClr val="accent5"/>
+      <a:schemeClr val="accent6"/>
+    </dgm:fillClrLst>
+    <dgm:linClrLst meth="repeat">
+      <a:schemeClr val="lt1"/>
+    </dgm:linClrLst>
+    <dgm:effectClrLst/>
+    <dgm:txLinClrLst/>
+    <dgm:txFillClrLst/>
+    <dgm:txEffectClrLst/>
+  </dgm:styleLbl>
+  <dgm:styleLbl name="vennNode1">
+    <dgm:fillClrLst meth="repeat">
+      <a:schemeClr val="accent2">
+        <a:alpha val="50000"/>
+      </a:schemeClr>
+      <a:schemeClr val="accent3">
+        <a:alpha val="50000"/>
+      </a:schemeClr>
+      <a:schemeClr val="accent4">
+        <a:alpha val="50000"/>
+      </a:schemeClr>
+      <a:schemeClr val="accent5">
+        <a:alpha val="50000"/>
+      </a:schemeClr>
+      <a:schemeClr val="accent6">
+        <a:alpha val="50000"/>
+      </a:schemeClr>
+    </dgm:fillClrLst>
+    <dgm:linClrLst meth="repeat">
+      <a:schemeClr val="lt1"/>
+    </dgm:linClrLst>
+    <dgm:effectClrLst/>
+    <dgm:txLinClrLst/>
+    <dgm:txFillClrLst/>
+    <dgm:txEffectClrLst/>
+  </dgm:styleLbl>
+  <dgm:styleLbl name="node2">
+    <dgm:fillClrLst>
+      <a:schemeClr val="accent2"/>
+    </dgm:fillClrLst>
+    <dgm:linClrLst meth="repeat">
+      <a:schemeClr val="lt1"/>
+    </dgm:linClrLst>
+    <dgm:effectClrLst/>
+    <dgm:txLinClrLst/>
+    <dgm:txFillClrLst/>
+    <dgm:txEffectClrLst/>
+  </dgm:styleLbl>
+  <dgm:styleLbl name="node3">
+    <dgm:fillClrLst>
+      <a:schemeClr val="accent3"/>
+    </dgm:fillClrLst>
+    <dgm:linClrLst meth="repeat">
+      <a:schemeClr val="lt1"/>
+    </dgm:linClrLst>
+    <dgm:effectClrLst/>
+    <dgm:txLinClrLst/>
+    <dgm:txFillClrLst/>
+    <dgm:txEffectClrLst/>
+  </dgm:styleLbl>
+  <dgm:styleLbl name="node4">
+    <dgm:fillClrLst>
+      <a:schemeClr val="accent4"/>
+    </dgm:fillClrLst>
+    <dgm:linClrLst meth="repeat">
+      <a:schemeClr val="lt1"/>
+    </dgm:linClrLst>
+    <dgm:effectClrLst/>
+    <dgm:txLinClrLst/>
+    <dgm:txFillClrLst/>
+    <dgm:txEffectClrLst/>
+  </dgm:styleLbl>
+  <dgm:styleLbl name="fgImgPlace1">
+    <dgm:fillClrLst meth="repeat">
+      <a:schemeClr val="accent2">
+        <a:tint val="50000"/>
+      </a:schemeClr>
+      <a:schemeClr val="accent3">
+        <a:tint val="50000"/>
+      </a:schemeClr>
+      <a:schemeClr val="accent4">
+        <a:tint val="50000"/>
+      </a:schemeClr>
+      <a:schemeClr val="accent5">
+        <a:tint val="50000"/>
+      </a:schemeClr>
+      <a:schemeClr val="accent6">
+        <a:tint val="50000"/>
+      </a:schemeClr>
+    </dgm:fillClrLst>
+    <dgm:linClrLst meth="repeat">
+      <a:schemeClr val="lt1"/>
+    </dgm:linClrLst>
+    <dgm:effectClrLst/>
+    <dgm:txLinClrLst/>
+    <dgm:txFillClrLst meth="repeat">
+      <a:schemeClr val="lt1"/>
+    </dgm:txFillClrLst>
+    <dgm:txEffectClrLst/>
+  </dgm:styleLbl>
+  <dgm:styleLbl name="alignImgPlace1">
+    <dgm:fillClrLst>
+      <a:schemeClr val="accent1">
+        <a:tint val="50000"/>
+      </a:schemeClr>
+      <a:schemeClr val="accent2">
+        <a:tint val="20000"/>
+      </a:schemeClr>
+    </dgm:fillClrLst>
+    <dgm:linClrLst meth="repeat">
+      <a:schemeClr val="lt1"/>
+    </dgm:linClrLst>
+    <dgm:effectClrLst/>
+    <dgm:txLinClrLst/>
+    <dgm:txFillClrLst meth="repeat">
+      <a:schemeClr val="lt1"/>
+    </dgm:txFillClrLst>
+    <dgm:txEffectClrLst/>
+  </dgm:styleLbl>
+  <dgm:styleLbl name="bgImgPlace1">
+    <dgm:fillClrLst>
+      <a:schemeClr val="accent1">
+        <a:tint val="50000"/>
+      </a:schemeClr>
+      <a:schemeClr val="accent2">
+        <a:tint val="20000"/>
+      </a:schemeClr>
+    </dgm:fillClrLst>
+    <dgm:linClrLst meth="repeat">
+      <a:schemeClr val="lt1"/>
+    </dgm:linClrLst>
+    <dgm:effectClrLst/>
+    <dgm:txLinClrLst/>
+    <dgm:txFillClrLst meth="repeat">
+      <a:schemeClr val="lt1"/>
+    </dgm:txFillClrLst>
+    <dgm:txEffectClrLst/>
+  </dgm:styleLbl>
+  <dgm:styleLbl name="sibTrans2D1">
+    <dgm:fillClrLst meth="repeat">
+      <a:schemeClr val="accent2"/>
+      <a:schemeClr val="accent3"/>
+      <a:schemeClr val="accent4"/>
+      <a:schemeClr val="accent5"/>
+      <a:schemeClr val="accent6"/>
+    </dgm:fillClrLst>
+    <dgm:linClrLst meth="cycle">
+      <a:schemeClr val="lt1"/>
+    </dgm:linClrLst>
+    <dgm:effectClrLst/>
+    <dgm:txLinClrLst/>
+    <dgm:txFillClrLst/>
+    <dgm:txEffectClrLst/>
+  </dgm:styleLbl>
+  <dgm:styleLbl name="fgSibTrans2D1">
+    <dgm:fillClrLst meth="repeat">
+      <a:schemeClr val="accent2"/>
+      <a:schemeClr val="accent3"/>
+      <a:schemeClr val="accent4"/>
+      <a:schemeClr val="accent5"/>
+      <a:schemeClr val="accent6"/>
+    </dgm:fillClrLst>
+    <dgm:linClrLst meth="cycle">
+      <a:schemeClr val="lt1"/>
+    </dgm:linClrLst>
+    <dgm:effectClrLst/>
+    <dgm:txLinClrLst/>
+    <dgm:txFillClrLst meth="repeat">
+      <a:schemeClr val="lt1"/>
+    </dgm:txFillClrLst>
+    <dgm:txEffectClrLst/>
+  </dgm:styleLbl>
+  <dgm:styleLbl name="bgSibTrans2D1">
+    <dgm:fillClrLst meth="repeat">
+      <a:schemeClr val="accent2"/>
+      <a:schemeClr val="accent3"/>
+      <a:schemeClr val="accent4"/>
+      <a:schemeClr val="accent5"/>
+      <a:schemeClr val="accent6"/>
+    </dgm:fillClrLst>
+    <dgm:linClrLst meth="cycle">
+      <a:schemeClr val="lt1"/>
+    </dgm:linClrLst>
+    <dgm:effectClrLst/>
+    <dgm:txLinClrLst/>
+    <dgm:txFillClrLst meth="repeat">
+      <a:schemeClr val="lt1"/>
+    </dgm:txFillClrLst>
+    <dgm:txEffectClrLst/>
+  </dgm:styleLbl>
+  <dgm:styleLbl name="sibTrans1D1">
+    <dgm:fillClrLst meth="repeat">
+      <a:schemeClr val="accent2"/>
+      <a:schemeClr val="accent3"/>
+      <a:schemeClr val="accent4"/>
+      <a:schemeClr val="accent5"/>
+      <a:schemeClr val="accent6"/>
+    </dgm:fillClrLst>
+    <dgm:linClrLst meth="repeat">
+      <a:schemeClr val="accent2"/>
+      <a:schemeClr val="accent3"/>
+      <a:schemeClr val="accent4"/>
+      <a:schemeClr val="accent5"/>
+      <a:schemeClr val="accent6"/>
+    </dgm:linClrLst>
+    <dgm:effectClrLst/>
+    <dgm:txLinClrLst/>
+    <dgm:txFillClrLst meth="repeat">
+      <a:schemeClr val="tx1"/>
+    </dgm:txFillClrLst>
+    <dgm:txEffectClrLst/>
+  </dgm:styleLbl>
+  <dgm:styleLbl name="callout">
+    <dgm:fillClrLst meth="repeat">
+      <a:schemeClr val="accent2"/>
+    </dgm:fillClrLst>
+    <dgm:linClrLst meth="repeat">
+      <a:schemeClr val="accent2">
+        <a:tint val="50000"/>
+      </a:schemeClr>
+    </dgm:linClrLst>
+    <dgm:effectClrLst/>
+    <dgm:txLinClrLst/>
+    <dgm:txFillClrLst meth="repeat">
+      <a:schemeClr val="tx1"/>
+    </dgm:txFillClrLst>
+    <dgm:txEffectClrLst/>
+  </dgm:styleLbl>
+  <dgm:styleLbl name="asst0">
+    <dgm:fillClrLst meth="repeat">
+      <a:schemeClr val="accent1"/>
+    </dgm:fillClrLst>
+    <dgm:linClrLst meth="repeat">
+      <a:schemeClr val="lt1"/>
+    </dgm:linClrLst>
+    <dgm:effectClrLst/>
+    <dgm:txLinClrLst/>
+    <dgm:txFillClrLst/>
+    <dgm:txEffectClrLst/>
+  </dgm:styleLbl>
+  <dgm:styleLbl name="asst1">
+    <dgm:fillClrLst meth="repeat">
+      <a:schemeClr val="accent2"/>
+    </dgm:fillClrLst>
+    <dgm:linClrLst meth="repeat">
+      <a:schemeClr val="lt1"/>
+    </dgm:linClrLst>
+    <dgm:effectClrLst/>
+    <dgm:txLinClrLst/>
+    <dgm:txFillClrLst/>
+    <dgm:txEffectClrLst/>
+  </dgm:styleLbl>
+  <dgm:styleLbl name="asst2">
+    <dgm:fillClrLst>
+      <a:schemeClr val="accent3"/>
+    </dgm:fillClrLst>
+    <dgm:linClrLst meth="repeat">
+      <a:schemeClr val="lt1"/>
+    </dgm:linClrLst>
+    <dgm:effectClrLst/>
+    <dgm:txLinClrLst/>
+    <dgm:txFillClrLst/>
+    <dgm:txEffectClrLst/>
+  </dgm:styleLbl>
+  <dgm:styleLbl name="asst3">
+    <dgm:fillClrLst>
+      <a:schemeClr val="accent4"/>
+    </dgm:fillClrLst>
+    <dgm:linClrLst meth="repeat">
+      <a:schemeClr val="lt1"/>
+    </dgm:linClrLst>
+    <dgm:effectClrLst/>
+    <dgm:txLinClrLst/>
+    <dgm:txFillClrLst/>
+    <dgm:txEffectClrLst/>
+  </dgm:styleLbl>
+  <dgm:styleLbl name="asst4">
+    <dgm:fillClrLst>
+      <a:schemeClr val="accent5"/>
+    </dgm:fillClrLst>
+    <dgm:linClrLst meth="repeat">
+      <a:schemeClr val="lt1"/>
+    </dgm:linClrLst>
+    <dgm:effectClrLst/>
+    <dgm:txLinClrLst/>
+    <dgm:txFillClrLst/>
+    <dgm:txEffectClrLst/>
+  </dgm:styleLbl>
+  <dgm:styleLbl name="parChTrans2D1">
+    <dgm:fillClrLst meth="repeat">
+      <a:schemeClr val="accent2"/>
+    </dgm:fillClrLst>
+    <dgm:linClrLst meth="repeat">
+      <a:schemeClr val="lt1"/>
+    </dgm:linClrLst>
+    <dgm:effectClrLst/>
+    <dgm:txLinClrLst/>
+    <dgm:txFillClrLst meth="repeat">
+      <a:schemeClr val="lt1"/>
+    </dgm:txFillClrLst>
+    <dgm:txEffectClrLst/>
+  </dgm:styleLbl>
+  <dgm:styleLbl name="parChTrans2D2">
+    <dgm:fillClrLst meth="repeat">
+      <a:schemeClr val="accent3"/>
+    </dgm:fillClrLst>
+    <dgm:linClrLst meth="repeat">
+      <a:schemeClr val="lt1"/>
+    </dgm:linClrLst>
+    <dgm:effectClrLst/>
+    <dgm:txLinClrLst/>
+    <dgm:txFillClrLst/>
+    <dgm:txEffectClrLst/>
+  </dgm:styleLbl>
+  <dgm:styleLbl name="parChTrans2D3">
+    <dgm:fillClrLst meth="repeat">
+      <a:schemeClr val="accent4"/>
+    </dgm:fillClrLst>
+    <dgm:linClrLst meth="repeat">
+      <a:schemeClr val="lt1"/>
+    </dgm:linClrLst>
+    <dgm:effectClrLst/>
+    <dgm:txLinClrLst/>
+    <dgm:txFillClrLst/>
+    <dgm:txEffectClrLst/>
+  </dgm:styleLbl>
+  <dgm:styleLbl name="parChTrans2D4">
+    <dgm:fillClrLst meth="repeat">
+      <a:schemeClr val="accent5"/>
+    </dgm:fillClrLst>
+    <dgm:linClrLst meth="repeat">
+      <a:schemeClr val="lt1"/>
+    </dgm:linClrLst>
+    <dgm:effectClrLst/>
+    <dgm:txLinClrLst/>
+    <dgm:txFillClrLst meth="repeat">
+      <a:schemeClr val="lt1"/>
+    </dgm:txFillClrLst>
+    <dgm:txEffectClrLst/>
+  </dgm:styleLbl>
+  <dgm:styleLbl name="parChTrans1D1">
+    <dgm:fillClrLst meth="repeat">
+      <a:schemeClr val="accent2"/>
+    </dgm:fillClrLst>
+    <dgm:linClrLst meth="repeat">
+      <a:schemeClr val="accent1"/>
+    </dgm:linClrLst>
+    <dgm:effectClrLst/>
+    <dgm:txLinClrLst/>
+    <dgm:txFillClrLst meth="repeat">
+      <a:schemeClr val="tx1"/>
+    </dgm:txFillClrLst>
+    <dgm:txEffectClrLst/>
+  </dgm:styleLbl>
+  <dgm:styleLbl name="parChTrans1D2">
+    <dgm:fillClrLst meth="repeat">
+      <a:schemeClr val="accent3">
+        <a:tint val="90000"/>
+      </a:schemeClr>
+    </dgm:fillClrLst>
+    <dgm:linClrLst meth="repeat">
+      <a:schemeClr val="accent2"/>
+    </dgm:linClrLst>
+    <dgm:effectClrLst/>
+    <dgm:txLinClrLst/>
+    <dgm:txFillClrLst meth="repeat">
+      <a:schemeClr val="tx1"/>
+    </dgm:txFillClrLst>
+    <dgm:txEffectClrLst/>
+  </dgm:styleLbl>
+  <dgm:styleLbl name="parChTrans1D3">
+    <dgm:fillClrLst meth="repeat">
+      <a:schemeClr val="accent4">
+        <a:tint val="70000"/>
+      </a:schemeClr>
+    </dgm:fillClrLst>
+    <dgm:linClrLst meth="repeat">
+      <a:schemeClr val="accent3"/>
+    </dgm:linClrLst>
+    <dgm:effectClrLst/>
+    <dgm:txLinClrLst/>
+    <dgm:txFillClrLst meth="repeat">
+      <a:schemeClr val="tx1"/>
+    </dgm:txFillClrLst>
+    <dgm:txEffectClrLst/>
+  </dgm:styleLbl>
+  <dgm:styleLbl name="parChTrans1D4">
+    <dgm:fillClrLst meth="repeat">
+      <a:schemeClr val="accent5">
+        <a:tint val="50000"/>
+      </a:schemeClr>
+    </dgm:fillClrLst>
+    <dgm:linClrLst meth="repeat">
+      <a:schemeClr val="accent4"/>
+    </dgm:linClrLst>
+    <dgm:effectClrLst/>
+    <dgm:txLinClrLst/>
+    <dgm:txFillClrLst meth="repeat">
+      <a:schemeClr val="tx1"/>
+    </dgm:txFillClrLst>
+    <dgm:txEffectClrLst/>
+  </dgm:styleLbl>
+  <dgm:styleLbl name="fgAcc1">
+    <dgm:fillClrLst meth="repeat">
+      <a:schemeClr val="lt1">
+        <a:alpha val="90000"/>
+      </a:schemeClr>
+    </dgm:fillClrLst>
+    <dgm:linClrLst meth="repeat">
+      <a:schemeClr val="accent2"/>
+      <a:schemeClr val="accent3"/>
+      <a:schemeClr val="accent4"/>
+      <a:schemeClr val="accent5"/>
+      <a:schemeClr val="accent6"/>
+    </dgm:linClrLst>
+    <dgm:effectClrLst/>
+    <dgm:txLinClrLst/>
+    <dgm:txFillClrLst meth="repeat">
+      <a:schemeClr val="dk1"/>
+    </dgm:txFillClrLst>
+    <dgm:txEffectClrLst/>
+  </dgm:styleLbl>
+  <dgm:styleLbl name="conFgAcc1">
+    <dgm:fillClrLst meth="repeat">
+      <a:schemeClr val="lt1">
+        <a:alpha val="90000"/>
+      </a:schemeClr>
+    </dgm:fillClrLst>
+    <dgm:linClrLst meth="repeat">
+      <a:schemeClr val="accent2"/>
+      <a:schemeClr val="accent3"/>
+      <a:schemeClr val="accent4"/>
+      <a:schemeClr val="accent5"/>
+      <a:schemeClr val="accent6"/>
+    </dgm:linClrLst>
+    <dgm:effectClrLst/>
+    <dgm:txLinClrLst/>
+    <dgm:txFillClrLst meth="repeat">
+      <a:schemeClr val="dk1"/>
+    </dgm:txFillClrLst>
+    <dgm:txEffectClrLst/>
+  </dgm:styleLbl>
+  <dgm:styleLbl name="alignAcc1">
+    <dgm:fillClrLst meth="repeat">
+      <a:schemeClr val="lt1">
+        <a:alpha val="90000"/>
+      </a:schemeClr>
+    </dgm:fillClrLst>
+    <dgm:linClrLst meth="repeat">
+      <a:schemeClr val="accent2"/>
+      <a:schemeClr val="accent3"/>
+      <a:schemeClr val="accent4"/>
+      <a:schemeClr val="accent5"/>
+      <a:schemeClr val="accent6"/>
+    </dgm:linClrLst>
+    <dgm:effectClrLst/>
+    <dgm:txLinClrLst/>
+    <dgm:txFillClrLst meth="repeat">
+      <a:schemeClr val="dk1"/>
+    </dgm:txFillClrLst>
+    <dgm:txEffectClrLst/>
+  </dgm:styleLbl>
+  <dgm:styleLbl name="trAlignAcc1">
+    <dgm:fillClrLst meth="repeat">
+      <a:schemeClr val="lt1">
+        <a:alpha val="40000"/>
+      </a:schemeClr>
+    </dgm:fillClrLst>
+    <dgm:linClrLst meth="repeat">
+      <a:schemeClr val="accent1"/>
+    </dgm:linClrLst>
+    <dgm:effectClrLst/>
+    <dgm:txLinClrLst/>
+    <dgm:txFillClrLst meth="repeat">
+      <a:schemeClr val="dk1"/>
+    </dgm:txFillClrLst>
+    <dgm:txEffectClrLst/>
+  </dgm:styleLbl>
+  <dgm:styleLbl name="bgAcc1">
+    <dgm:fillClrLst meth="repeat">
+      <a:schemeClr val="lt1">
+        <a:alpha val="90000"/>
+      </a:schemeClr>
+    </dgm:fillClrLst>
+    <dgm:linClrLst meth="repeat">
+      <a:schemeClr val="accent2"/>
+      <a:schemeClr val="accent3"/>
+      <a:schemeClr val="accent4"/>
+      <a:schemeClr val="accent5"/>
+      <a:schemeClr val="accent6"/>
+    </dgm:linClrLst>
+    <dgm:effectClrLst/>
+    <dgm:txLinClrLst/>
+    <dgm:txFillClrLst meth="repeat">
+      <a:schemeClr val="dk1"/>
+    </dgm:txFillClrLst>
+    <dgm:txEffectClrLst/>
+  </dgm:styleLbl>
+  <dgm:styleLbl name="solidFgAcc1">
+    <dgm:fillClrLst meth="repeat">
+      <a:schemeClr val="lt1"/>
+    </dgm:fillClrLst>
+    <dgm:linClrLst meth="repeat">
+      <a:schemeClr val="accent2"/>
+      <a:schemeClr val="accent3"/>
+      <a:schemeClr val="accent4"/>
+      <a:schemeClr val="accent5"/>
+      <a:schemeClr val="accent6"/>
+    </dgm:linClrLst>
+    <dgm:effectClrLst/>
+    <dgm:txLinClrLst/>
+    <dgm:txFillClrLst meth="repeat">
+      <a:schemeClr val="dk1"/>
+    </dgm:txFillClrLst>
+    <dgm:txEffectClrLst/>
+  </dgm:styleLbl>
+  <dgm:styleLbl name="solidAlignAcc1">
+    <dgm:fillClrLst meth="repeat">
+      <a:schemeClr val="lt1"/>
+    </dgm:fillClrLst>
+    <dgm:linClrLst meth="repeat">
+      <a:schemeClr val="accent2"/>
+      <a:schemeClr val="accent3"/>
+      <a:schemeClr val="accent4"/>
+      <a:schemeClr val="accent5"/>
+      <a:schemeClr val="accent6"/>
+    </dgm:linClrLst>
+    <dgm:effectClrLst/>
+    <dgm:txLinClrLst/>
+    <dgm:txFillClrLst meth="repeat">
+      <a:schemeClr val="dk1"/>
+    </dgm:txFillClrLst>
+    <dgm:txEffectClrLst/>
+  </dgm:styleLbl>
+  <dgm:styleLbl name="solidBgAcc1">
+    <dgm:fillClrLst meth="repeat">
+      <a:schemeClr val="lt1"/>
+    </dgm:fillClrLst>
+    <dgm:linClrLst meth="repeat">
+      <a:schemeClr val="accent2"/>
+      <a:schemeClr val="accent3"/>
+      <a:schemeClr val="accent4"/>
+      <a:schemeClr val="accent5"/>
+      <a:schemeClr val="accent6"/>
+    </dgm:linClrLst>
+    <dgm:effectClrLst/>
+    <dgm:txLinClrLst/>
+    <dgm:txFillClrLst meth="repeat">
+      <a:schemeClr val="dk1"/>
+    </dgm:txFillClrLst>
+    <dgm:txEffectClrLst/>
+  </dgm:styleLbl>
+  <dgm:styleLbl name="fgAccFollowNode1">
+    <dgm:fillClrLst meth="repeat">
+      <a:schemeClr val="accent2">
+        <a:tint val="40000"/>
+        <a:alpha val="90000"/>
+      </a:schemeClr>
+      <a:schemeClr val="accent3">
+        <a:tint val="40000"/>
+        <a:alpha val="90000"/>
+      </a:schemeClr>
+      <a:schemeClr val="accent4">
+        <a:tint val="40000"/>
+        <a:alpha val="90000"/>
+      </a:schemeClr>
+      <a:schemeClr val="accent5">
+        <a:tint val="40000"/>
+        <a:alpha val="90000"/>
+      </a:schemeClr>
+      <a:schemeClr val="accent6">
+        <a:tint val="40000"/>
+        <a:alpha val="90000"/>
+      </a:schemeClr>
+    </dgm:fillClrLst>
+    <dgm:linClrLst meth="repeat">
+      <a:schemeClr val="accent2">
+        <a:tint val="40000"/>
+        <a:alpha val="90000"/>
+      </a:schemeClr>
+      <a:schemeClr val="accent3">
+        <a:tint val="40000"/>
+        <a:alpha val="90000"/>
+      </a:schemeClr>
+      <a:schemeClr val="accent4">
+        <a:tint val="40000"/>
+        <a:alpha val="90000"/>
+      </a:schemeClr>
+      <a:schemeClr val="accent5">
+        <a:tint val="40000"/>
+        <a:alpha val="90000"/>
+      </a:schemeClr>
+      <a:schemeClr val="accent6">
+        <a:tint val="40000"/>
+        <a:alpha val="90000"/>
+      </a:schemeClr>
+    </dgm:linClrLst>
+    <dgm:effectClrLst/>
+    <dgm:txLinClrLst/>
+    <dgm:txFillClrLst meth="repeat">
+      <a:schemeClr val="dk1"/>
+    </dgm:txFillClrLst>
+    <dgm:txEffectClrLst/>
+  </dgm:styleLbl>
+  <dgm:styleLbl name="alignAccFollowNode1">
+    <dgm:fillClrLst meth="repeat">
+      <a:schemeClr val="accent2">
+        <a:tint val="40000"/>
+        <a:alpha val="90000"/>
+      </a:schemeClr>
+      <a:schemeClr val="accent3">
+        <a:tint val="40000"/>
+        <a:alpha val="90000"/>
+      </a:schemeClr>
+      <a:schemeClr val="accent4">
+        <a:tint val="40000"/>
+        <a:alpha val="90000"/>
+      </a:schemeClr>
+      <a:schemeClr val="accent5">
+        <a:tint val="40000"/>
+        <a:alpha val="90000"/>
+      </a:schemeClr>
+      <a:schemeClr val="accent6">
+        <a:tint val="40000"/>
+        <a:alpha val="90000"/>
+      </a:schemeClr>
+    </dgm:fillClrLst>
+    <dgm:linClrLst meth="repeat">
+      <a:schemeClr val="accent2">
+        <a:tint val="40000"/>
+        <a:alpha val="90000"/>
+      </a:schemeClr>
+      <a:schemeClr val="accent3">
+        <a:tint val="40000"/>
+        <a:alpha val="90000"/>
+      </a:schemeClr>
+      <a:schemeClr val="accent4">
+        <a:tint val="40000"/>
+        <a:alpha val="90000"/>
+      </a:schemeClr>
+      <a:schemeClr val="accent5">
+        <a:tint val="40000"/>
+        <a:alpha val="90000"/>
+      </a:schemeClr>
+      <a:schemeClr val="accent6">
+        <a:tint val="40000"/>
+        <a:alpha val="90000"/>
+      </a:schemeClr>
+    </dgm:linClrLst>
+    <dgm:effectClrLst/>
+    <dgm:txLinClrLst/>
+    <dgm:txFillClrLst meth="repeat">
+      <a:schemeClr val="dk1"/>
+    </dgm:txFillClrLst>
+    <dgm:txEffectClrLst/>
+  </dgm:styleLbl>
+  <dgm:styleLbl name="bgAccFollowNode1">
+    <dgm:fillClrLst meth="repeat">
+      <a:schemeClr val="accent2">
+        <a:tint val="40000"/>
+        <a:alpha val="90000"/>
+      </a:schemeClr>
+      <a:schemeClr val="accent3">
+        <a:tint val="40000"/>
+        <a:alpha val="90000"/>
+      </a:schemeClr>
+      <a:schemeClr val="accent4">
+        <a:tint val="40000"/>
+        <a:alpha val="90000"/>
+      </a:schemeClr>
+      <a:schemeClr val="accent5">
+        <a:tint val="40000"/>
+        <a:alpha val="90000"/>
+      </a:schemeClr>
+      <a:schemeClr val="accent6">
+        <a:tint val="40000"/>
+        <a:alpha val="90000"/>
+      </a:schemeClr>
+    </dgm:fillClrLst>
+    <dgm:linClrLst meth="repeat">
+      <a:schemeClr val="accent2">
+        <a:tint val="40000"/>
+        <a:alpha val="90000"/>
+      </a:schemeClr>
+      <a:schemeClr val="accent3">
+        <a:tint val="40000"/>
+        <a:alpha val="90000"/>
+      </a:schemeClr>
+      <a:schemeClr val="accent4">
+        <a:tint val="40000"/>
+        <a:alpha val="90000"/>
+      </a:schemeClr>
+      <a:schemeClr val="accent5">
+        <a:tint val="40000"/>
+        <a:alpha val="90000"/>
+      </a:schemeClr>
+      <a:schemeClr val="accent6">
+        <a:tint val="40000"/>
+        <a:alpha val="90000"/>
+      </a:schemeClr>
+    </dgm:linClrLst>
+    <dgm:effectClrLst/>
+    <dgm:txLinClrLst/>
+    <dgm:txFillClrLst meth="repeat">
+      <a:schemeClr val="dk1"/>
+    </dgm:txFillClrLst>
+    <dgm:txEffectClrLst/>
+  </dgm:styleLbl>
+  <dgm:styleLbl name="fgAcc0">
+    <dgm:fillClrLst meth="repeat">
+      <a:schemeClr val="lt1">
+        <a:alpha val="90000"/>
+      </a:schemeClr>
+    </dgm:fillClrLst>
+    <dgm:linClrLst>
+      <a:schemeClr val="accent1"/>
+    </dgm:linClrLst>
+    <dgm:effectClrLst/>
+    <dgm:txLinClrLst/>
+    <dgm:txFillClrLst meth="repeat">
+      <a:schemeClr val="dk1"/>
+    </dgm:txFillClrLst>
+    <dgm:txEffectClrLst/>
+  </dgm:styleLbl>
+  <dgm:styleLbl name="fgAcc2">
+    <dgm:fillClrLst meth="repeat">
+      <a:schemeClr val="lt1">
+        <a:alpha val="90000"/>
+      </a:schemeClr>
+    </dgm:fillClrLst>
+    <dgm:linClrLst>
+      <a:schemeClr val="accent2"/>
+    </dgm:linClrLst>
+    <dgm:effectClrLst/>
+    <dgm:txLinClrLst/>
+    <dgm:txFillClrLst meth="repeat">
+      <a:schemeClr val="dk1"/>
+    </dgm:txFillClrLst>
+    <dgm:txEffectClrLst/>
+  </dgm:styleLbl>
+  <dgm:styleLbl name="fgAcc3">
+    <dgm:fillClrLst meth="repeat">
+      <a:schemeClr val="lt1">
+        <a:alpha val="90000"/>
+      </a:schemeClr>
+    </dgm:fillClrLst>
+    <dgm:linClrLst>
+      <a:schemeClr val="accent3"/>
+    </dgm:linClrLst>
+    <dgm:effectClrLst/>
+    <dgm:txLinClrLst/>
+    <dgm:txFillClrLst meth="repeat">
+      <a:schemeClr val="dk1"/>
+    </dgm:txFillClrLst>
+    <dgm:txEffectClrLst/>
+  </dgm:styleLbl>
+  <dgm:styleLbl name="fgAcc4">
+    <dgm:fillClrLst meth="repeat">
+      <a:schemeClr val="lt1">
+        <a:alpha val="90000"/>
+      </a:schemeClr>
+    </dgm:fillClrLst>
+    <dgm:linClrLst>
+      <a:schemeClr val="accent4"/>
+    </dgm:linClrLst>
+    <dgm:effectClrLst/>
+    <dgm:txLinClrLst/>
+    <dgm:txFillClrLst meth="repeat">
+      <a:schemeClr val="dk1"/>
+    </dgm:txFillClrLst>
+    <dgm:txEffectClrLst/>
+  </dgm:styleLbl>
+  <dgm:styleLbl name="bgShp">
+    <dgm:fillClrLst meth="repeat">
+      <a:schemeClr val="accent2"/>
+      <a:schemeClr val="accent3"/>
+      <a:schemeClr val="accent4"/>
+      <a:schemeClr val="accent5"/>
+      <a:schemeClr val="accent6"/>
+    </dgm:fillClrLst>
+    <dgm:linClrLst meth="repeat">
+      <a:schemeClr val="lt1">
+        <a:alpha val="0"/>
+      </a:schemeClr>
+    </dgm:linClrLst>
+    <dgm:effectClrLst/>
+    <dgm:txLinClrLst/>
+    <dgm:txFillClrLst/>
     <dgm:txEffectClrLst/>
   </dgm:styleLbl>
   <dgm:styleLbl name="dkBgShp">
@@ -3954,6 +4876,442 @@
     <dgm:cxn modelId="{DCF0CB90-968D-44BC-9375-23D08A413D61}" type="presParOf" srcId="{84920323-F016-42F7-8276-82F5F85FFDA6}" destId="{F319DB4D-3027-47FC-A15B-E081D699BEE9}" srcOrd="1" destOrd="0" presId="urn:microsoft.com/office/officeart/2018/2/layout/IconVerticalSolidList"/>
     <dgm:cxn modelId="{E6E46B1B-78B6-4A46-8A67-02DD8F74696D}" type="presParOf" srcId="{84920323-F016-42F7-8276-82F5F85FFDA6}" destId="{E16F7D8A-F956-4F98-BA0E-9C7AE6CA86CE}" srcOrd="2" destOrd="0" presId="urn:microsoft.com/office/officeart/2018/2/layout/IconVerticalSolidList"/>
     <dgm:cxn modelId="{FBED8B79-0831-4A34-9BF8-F5669A98CE46}" type="presParOf" srcId="{84920323-F016-42F7-8276-82F5F85FFDA6}" destId="{B8EF6CAC-B216-4BD6-967A-239D071262A8}" srcOrd="3" destOrd="0" presId="urn:microsoft.com/office/officeart/2018/2/layout/IconVerticalSolidList"/>
+  </dgm:cxnLst>
+  <dgm:bg/>
+  <dgm:whole/>
+  <dgm:extLst>
+    <a:ext uri="http://schemas.microsoft.com/office/drawing/2008/diagram">
+      <dsp:dataModelExt xmlns:dsp="http://schemas.microsoft.com/office/drawing/2008/diagram" relId="rId6" minVer="http://schemas.openxmlformats.org/drawingml/2006/diagram"/>
+    </a:ext>
+  </dgm:extLst>
+</dgm:dataModel>
+</file>
+
+<file path=ppt/diagrams/data4.xml><?xml version="1.0" encoding="utf-8"?>
+<dgm:dataModel xmlns:dgm="http://schemas.openxmlformats.org/drawingml/2006/diagram" xmlns:a="http://schemas.openxmlformats.org/drawingml/2006/main">
+  <dgm:ptLst>
+    <dgm:pt modelId="{2995C4A3-128A-42BC-ADBD-5CE74B676A93}" type="doc">
+      <dgm:prSet loTypeId="urn:microsoft.com/office/officeart/2018/5/layout/IconCircleLabelList" loCatId="icon" qsTypeId="urn:microsoft.com/office/officeart/2005/8/quickstyle/simple4" qsCatId="simple" csTypeId="urn:microsoft.com/office/officeart/2018/5/colors/Iconchunking_neutralicon_colorful1" csCatId="colorful" phldr="1"/>
+      <dgm:spPr/>
+      <dgm:t>
+        <a:bodyPr/>
+        <a:lstStyle/>
+        <a:p>
+          <a:endParaRPr lang="en-US"/>
+        </a:p>
+      </dgm:t>
+    </dgm:pt>
+    <dgm:pt modelId="{6487D069-1786-4F38-B0A8-8E01F1DFCECB}">
+      <dgm:prSet/>
+      <dgm:spPr/>
+      <dgm:t>
+        <a:bodyPr/>
+        <a:lstStyle/>
+        <a:p>
+          <a:pPr>
+            <a:defRPr cap="all"/>
+          </a:pPr>
+          <a:r>
+            <a:rPr lang="en-US" b="1"/>
+            <a:t>Prevent misdiagnosis</a:t>
+          </a:r>
+          <a:endParaRPr lang="en-US"/>
+        </a:p>
+      </dgm:t>
+    </dgm:pt>
+    <dgm:pt modelId="{E9759018-5061-4D63-8907-204C9B722FB3}" type="parTrans" cxnId="{A19D8818-6AF2-4C2D-A140-72364586F2FB}">
+      <dgm:prSet/>
+      <dgm:spPr/>
+      <dgm:t>
+        <a:bodyPr/>
+        <a:lstStyle/>
+        <a:p>
+          <a:endParaRPr lang="en-US"/>
+        </a:p>
+      </dgm:t>
+    </dgm:pt>
+    <dgm:pt modelId="{EED5B825-1188-4EED-82E3-3D437AF7910F}" type="sibTrans" cxnId="{A19D8818-6AF2-4C2D-A140-72364586F2FB}">
+      <dgm:prSet/>
+      <dgm:spPr/>
+      <dgm:t>
+        <a:bodyPr/>
+        <a:lstStyle/>
+        <a:p>
+          <a:endParaRPr lang="en-US"/>
+        </a:p>
+      </dgm:t>
+    </dgm:pt>
+    <dgm:pt modelId="{53D32402-6B47-48C8-9B14-9B39AD2E4AD8}">
+      <dgm:prSet/>
+      <dgm:spPr/>
+      <dgm:t>
+        <a:bodyPr/>
+        <a:lstStyle/>
+        <a:p>
+          <a:pPr>
+            <a:defRPr cap="all"/>
+          </a:pPr>
+          <a:r>
+            <a:rPr lang="en-US" b="1"/>
+            <a:t>Have better reach</a:t>
+          </a:r>
+          <a:endParaRPr lang="en-US"/>
+        </a:p>
+      </dgm:t>
+    </dgm:pt>
+    <dgm:pt modelId="{E781FA70-15F2-441C-A9BC-1C25F62223E7}" type="parTrans" cxnId="{8C52530E-61C1-4B42-BBF8-C20E8A102EB1}">
+      <dgm:prSet/>
+      <dgm:spPr/>
+      <dgm:t>
+        <a:bodyPr/>
+        <a:lstStyle/>
+        <a:p>
+          <a:endParaRPr lang="en-US"/>
+        </a:p>
+      </dgm:t>
+    </dgm:pt>
+    <dgm:pt modelId="{CE45E065-849A-40B6-A1CE-6107FE6C1EC0}" type="sibTrans" cxnId="{8C52530E-61C1-4B42-BBF8-C20E8A102EB1}">
+      <dgm:prSet/>
+      <dgm:spPr/>
+      <dgm:t>
+        <a:bodyPr/>
+        <a:lstStyle/>
+        <a:p>
+          <a:endParaRPr lang="en-US"/>
+        </a:p>
+      </dgm:t>
+    </dgm:pt>
+    <dgm:pt modelId="{7FD349D2-15A1-4C30-BB11-F1753B800FFF}">
+      <dgm:prSet/>
+      <dgm:spPr/>
+      <dgm:t>
+        <a:bodyPr/>
+        <a:lstStyle/>
+        <a:p>
+          <a:pPr>
+            <a:defRPr cap="all"/>
+          </a:pPr>
+          <a:r>
+            <a:rPr lang="en-US" b="1"/>
+            <a:t>Engage users better</a:t>
+          </a:r>
+          <a:endParaRPr lang="en-US"/>
+        </a:p>
+      </dgm:t>
+    </dgm:pt>
+    <dgm:pt modelId="{211CE292-2558-4CD9-8435-5BCA6792D97F}" type="parTrans" cxnId="{4FA95599-20CA-4FA1-A517-D953ED59C416}">
+      <dgm:prSet/>
+      <dgm:spPr/>
+      <dgm:t>
+        <a:bodyPr/>
+        <a:lstStyle/>
+        <a:p>
+          <a:endParaRPr lang="en-US"/>
+        </a:p>
+      </dgm:t>
+    </dgm:pt>
+    <dgm:pt modelId="{2AA6301F-DE22-4B56-AD85-00CBC6EA9D07}" type="sibTrans" cxnId="{4FA95599-20CA-4FA1-A517-D953ED59C416}">
+      <dgm:prSet/>
+      <dgm:spPr/>
+      <dgm:t>
+        <a:bodyPr/>
+        <a:lstStyle/>
+        <a:p>
+          <a:endParaRPr lang="en-US"/>
+        </a:p>
+      </dgm:t>
+    </dgm:pt>
+    <dgm:pt modelId="{3E6EA971-2D64-4A60-AB12-F1792C959728}">
+      <dgm:prSet/>
+      <dgm:spPr/>
+      <dgm:t>
+        <a:bodyPr/>
+        <a:lstStyle/>
+        <a:p>
+          <a:pPr>
+            <a:defRPr cap="all"/>
+          </a:pPr>
+          <a:r>
+            <a:rPr lang="en-US" b="1"/>
+            <a:t>Provide extremely unique insight into responses</a:t>
+          </a:r>
+          <a:endParaRPr lang="en-US"/>
+        </a:p>
+      </dgm:t>
+    </dgm:pt>
+    <dgm:pt modelId="{72C68B04-8860-40BA-8C26-39E8042DF30C}" type="parTrans" cxnId="{AD39D44A-BC6D-4903-83CA-774D77A94873}">
+      <dgm:prSet/>
+      <dgm:spPr/>
+      <dgm:t>
+        <a:bodyPr/>
+        <a:lstStyle/>
+        <a:p>
+          <a:endParaRPr lang="en-US"/>
+        </a:p>
+      </dgm:t>
+    </dgm:pt>
+    <dgm:pt modelId="{EABBD679-85BD-48FB-A5CB-C2C8DE08E876}" type="sibTrans" cxnId="{AD39D44A-BC6D-4903-83CA-774D77A94873}">
+      <dgm:prSet/>
+      <dgm:spPr/>
+      <dgm:t>
+        <a:bodyPr/>
+        <a:lstStyle/>
+        <a:p>
+          <a:endParaRPr lang="en-US"/>
+        </a:p>
+      </dgm:t>
+    </dgm:pt>
+    <dgm:pt modelId="{CEC631B1-45DC-4157-B762-1FD1DBCAE2F2}" type="pres">
+      <dgm:prSet presAssocID="{2995C4A3-128A-42BC-ADBD-5CE74B676A93}" presName="root" presStyleCnt="0">
+        <dgm:presLayoutVars>
+          <dgm:dir/>
+          <dgm:resizeHandles val="exact"/>
+        </dgm:presLayoutVars>
+      </dgm:prSet>
+      <dgm:spPr/>
+    </dgm:pt>
+    <dgm:pt modelId="{EF9DF46F-DB50-406D-9A87-5E0557EDF73C}" type="pres">
+      <dgm:prSet presAssocID="{6487D069-1786-4F38-B0A8-8E01F1DFCECB}" presName="compNode" presStyleCnt="0"/>
+      <dgm:spPr/>
+    </dgm:pt>
+    <dgm:pt modelId="{673A8CA2-FC70-4073-A981-C56C1411570E}" type="pres">
+      <dgm:prSet presAssocID="{6487D069-1786-4F38-B0A8-8E01F1DFCECB}" presName="iconBgRect" presStyleLbl="bgShp" presStyleIdx="0" presStyleCnt="4"/>
+      <dgm:spPr/>
+    </dgm:pt>
+    <dgm:pt modelId="{56190B37-A529-425A-AD3D-725B88299CD1}" type="pres">
+      <dgm:prSet presAssocID="{6487D069-1786-4F38-B0A8-8E01F1DFCECB}" presName="iconRect" presStyleLbl="node1" presStyleIdx="0" presStyleCnt="4"/>
+      <dgm:spPr>
+        <a:blipFill>
+          <a:blip xmlns:r="http://schemas.openxmlformats.org/officeDocument/2006/relationships" r:embed="rId1">
+            <a:extLst>
+              <a:ext uri="{28A0092B-C50C-407E-A947-70E740481C1C}">
+                <a14:useLocalDpi xmlns:a14="http://schemas.microsoft.com/office/drawing/2010/main" val="0"/>
+              </a:ext>
+              <a:ext uri="{96DAC541-7B7A-43D3-8B79-37D633B846F1}">
+                <asvg:svgBlip xmlns:asvg="http://schemas.microsoft.com/office/drawing/2016/SVG/main" r:embed="rId2"/>
+              </a:ext>
+            </a:extLst>
+          </a:blip>
+          <a:stretch>
+            <a:fillRect/>
+          </a:stretch>
+        </a:blipFill>
+        <a:ln>
+          <a:noFill/>
+        </a:ln>
+      </dgm:spPr>
+      <dgm:extLst>
+        <a:ext uri="{E40237B7-FDA0-4F09-8148-C483321AD2D9}">
+          <dgm14:cNvPr xmlns:dgm14="http://schemas.microsoft.com/office/drawing/2010/diagram" id="0" name="" descr="Needle"/>
+        </a:ext>
+      </dgm:extLst>
+    </dgm:pt>
+    <dgm:pt modelId="{CD1B74A5-A7A6-4E19-9AC2-A85D0154E57A}" type="pres">
+      <dgm:prSet presAssocID="{6487D069-1786-4F38-B0A8-8E01F1DFCECB}" presName="spaceRect" presStyleCnt="0"/>
+      <dgm:spPr/>
+    </dgm:pt>
+    <dgm:pt modelId="{C77B3E75-2756-422F-9A09-1FA1B0781B68}" type="pres">
+      <dgm:prSet presAssocID="{6487D069-1786-4F38-B0A8-8E01F1DFCECB}" presName="textRect" presStyleLbl="revTx" presStyleIdx="0" presStyleCnt="4">
+        <dgm:presLayoutVars>
+          <dgm:chMax val="1"/>
+          <dgm:chPref val="1"/>
+        </dgm:presLayoutVars>
+      </dgm:prSet>
+      <dgm:spPr/>
+    </dgm:pt>
+    <dgm:pt modelId="{A5AD65CD-F9AA-4E09-9AA0-EDCB0E5EE261}" type="pres">
+      <dgm:prSet presAssocID="{EED5B825-1188-4EED-82E3-3D437AF7910F}" presName="sibTrans" presStyleCnt="0"/>
+      <dgm:spPr/>
+    </dgm:pt>
+    <dgm:pt modelId="{573E9F55-9B82-41BF-B030-65F9F0DC08A2}" type="pres">
+      <dgm:prSet presAssocID="{53D32402-6B47-48C8-9B14-9B39AD2E4AD8}" presName="compNode" presStyleCnt="0"/>
+      <dgm:spPr/>
+    </dgm:pt>
+    <dgm:pt modelId="{5B6EED2E-319D-40CE-BD9E-BB0D039C5844}" type="pres">
+      <dgm:prSet presAssocID="{53D32402-6B47-48C8-9B14-9B39AD2E4AD8}" presName="iconBgRect" presStyleLbl="bgShp" presStyleIdx="1" presStyleCnt="4"/>
+      <dgm:spPr/>
+    </dgm:pt>
+    <dgm:pt modelId="{EDC8D796-F59C-4E2F-8673-AF5728D244E2}" type="pres">
+      <dgm:prSet presAssocID="{53D32402-6B47-48C8-9B14-9B39AD2E4AD8}" presName="iconRect" presStyleLbl="node1" presStyleIdx="1" presStyleCnt="4"/>
+      <dgm:spPr>
+        <a:blipFill>
+          <a:blip xmlns:r="http://schemas.openxmlformats.org/officeDocument/2006/relationships" r:embed="rId3">
+            <a:extLst>
+              <a:ext uri="{28A0092B-C50C-407E-A947-70E740481C1C}">
+                <a14:useLocalDpi xmlns:a14="http://schemas.microsoft.com/office/drawing/2010/main" val="0"/>
+              </a:ext>
+              <a:ext uri="{96DAC541-7B7A-43D3-8B79-37D633B846F1}">
+                <asvg:svgBlip xmlns:asvg="http://schemas.microsoft.com/office/drawing/2016/SVG/main" r:embed="rId4"/>
+              </a:ext>
+            </a:extLst>
+          </a:blip>
+          <a:stretch>
+            <a:fillRect/>
+          </a:stretch>
+        </a:blipFill>
+        <a:ln>
+          <a:noFill/>
+        </a:ln>
+      </dgm:spPr>
+      <dgm:extLst>
+        <a:ext uri="{E40237B7-FDA0-4F09-8148-C483321AD2D9}">
+          <dgm14:cNvPr xmlns:dgm14="http://schemas.microsoft.com/office/drawing/2010/diagram" id="0" name="" descr="Upward trend"/>
+        </a:ext>
+      </dgm:extLst>
+    </dgm:pt>
+    <dgm:pt modelId="{26DC8CC6-DB99-4C13-9EFB-F2226F7D129C}" type="pres">
+      <dgm:prSet presAssocID="{53D32402-6B47-48C8-9B14-9B39AD2E4AD8}" presName="spaceRect" presStyleCnt="0"/>
+      <dgm:spPr/>
+    </dgm:pt>
+    <dgm:pt modelId="{3BC6E46A-E9AF-4645-8880-CA2D7C35F41D}" type="pres">
+      <dgm:prSet presAssocID="{53D32402-6B47-48C8-9B14-9B39AD2E4AD8}" presName="textRect" presStyleLbl="revTx" presStyleIdx="1" presStyleCnt="4">
+        <dgm:presLayoutVars>
+          <dgm:chMax val="1"/>
+          <dgm:chPref val="1"/>
+        </dgm:presLayoutVars>
+      </dgm:prSet>
+      <dgm:spPr/>
+    </dgm:pt>
+    <dgm:pt modelId="{10E32397-DE5D-4977-9952-E664DAD4C49F}" type="pres">
+      <dgm:prSet presAssocID="{CE45E065-849A-40B6-A1CE-6107FE6C1EC0}" presName="sibTrans" presStyleCnt="0"/>
+      <dgm:spPr/>
+    </dgm:pt>
+    <dgm:pt modelId="{3DE2115C-5341-40DD-B6CC-D1A65B6DE1A6}" type="pres">
+      <dgm:prSet presAssocID="{7FD349D2-15A1-4C30-BB11-F1753B800FFF}" presName="compNode" presStyleCnt="0"/>
+      <dgm:spPr/>
+    </dgm:pt>
+    <dgm:pt modelId="{F27082C1-ED57-456E-86C9-094BDA52B4ED}" type="pres">
+      <dgm:prSet presAssocID="{7FD349D2-15A1-4C30-BB11-F1753B800FFF}" presName="iconBgRect" presStyleLbl="bgShp" presStyleIdx="2" presStyleCnt="4"/>
+      <dgm:spPr/>
+    </dgm:pt>
+    <dgm:pt modelId="{F6351F1A-92A4-40E8-A58E-1B202A5BA93E}" type="pres">
+      <dgm:prSet presAssocID="{7FD349D2-15A1-4C30-BB11-F1753B800FFF}" presName="iconRect" presStyleLbl="node1" presStyleIdx="2" presStyleCnt="4"/>
+      <dgm:spPr>
+        <a:blipFill>
+          <a:blip xmlns:r="http://schemas.openxmlformats.org/officeDocument/2006/relationships" r:embed="rId5">
+            <a:extLst>
+              <a:ext uri="{28A0092B-C50C-407E-A947-70E740481C1C}">
+                <a14:useLocalDpi xmlns:a14="http://schemas.microsoft.com/office/drawing/2010/main" val="0"/>
+              </a:ext>
+              <a:ext uri="{96DAC541-7B7A-43D3-8B79-37D633B846F1}">
+                <asvg:svgBlip xmlns:asvg="http://schemas.microsoft.com/office/drawing/2016/SVG/main" r:embed="rId6"/>
+              </a:ext>
+            </a:extLst>
+          </a:blip>
+          <a:stretch>
+            <a:fillRect/>
+          </a:stretch>
+        </a:blipFill>
+        <a:ln>
+          <a:noFill/>
+        </a:ln>
+      </dgm:spPr>
+      <dgm:extLst>
+        <a:ext uri="{E40237B7-FDA0-4F09-8148-C483321AD2D9}">
+          <dgm14:cNvPr xmlns:dgm14="http://schemas.microsoft.com/office/drawing/2010/diagram" id="0" name="" descr="Users"/>
+        </a:ext>
+      </dgm:extLst>
+    </dgm:pt>
+    <dgm:pt modelId="{D126D291-8E4B-4ADC-B1E8-7E54245DF486}" type="pres">
+      <dgm:prSet presAssocID="{7FD349D2-15A1-4C30-BB11-F1753B800FFF}" presName="spaceRect" presStyleCnt="0"/>
+      <dgm:spPr/>
+    </dgm:pt>
+    <dgm:pt modelId="{03965086-78AE-4CE2-B0DC-D7E308B5D03A}" type="pres">
+      <dgm:prSet presAssocID="{7FD349D2-15A1-4C30-BB11-F1753B800FFF}" presName="textRect" presStyleLbl="revTx" presStyleIdx="2" presStyleCnt="4">
+        <dgm:presLayoutVars>
+          <dgm:chMax val="1"/>
+          <dgm:chPref val="1"/>
+        </dgm:presLayoutVars>
+      </dgm:prSet>
+      <dgm:spPr/>
+    </dgm:pt>
+    <dgm:pt modelId="{DDA599B8-3769-4A99-BE98-FD3AE437C1E2}" type="pres">
+      <dgm:prSet presAssocID="{2AA6301F-DE22-4B56-AD85-00CBC6EA9D07}" presName="sibTrans" presStyleCnt="0"/>
+      <dgm:spPr/>
+    </dgm:pt>
+    <dgm:pt modelId="{30FD79C7-259E-49AB-8C52-A4109D08CCD3}" type="pres">
+      <dgm:prSet presAssocID="{3E6EA971-2D64-4A60-AB12-F1792C959728}" presName="compNode" presStyleCnt="0"/>
+      <dgm:spPr/>
+    </dgm:pt>
+    <dgm:pt modelId="{36EB5DBC-54D8-4B75-BC2A-4B27518BD5EA}" type="pres">
+      <dgm:prSet presAssocID="{3E6EA971-2D64-4A60-AB12-F1792C959728}" presName="iconBgRect" presStyleLbl="bgShp" presStyleIdx="3" presStyleCnt="4"/>
+      <dgm:spPr/>
+    </dgm:pt>
+    <dgm:pt modelId="{470641A0-D73E-4CB0-8CB2-D57DF58CDE4F}" type="pres">
+      <dgm:prSet presAssocID="{3E6EA971-2D64-4A60-AB12-F1792C959728}" presName="iconRect" presStyleLbl="node1" presStyleIdx="3" presStyleCnt="4"/>
+      <dgm:spPr>
+        <a:blipFill>
+          <a:blip xmlns:r="http://schemas.openxmlformats.org/officeDocument/2006/relationships" r:embed="rId7">
+            <a:extLst>
+              <a:ext uri="{28A0092B-C50C-407E-A947-70E740481C1C}">
+                <a14:useLocalDpi xmlns:a14="http://schemas.microsoft.com/office/drawing/2010/main" val="0"/>
+              </a:ext>
+              <a:ext uri="{96DAC541-7B7A-43D3-8B79-37D633B846F1}">
+                <asvg:svgBlip xmlns:asvg="http://schemas.microsoft.com/office/drawing/2016/SVG/main" r:embed="rId8"/>
+              </a:ext>
+            </a:extLst>
+          </a:blip>
+          <a:stretch>
+            <a:fillRect/>
+          </a:stretch>
+        </a:blipFill>
+        <a:ln>
+          <a:noFill/>
+        </a:ln>
+      </dgm:spPr>
+      <dgm:extLst>
+        <a:ext uri="{E40237B7-FDA0-4F09-8148-C483321AD2D9}">
+          <dgm14:cNvPr xmlns:dgm14="http://schemas.microsoft.com/office/drawing/2010/diagram" id="0" name="" descr="Database"/>
+        </a:ext>
+      </dgm:extLst>
+    </dgm:pt>
+    <dgm:pt modelId="{EEBA2F7A-CE92-4EDD-8808-41EAC3F13D04}" type="pres">
+      <dgm:prSet presAssocID="{3E6EA971-2D64-4A60-AB12-F1792C959728}" presName="spaceRect" presStyleCnt="0"/>
+      <dgm:spPr/>
+    </dgm:pt>
+    <dgm:pt modelId="{77FFBDED-4A88-44C9-8537-1003F33AB576}" type="pres">
+      <dgm:prSet presAssocID="{3E6EA971-2D64-4A60-AB12-F1792C959728}" presName="textRect" presStyleLbl="revTx" presStyleIdx="3" presStyleCnt="4">
+        <dgm:presLayoutVars>
+          <dgm:chMax val="1"/>
+          <dgm:chPref val="1"/>
+        </dgm:presLayoutVars>
+      </dgm:prSet>
+      <dgm:spPr/>
+    </dgm:pt>
+  </dgm:ptLst>
+  <dgm:cxnLst>
+    <dgm:cxn modelId="{8C52530E-61C1-4B42-BBF8-C20E8A102EB1}" srcId="{2995C4A3-128A-42BC-ADBD-5CE74B676A93}" destId="{53D32402-6B47-48C8-9B14-9B39AD2E4AD8}" srcOrd="1" destOrd="0" parTransId="{E781FA70-15F2-441C-A9BC-1C25F62223E7}" sibTransId="{CE45E065-849A-40B6-A1CE-6107FE6C1EC0}"/>
+    <dgm:cxn modelId="{A19D8818-6AF2-4C2D-A140-72364586F2FB}" srcId="{2995C4A3-128A-42BC-ADBD-5CE74B676A93}" destId="{6487D069-1786-4F38-B0A8-8E01F1DFCECB}" srcOrd="0" destOrd="0" parTransId="{E9759018-5061-4D63-8907-204C9B722FB3}" sibTransId="{EED5B825-1188-4EED-82E3-3D437AF7910F}"/>
+    <dgm:cxn modelId="{D0E3012A-F2AF-4C76-8C68-0CD99F576609}" type="presOf" srcId="{6487D069-1786-4F38-B0A8-8E01F1DFCECB}" destId="{C77B3E75-2756-422F-9A09-1FA1B0781B68}" srcOrd="0" destOrd="0" presId="urn:microsoft.com/office/officeart/2018/5/layout/IconCircleLabelList"/>
+    <dgm:cxn modelId="{AD39D44A-BC6D-4903-83CA-774D77A94873}" srcId="{2995C4A3-128A-42BC-ADBD-5CE74B676A93}" destId="{3E6EA971-2D64-4A60-AB12-F1792C959728}" srcOrd="3" destOrd="0" parTransId="{72C68B04-8860-40BA-8C26-39E8042DF30C}" sibTransId="{EABBD679-85BD-48FB-A5CB-C2C8DE08E876}"/>
+    <dgm:cxn modelId="{28501D8B-E090-4621-B674-D45417BA1508}" type="presOf" srcId="{3E6EA971-2D64-4A60-AB12-F1792C959728}" destId="{77FFBDED-4A88-44C9-8537-1003F33AB576}" srcOrd="0" destOrd="0" presId="urn:microsoft.com/office/officeart/2018/5/layout/IconCircleLabelList"/>
+    <dgm:cxn modelId="{4FA95599-20CA-4FA1-A517-D953ED59C416}" srcId="{2995C4A3-128A-42BC-ADBD-5CE74B676A93}" destId="{7FD349D2-15A1-4C30-BB11-F1753B800FFF}" srcOrd="2" destOrd="0" parTransId="{211CE292-2558-4CD9-8435-5BCA6792D97F}" sibTransId="{2AA6301F-DE22-4B56-AD85-00CBC6EA9D07}"/>
+    <dgm:cxn modelId="{162AFCA2-F839-4F16-A90D-4C890A09ED7E}" type="presOf" srcId="{7FD349D2-15A1-4C30-BB11-F1753B800FFF}" destId="{03965086-78AE-4CE2-B0DC-D7E308B5D03A}" srcOrd="0" destOrd="0" presId="urn:microsoft.com/office/officeart/2018/5/layout/IconCircleLabelList"/>
+    <dgm:cxn modelId="{5A289CAA-7368-4033-BED4-60A1F0345EF9}" type="presOf" srcId="{2995C4A3-128A-42BC-ADBD-5CE74B676A93}" destId="{CEC631B1-45DC-4157-B762-1FD1DBCAE2F2}" srcOrd="0" destOrd="0" presId="urn:microsoft.com/office/officeart/2018/5/layout/IconCircleLabelList"/>
+    <dgm:cxn modelId="{C98599F9-9916-448B-9E61-9AE1A45A6B2A}" type="presOf" srcId="{53D32402-6B47-48C8-9B14-9B39AD2E4AD8}" destId="{3BC6E46A-E9AF-4645-8880-CA2D7C35F41D}" srcOrd="0" destOrd="0" presId="urn:microsoft.com/office/officeart/2018/5/layout/IconCircleLabelList"/>
+    <dgm:cxn modelId="{94D32812-54F5-4BF3-9446-7A9354DBDC52}" type="presParOf" srcId="{CEC631B1-45DC-4157-B762-1FD1DBCAE2F2}" destId="{EF9DF46F-DB50-406D-9A87-5E0557EDF73C}" srcOrd="0" destOrd="0" presId="urn:microsoft.com/office/officeart/2018/5/layout/IconCircleLabelList"/>
+    <dgm:cxn modelId="{FE4E83BF-F064-4D9D-8BB9-5C8AC2FE7D10}" type="presParOf" srcId="{EF9DF46F-DB50-406D-9A87-5E0557EDF73C}" destId="{673A8CA2-FC70-4073-A981-C56C1411570E}" srcOrd="0" destOrd="0" presId="urn:microsoft.com/office/officeart/2018/5/layout/IconCircleLabelList"/>
+    <dgm:cxn modelId="{9159D9F5-C112-45E6-B06F-246AE98F19E2}" type="presParOf" srcId="{EF9DF46F-DB50-406D-9A87-5E0557EDF73C}" destId="{56190B37-A529-425A-AD3D-725B88299CD1}" srcOrd="1" destOrd="0" presId="urn:microsoft.com/office/officeart/2018/5/layout/IconCircleLabelList"/>
+    <dgm:cxn modelId="{05E6D909-9063-49A6-9920-C45CEDD65953}" type="presParOf" srcId="{EF9DF46F-DB50-406D-9A87-5E0557EDF73C}" destId="{CD1B74A5-A7A6-4E19-9AC2-A85D0154E57A}" srcOrd="2" destOrd="0" presId="urn:microsoft.com/office/officeart/2018/5/layout/IconCircleLabelList"/>
+    <dgm:cxn modelId="{EB8EC34C-E691-423A-9262-83C2F58C5B9A}" type="presParOf" srcId="{EF9DF46F-DB50-406D-9A87-5E0557EDF73C}" destId="{C77B3E75-2756-422F-9A09-1FA1B0781B68}" srcOrd="3" destOrd="0" presId="urn:microsoft.com/office/officeart/2018/5/layout/IconCircleLabelList"/>
+    <dgm:cxn modelId="{8087C060-7761-4C7E-935B-BB40E9AE7385}" type="presParOf" srcId="{CEC631B1-45DC-4157-B762-1FD1DBCAE2F2}" destId="{A5AD65CD-F9AA-4E09-9AA0-EDCB0E5EE261}" srcOrd="1" destOrd="0" presId="urn:microsoft.com/office/officeart/2018/5/layout/IconCircleLabelList"/>
+    <dgm:cxn modelId="{0346E011-A5C3-4653-9A10-5E04C58BCEC0}" type="presParOf" srcId="{CEC631B1-45DC-4157-B762-1FD1DBCAE2F2}" destId="{573E9F55-9B82-41BF-B030-65F9F0DC08A2}" srcOrd="2" destOrd="0" presId="urn:microsoft.com/office/officeart/2018/5/layout/IconCircleLabelList"/>
+    <dgm:cxn modelId="{948361AC-05CD-4C12-9132-42B0BFD28016}" type="presParOf" srcId="{573E9F55-9B82-41BF-B030-65F9F0DC08A2}" destId="{5B6EED2E-319D-40CE-BD9E-BB0D039C5844}" srcOrd="0" destOrd="0" presId="urn:microsoft.com/office/officeart/2018/5/layout/IconCircleLabelList"/>
+    <dgm:cxn modelId="{CBB14A65-5951-46D8-8D14-112026D3061C}" type="presParOf" srcId="{573E9F55-9B82-41BF-B030-65F9F0DC08A2}" destId="{EDC8D796-F59C-4E2F-8673-AF5728D244E2}" srcOrd="1" destOrd="0" presId="urn:microsoft.com/office/officeart/2018/5/layout/IconCircleLabelList"/>
+    <dgm:cxn modelId="{9CB06A4A-9742-434B-BDA0-170579E9C228}" type="presParOf" srcId="{573E9F55-9B82-41BF-B030-65F9F0DC08A2}" destId="{26DC8CC6-DB99-4C13-9EFB-F2226F7D129C}" srcOrd="2" destOrd="0" presId="urn:microsoft.com/office/officeart/2018/5/layout/IconCircleLabelList"/>
+    <dgm:cxn modelId="{7671D56E-A942-46D1-AD44-3E5054C246F2}" type="presParOf" srcId="{573E9F55-9B82-41BF-B030-65F9F0DC08A2}" destId="{3BC6E46A-E9AF-4645-8880-CA2D7C35F41D}" srcOrd="3" destOrd="0" presId="urn:microsoft.com/office/officeart/2018/5/layout/IconCircleLabelList"/>
+    <dgm:cxn modelId="{7B44DEEE-20BE-4FE2-8CC3-F2EA9B66F03F}" type="presParOf" srcId="{CEC631B1-45DC-4157-B762-1FD1DBCAE2F2}" destId="{10E32397-DE5D-4977-9952-E664DAD4C49F}" srcOrd="3" destOrd="0" presId="urn:microsoft.com/office/officeart/2018/5/layout/IconCircleLabelList"/>
+    <dgm:cxn modelId="{4234C59B-D6BD-460D-8900-46835AE41D31}" type="presParOf" srcId="{CEC631B1-45DC-4157-B762-1FD1DBCAE2F2}" destId="{3DE2115C-5341-40DD-B6CC-D1A65B6DE1A6}" srcOrd="4" destOrd="0" presId="urn:microsoft.com/office/officeart/2018/5/layout/IconCircleLabelList"/>
+    <dgm:cxn modelId="{1CCF44B0-57DE-4065-BA63-EEA312A2C1B6}" type="presParOf" srcId="{3DE2115C-5341-40DD-B6CC-D1A65B6DE1A6}" destId="{F27082C1-ED57-456E-86C9-094BDA52B4ED}" srcOrd="0" destOrd="0" presId="urn:microsoft.com/office/officeart/2018/5/layout/IconCircleLabelList"/>
+    <dgm:cxn modelId="{0D11DD36-0E6A-4E72-ACCD-4FA3968D7159}" type="presParOf" srcId="{3DE2115C-5341-40DD-B6CC-D1A65B6DE1A6}" destId="{F6351F1A-92A4-40E8-A58E-1B202A5BA93E}" srcOrd="1" destOrd="0" presId="urn:microsoft.com/office/officeart/2018/5/layout/IconCircleLabelList"/>
+    <dgm:cxn modelId="{19358EAF-1F35-438E-B6C1-930E7D9E85A1}" type="presParOf" srcId="{3DE2115C-5341-40DD-B6CC-D1A65B6DE1A6}" destId="{D126D291-8E4B-4ADC-B1E8-7E54245DF486}" srcOrd="2" destOrd="0" presId="urn:microsoft.com/office/officeart/2018/5/layout/IconCircleLabelList"/>
+    <dgm:cxn modelId="{3433A6FD-FA24-42AA-B48C-6B3EB8412DAB}" type="presParOf" srcId="{3DE2115C-5341-40DD-B6CC-D1A65B6DE1A6}" destId="{03965086-78AE-4CE2-B0DC-D7E308B5D03A}" srcOrd="3" destOrd="0" presId="urn:microsoft.com/office/officeart/2018/5/layout/IconCircleLabelList"/>
+    <dgm:cxn modelId="{3BAAF386-BF48-41EB-8AEC-E85E67EAB5AE}" type="presParOf" srcId="{CEC631B1-45DC-4157-B762-1FD1DBCAE2F2}" destId="{DDA599B8-3769-4A99-BE98-FD3AE437C1E2}" srcOrd="5" destOrd="0" presId="urn:microsoft.com/office/officeart/2018/5/layout/IconCircleLabelList"/>
+    <dgm:cxn modelId="{E6803D0F-6E9F-4E91-8BA4-003939BC0192}" type="presParOf" srcId="{CEC631B1-45DC-4157-B762-1FD1DBCAE2F2}" destId="{30FD79C7-259E-49AB-8C52-A4109D08CCD3}" srcOrd="6" destOrd="0" presId="urn:microsoft.com/office/officeart/2018/5/layout/IconCircleLabelList"/>
+    <dgm:cxn modelId="{CD47C108-A38A-401F-85D4-FBC32E51F7DB}" type="presParOf" srcId="{30FD79C7-259E-49AB-8C52-A4109D08CCD3}" destId="{36EB5DBC-54D8-4B75-BC2A-4B27518BD5EA}" srcOrd="0" destOrd="0" presId="urn:microsoft.com/office/officeart/2018/5/layout/IconCircleLabelList"/>
+    <dgm:cxn modelId="{223A286F-FEFA-45C1-A318-3E016B3C827F}" type="presParOf" srcId="{30FD79C7-259E-49AB-8C52-A4109D08CCD3}" destId="{470641A0-D73E-4CB0-8CB2-D57DF58CDE4F}" srcOrd="1" destOrd="0" presId="urn:microsoft.com/office/officeart/2018/5/layout/IconCircleLabelList"/>
+    <dgm:cxn modelId="{080C41FF-39F8-448E-9EAB-847123CB8E12}" type="presParOf" srcId="{30FD79C7-259E-49AB-8C52-A4109D08CCD3}" destId="{EEBA2F7A-CE92-4EDD-8808-41EAC3F13D04}" srcOrd="2" destOrd="0" presId="urn:microsoft.com/office/officeart/2018/5/layout/IconCircleLabelList"/>
+    <dgm:cxn modelId="{47F0E92A-F9A4-4AE0-A214-79A40B600A4F}" type="presParOf" srcId="{30FD79C7-259E-49AB-8C52-A4109D08CCD3}" destId="{77FFBDED-4A88-44C9-8537-1003F33AB576}" srcOrd="3" destOrd="0" presId="urn:microsoft.com/office/officeart/2018/5/layout/IconCircleLabelList"/>
   </dgm:cxnLst>
   <dgm:bg/>
   <dgm:whole/>
@@ -5667,6 +7025,662 @@
 </dsp:drawing>
 </file>
 
+<file path=ppt/diagrams/drawing4.xml><?xml version="1.0" encoding="utf-8"?>
+<dsp:drawing xmlns:dgm="http://schemas.openxmlformats.org/drawingml/2006/diagram" xmlns:dsp="http://schemas.microsoft.com/office/drawing/2008/diagram" xmlns:a="http://schemas.openxmlformats.org/drawingml/2006/main">
+  <dsp:spTree>
+    <dsp:nvGrpSpPr>
+      <dsp:cNvPr id="0" name=""/>
+      <dsp:cNvGrpSpPr/>
+    </dsp:nvGrpSpPr>
+    <dsp:grpSpPr/>
+    <dsp:sp modelId="{673A8CA2-FC70-4073-A981-C56C1411570E}">
+      <dsp:nvSpPr>
+        <dsp:cNvPr id="0" name=""/>
+        <dsp:cNvSpPr/>
+      </dsp:nvSpPr>
+      <dsp:spPr>
+        <a:xfrm>
+          <a:off x="691544" y="1144723"/>
+          <a:ext cx="1459223" cy="1459223"/>
+        </a:xfrm>
+        <a:prstGeom prst="ellipse">
+          <a:avLst/>
+        </a:prstGeom>
+        <a:solidFill>
+          <a:schemeClr val="accent2">
+            <a:hueOff val="0"/>
+            <a:satOff val="0"/>
+            <a:lumOff val="0"/>
+            <a:alphaOff val="0"/>
+          </a:schemeClr>
+        </a:solidFill>
+        <a:ln>
+          <a:noFill/>
+        </a:ln>
+        <a:effectLst>
+          <a:outerShdw blurRad="38100" dist="25400" dir="5400000" rotWithShape="0">
+            <a:srgbClr val="000000">
+              <a:alpha val="35000"/>
+            </a:srgbClr>
+          </a:outerShdw>
+        </a:effectLst>
+      </dsp:spPr>
+      <dsp:style>
+        <a:lnRef idx="0">
+          <a:scrgbClr r="0" g="0" b="0"/>
+        </a:lnRef>
+        <a:fillRef idx="1">
+          <a:scrgbClr r="0" g="0" b="0"/>
+        </a:fillRef>
+        <a:effectRef idx="2">
+          <a:scrgbClr r="0" g="0" b="0"/>
+        </a:effectRef>
+        <a:fontRef idx="minor"/>
+      </dsp:style>
+    </dsp:sp>
+    <dsp:sp modelId="{56190B37-A529-425A-AD3D-725B88299CD1}">
+      <dsp:nvSpPr>
+        <dsp:cNvPr id="0" name=""/>
+        <dsp:cNvSpPr/>
+      </dsp:nvSpPr>
+      <dsp:spPr>
+        <a:xfrm>
+          <a:off x="1002526" y="1455705"/>
+          <a:ext cx="837259" cy="837259"/>
+        </a:xfrm>
+        <a:prstGeom prst="rect">
+          <a:avLst/>
+        </a:prstGeom>
+        <a:blipFill>
+          <a:blip xmlns:r="http://schemas.openxmlformats.org/officeDocument/2006/relationships" r:embed="rId1">
+            <a:extLst>
+              <a:ext uri="{28A0092B-C50C-407E-A947-70E740481C1C}">
+                <a14:useLocalDpi xmlns:a14="http://schemas.microsoft.com/office/drawing/2010/main" val="0"/>
+              </a:ext>
+              <a:ext uri="{96DAC541-7B7A-43D3-8B79-37D633B846F1}">
+                <asvg:svgBlip xmlns:asvg="http://schemas.microsoft.com/office/drawing/2016/SVG/main" r:embed="rId2"/>
+              </a:ext>
+            </a:extLst>
+          </a:blip>
+          <a:stretch>
+            <a:fillRect/>
+          </a:stretch>
+        </a:blipFill>
+        <a:ln>
+          <a:noFill/>
+        </a:ln>
+        <a:effectLst>
+          <a:outerShdw blurRad="38100" dist="25400" dir="5400000" rotWithShape="0">
+            <a:srgbClr val="000000">
+              <a:alpha val="35000"/>
+            </a:srgbClr>
+          </a:outerShdw>
+        </a:effectLst>
+      </dsp:spPr>
+      <dsp:style>
+        <a:lnRef idx="0">
+          <a:scrgbClr r="0" g="0" b="0"/>
+        </a:lnRef>
+        <a:fillRef idx="3">
+          <a:scrgbClr r="0" g="0" b="0"/>
+        </a:fillRef>
+        <a:effectRef idx="2">
+          <a:scrgbClr r="0" g="0" b="0"/>
+        </a:effectRef>
+        <a:fontRef idx="minor">
+          <a:schemeClr val="lt1"/>
+        </a:fontRef>
+      </dsp:style>
+    </dsp:sp>
+    <dsp:sp modelId="{C77B3E75-2756-422F-9A09-1FA1B0781B68}">
+      <dsp:nvSpPr>
+        <dsp:cNvPr id="0" name=""/>
+        <dsp:cNvSpPr/>
+      </dsp:nvSpPr>
+      <dsp:spPr>
+        <a:xfrm>
+          <a:off x="225071" y="3058459"/>
+          <a:ext cx="2392169" cy="720000"/>
+        </a:xfrm>
+        <a:prstGeom prst="rect">
+          <a:avLst/>
+        </a:prstGeom>
+        <a:noFill/>
+        <a:ln>
+          <a:noFill/>
+        </a:ln>
+        <a:effectLst/>
+      </dsp:spPr>
+      <dsp:style>
+        <a:lnRef idx="0">
+          <a:scrgbClr r="0" g="0" b="0"/>
+        </a:lnRef>
+        <a:fillRef idx="0">
+          <a:scrgbClr r="0" g="0" b="0"/>
+        </a:fillRef>
+        <a:effectRef idx="0">
+          <a:scrgbClr r="0" g="0" b="0"/>
+        </a:effectRef>
+        <a:fontRef idx="minor"/>
+      </dsp:style>
+      <dsp:txBody>
+        <a:bodyPr spcFirstLastPara="0" vert="horz" wrap="square" lIns="0" tIns="0" rIns="0" bIns="0" numCol="1" spcCol="1270" anchor="t" anchorCtr="0">
+          <a:noAutofit/>
+        </a:bodyPr>
+        <a:lstStyle/>
+        <a:p>
+          <a:pPr marL="0" lvl="0" indent="0" algn="ctr" defTabSz="800100">
+            <a:lnSpc>
+              <a:spcPct val="90000"/>
+            </a:lnSpc>
+            <a:spcBef>
+              <a:spcPct val="0"/>
+            </a:spcBef>
+            <a:spcAft>
+              <a:spcPct val="35000"/>
+            </a:spcAft>
+            <a:buNone/>
+            <a:defRPr cap="all"/>
+          </a:pPr>
+          <a:r>
+            <a:rPr lang="en-US" sz="1800" b="1" kern="1200"/>
+            <a:t>Prevent misdiagnosis</a:t>
+          </a:r>
+          <a:endParaRPr lang="en-US" sz="1800" kern="1200"/>
+        </a:p>
+      </dsp:txBody>
+      <dsp:txXfrm>
+        <a:off x="225071" y="3058459"/>
+        <a:ext cx="2392169" cy="720000"/>
+      </dsp:txXfrm>
+    </dsp:sp>
+    <dsp:sp modelId="{5B6EED2E-319D-40CE-BD9E-BB0D039C5844}">
+      <dsp:nvSpPr>
+        <dsp:cNvPr id="0" name=""/>
+        <dsp:cNvSpPr/>
+      </dsp:nvSpPr>
+      <dsp:spPr>
+        <a:xfrm>
+          <a:off x="3502343" y="1144723"/>
+          <a:ext cx="1459223" cy="1459223"/>
+        </a:xfrm>
+        <a:prstGeom prst="ellipse">
+          <a:avLst/>
+        </a:prstGeom>
+        <a:solidFill>
+          <a:schemeClr val="accent3">
+            <a:hueOff val="0"/>
+            <a:satOff val="0"/>
+            <a:lumOff val="0"/>
+            <a:alphaOff val="0"/>
+          </a:schemeClr>
+        </a:solidFill>
+        <a:ln>
+          <a:noFill/>
+        </a:ln>
+        <a:effectLst>
+          <a:outerShdw blurRad="38100" dist="25400" dir="5400000" rotWithShape="0">
+            <a:srgbClr val="000000">
+              <a:alpha val="35000"/>
+            </a:srgbClr>
+          </a:outerShdw>
+        </a:effectLst>
+      </dsp:spPr>
+      <dsp:style>
+        <a:lnRef idx="0">
+          <a:scrgbClr r="0" g="0" b="0"/>
+        </a:lnRef>
+        <a:fillRef idx="1">
+          <a:scrgbClr r="0" g="0" b="0"/>
+        </a:fillRef>
+        <a:effectRef idx="2">
+          <a:scrgbClr r="0" g="0" b="0"/>
+        </a:effectRef>
+        <a:fontRef idx="minor"/>
+      </dsp:style>
+    </dsp:sp>
+    <dsp:sp modelId="{EDC8D796-F59C-4E2F-8673-AF5728D244E2}">
+      <dsp:nvSpPr>
+        <dsp:cNvPr id="0" name=""/>
+        <dsp:cNvSpPr/>
+      </dsp:nvSpPr>
+      <dsp:spPr>
+        <a:xfrm>
+          <a:off x="3813325" y="1455705"/>
+          <a:ext cx="837259" cy="837259"/>
+        </a:xfrm>
+        <a:prstGeom prst="rect">
+          <a:avLst/>
+        </a:prstGeom>
+        <a:blipFill>
+          <a:blip xmlns:r="http://schemas.openxmlformats.org/officeDocument/2006/relationships" r:embed="rId3">
+            <a:extLst>
+              <a:ext uri="{28A0092B-C50C-407E-A947-70E740481C1C}">
+                <a14:useLocalDpi xmlns:a14="http://schemas.microsoft.com/office/drawing/2010/main" val="0"/>
+              </a:ext>
+              <a:ext uri="{96DAC541-7B7A-43D3-8B79-37D633B846F1}">
+                <asvg:svgBlip xmlns:asvg="http://schemas.microsoft.com/office/drawing/2016/SVG/main" r:embed="rId4"/>
+              </a:ext>
+            </a:extLst>
+          </a:blip>
+          <a:stretch>
+            <a:fillRect/>
+          </a:stretch>
+        </a:blipFill>
+        <a:ln>
+          <a:noFill/>
+        </a:ln>
+        <a:effectLst>
+          <a:outerShdw blurRad="38100" dist="25400" dir="5400000" rotWithShape="0">
+            <a:srgbClr val="000000">
+              <a:alpha val="35000"/>
+            </a:srgbClr>
+          </a:outerShdw>
+        </a:effectLst>
+      </dsp:spPr>
+      <dsp:style>
+        <a:lnRef idx="0">
+          <a:scrgbClr r="0" g="0" b="0"/>
+        </a:lnRef>
+        <a:fillRef idx="3">
+          <a:scrgbClr r="0" g="0" b="0"/>
+        </a:fillRef>
+        <a:effectRef idx="2">
+          <a:scrgbClr r="0" g="0" b="0"/>
+        </a:effectRef>
+        <a:fontRef idx="minor">
+          <a:schemeClr val="lt1"/>
+        </a:fontRef>
+      </dsp:style>
+    </dsp:sp>
+    <dsp:sp modelId="{3BC6E46A-E9AF-4645-8880-CA2D7C35F41D}">
+      <dsp:nvSpPr>
+        <dsp:cNvPr id="0" name=""/>
+        <dsp:cNvSpPr/>
+      </dsp:nvSpPr>
+      <dsp:spPr>
+        <a:xfrm>
+          <a:off x="3035870" y="3058459"/>
+          <a:ext cx="2392169" cy="720000"/>
+        </a:xfrm>
+        <a:prstGeom prst="rect">
+          <a:avLst/>
+        </a:prstGeom>
+        <a:noFill/>
+        <a:ln>
+          <a:noFill/>
+        </a:ln>
+        <a:effectLst/>
+      </dsp:spPr>
+      <dsp:style>
+        <a:lnRef idx="0">
+          <a:scrgbClr r="0" g="0" b="0"/>
+        </a:lnRef>
+        <a:fillRef idx="0">
+          <a:scrgbClr r="0" g="0" b="0"/>
+        </a:fillRef>
+        <a:effectRef idx="0">
+          <a:scrgbClr r="0" g="0" b="0"/>
+        </a:effectRef>
+        <a:fontRef idx="minor"/>
+      </dsp:style>
+      <dsp:txBody>
+        <a:bodyPr spcFirstLastPara="0" vert="horz" wrap="square" lIns="0" tIns="0" rIns="0" bIns="0" numCol="1" spcCol="1270" anchor="t" anchorCtr="0">
+          <a:noAutofit/>
+        </a:bodyPr>
+        <a:lstStyle/>
+        <a:p>
+          <a:pPr marL="0" lvl="0" indent="0" algn="ctr" defTabSz="800100">
+            <a:lnSpc>
+              <a:spcPct val="90000"/>
+            </a:lnSpc>
+            <a:spcBef>
+              <a:spcPct val="0"/>
+            </a:spcBef>
+            <a:spcAft>
+              <a:spcPct val="35000"/>
+            </a:spcAft>
+            <a:buNone/>
+            <a:defRPr cap="all"/>
+          </a:pPr>
+          <a:r>
+            <a:rPr lang="en-US" sz="1800" b="1" kern="1200"/>
+            <a:t>Have better reach</a:t>
+          </a:r>
+          <a:endParaRPr lang="en-US" sz="1800" kern="1200"/>
+        </a:p>
+      </dsp:txBody>
+      <dsp:txXfrm>
+        <a:off x="3035870" y="3058459"/>
+        <a:ext cx="2392169" cy="720000"/>
+      </dsp:txXfrm>
+    </dsp:sp>
+    <dsp:sp modelId="{F27082C1-ED57-456E-86C9-094BDA52B4ED}">
+      <dsp:nvSpPr>
+        <dsp:cNvPr id="0" name=""/>
+        <dsp:cNvSpPr/>
+      </dsp:nvSpPr>
+      <dsp:spPr>
+        <a:xfrm>
+          <a:off x="6313142" y="1144723"/>
+          <a:ext cx="1459223" cy="1459223"/>
+        </a:xfrm>
+        <a:prstGeom prst="ellipse">
+          <a:avLst/>
+        </a:prstGeom>
+        <a:solidFill>
+          <a:schemeClr val="accent4">
+            <a:hueOff val="0"/>
+            <a:satOff val="0"/>
+            <a:lumOff val="0"/>
+            <a:alphaOff val="0"/>
+          </a:schemeClr>
+        </a:solidFill>
+        <a:ln>
+          <a:noFill/>
+        </a:ln>
+        <a:effectLst>
+          <a:outerShdw blurRad="38100" dist="25400" dir="5400000" rotWithShape="0">
+            <a:srgbClr val="000000">
+              <a:alpha val="35000"/>
+            </a:srgbClr>
+          </a:outerShdw>
+        </a:effectLst>
+      </dsp:spPr>
+      <dsp:style>
+        <a:lnRef idx="0">
+          <a:scrgbClr r="0" g="0" b="0"/>
+        </a:lnRef>
+        <a:fillRef idx="1">
+          <a:scrgbClr r="0" g="0" b="0"/>
+        </a:fillRef>
+        <a:effectRef idx="2">
+          <a:scrgbClr r="0" g="0" b="0"/>
+        </a:effectRef>
+        <a:fontRef idx="minor"/>
+      </dsp:style>
+    </dsp:sp>
+    <dsp:sp modelId="{F6351F1A-92A4-40E8-A58E-1B202A5BA93E}">
+      <dsp:nvSpPr>
+        <dsp:cNvPr id="0" name=""/>
+        <dsp:cNvSpPr/>
+      </dsp:nvSpPr>
+      <dsp:spPr>
+        <a:xfrm>
+          <a:off x="6624124" y="1455705"/>
+          <a:ext cx="837259" cy="837259"/>
+        </a:xfrm>
+        <a:prstGeom prst="rect">
+          <a:avLst/>
+        </a:prstGeom>
+        <a:blipFill>
+          <a:blip xmlns:r="http://schemas.openxmlformats.org/officeDocument/2006/relationships" r:embed="rId5">
+            <a:extLst>
+              <a:ext uri="{28A0092B-C50C-407E-A947-70E740481C1C}">
+                <a14:useLocalDpi xmlns:a14="http://schemas.microsoft.com/office/drawing/2010/main" val="0"/>
+              </a:ext>
+              <a:ext uri="{96DAC541-7B7A-43D3-8B79-37D633B846F1}">
+                <asvg:svgBlip xmlns:asvg="http://schemas.microsoft.com/office/drawing/2016/SVG/main" r:embed="rId6"/>
+              </a:ext>
+            </a:extLst>
+          </a:blip>
+          <a:stretch>
+            <a:fillRect/>
+          </a:stretch>
+        </a:blipFill>
+        <a:ln>
+          <a:noFill/>
+        </a:ln>
+        <a:effectLst>
+          <a:outerShdw blurRad="38100" dist="25400" dir="5400000" rotWithShape="0">
+            <a:srgbClr val="000000">
+              <a:alpha val="35000"/>
+            </a:srgbClr>
+          </a:outerShdw>
+        </a:effectLst>
+      </dsp:spPr>
+      <dsp:style>
+        <a:lnRef idx="0">
+          <a:scrgbClr r="0" g="0" b="0"/>
+        </a:lnRef>
+        <a:fillRef idx="3">
+          <a:scrgbClr r="0" g="0" b="0"/>
+        </a:fillRef>
+        <a:effectRef idx="2">
+          <a:scrgbClr r="0" g="0" b="0"/>
+        </a:effectRef>
+        <a:fontRef idx="minor">
+          <a:schemeClr val="lt1"/>
+        </a:fontRef>
+      </dsp:style>
+    </dsp:sp>
+    <dsp:sp modelId="{03965086-78AE-4CE2-B0DC-D7E308B5D03A}">
+      <dsp:nvSpPr>
+        <dsp:cNvPr id="0" name=""/>
+        <dsp:cNvSpPr/>
+      </dsp:nvSpPr>
+      <dsp:spPr>
+        <a:xfrm>
+          <a:off x="5846669" y="3058459"/>
+          <a:ext cx="2392169" cy="720000"/>
+        </a:xfrm>
+        <a:prstGeom prst="rect">
+          <a:avLst/>
+        </a:prstGeom>
+        <a:noFill/>
+        <a:ln>
+          <a:noFill/>
+        </a:ln>
+        <a:effectLst/>
+      </dsp:spPr>
+      <dsp:style>
+        <a:lnRef idx="0">
+          <a:scrgbClr r="0" g="0" b="0"/>
+        </a:lnRef>
+        <a:fillRef idx="0">
+          <a:scrgbClr r="0" g="0" b="0"/>
+        </a:fillRef>
+        <a:effectRef idx="0">
+          <a:scrgbClr r="0" g="0" b="0"/>
+        </a:effectRef>
+        <a:fontRef idx="minor"/>
+      </dsp:style>
+      <dsp:txBody>
+        <a:bodyPr spcFirstLastPara="0" vert="horz" wrap="square" lIns="0" tIns="0" rIns="0" bIns="0" numCol="1" spcCol="1270" anchor="t" anchorCtr="0">
+          <a:noAutofit/>
+        </a:bodyPr>
+        <a:lstStyle/>
+        <a:p>
+          <a:pPr marL="0" lvl="0" indent="0" algn="ctr" defTabSz="800100">
+            <a:lnSpc>
+              <a:spcPct val="90000"/>
+            </a:lnSpc>
+            <a:spcBef>
+              <a:spcPct val="0"/>
+            </a:spcBef>
+            <a:spcAft>
+              <a:spcPct val="35000"/>
+            </a:spcAft>
+            <a:buNone/>
+            <a:defRPr cap="all"/>
+          </a:pPr>
+          <a:r>
+            <a:rPr lang="en-US" sz="1800" b="1" kern="1200"/>
+            <a:t>Engage users better</a:t>
+          </a:r>
+          <a:endParaRPr lang="en-US" sz="1800" kern="1200"/>
+        </a:p>
+      </dsp:txBody>
+      <dsp:txXfrm>
+        <a:off x="5846669" y="3058459"/>
+        <a:ext cx="2392169" cy="720000"/>
+      </dsp:txXfrm>
+    </dsp:sp>
+    <dsp:sp modelId="{36EB5DBC-54D8-4B75-BC2A-4B27518BD5EA}">
+      <dsp:nvSpPr>
+        <dsp:cNvPr id="0" name=""/>
+        <dsp:cNvSpPr/>
+      </dsp:nvSpPr>
+      <dsp:spPr>
+        <a:xfrm>
+          <a:off x="9123941" y="1144723"/>
+          <a:ext cx="1459223" cy="1459223"/>
+        </a:xfrm>
+        <a:prstGeom prst="ellipse">
+          <a:avLst/>
+        </a:prstGeom>
+        <a:solidFill>
+          <a:schemeClr val="accent5">
+            <a:hueOff val="0"/>
+            <a:satOff val="0"/>
+            <a:lumOff val="0"/>
+            <a:alphaOff val="0"/>
+          </a:schemeClr>
+        </a:solidFill>
+        <a:ln>
+          <a:noFill/>
+        </a:ln>
+        <a:effectLst>
+          <a:outerShdw blurRad="38100" dist="25400" dir="5400000" rotWithShape="0">
+            <a:srgbClr val="000000">
+              <a:alpha val="35000"/>
+            </a:srgbClr>
+          </a:outerShdw>
+        </a:effectLst>
+      </dsp:spPr>
+      <dsp:style>
+        <a:lnRef idx="0">
+          <a:scrgbClr r="0" g="0" b="0"/>
+        </a:lnRef>
+        <a:fillRef idx="1">
+          <a:scrgbClr r="0" g="0" b="0"/>
+        </a:fillRef>
+        <a:effectRef idx="2">
+          <a:scrgbClr r="0" g="0" b="0"/>
+        </a:effectRef>
+        <a:fontRef idx="minor"/>
+      </dsp:style>
+    </dsp:sp>
+    <dsp:sp modelId="{470641A0-D73E-4CB0-8CB2-D57DF58CDE4F}">
+      <dsp:nvSpPr>
+        <dsp:cNvPr id="0" name=""/>
+        <dsp:cNvSpPr/>
+      </dsp:nvSpPr>
+      <dsp:spPr>
+        <a:xfrm>
+          <a:off x="9434923" y="1455705"/>
+          <a:ext cx="837259" cy="837259"/>
+        </a:xfrm>
+        <a:prstGeom prst="rect">
+          <a:avLst/>
+        </a:prstGeom>
+        <a:blipFill>
+          <a:blip xmlns:r="http://schemas.openxmlformats.org/officeDocument/2006/relationships" r:embed="rId7">
+            <a:extLst>
+              <a:ext uri="{28A0092B-C50C-407E-A947-70E740481C1C}">
+                <a14:useLocalDpi xmlns:a14="http://schemas.microsoft.com/office/drawing/2010/main" val="0"/>
+              </a:ext>
+              <a:ext uri="{96DAC541-7B7A-43D3-8B79-37D633B846F1}">
+                <asvg:svgBlip xmlns:asvg="http://schemas.microsoft.com/office/drawing/2016/SVG/main" r:embed="rId8"/>
+              </a:ext>
+            </a:extLst>
+          </a:blip>
+          <a:stretch>
+            <a:fillRect/>
+          </a:stretch>
+        </a:blipFill>
+        <a:ln>
+          <a:noFill/>
+        </a:ln>
+        <a:effectLst>
+          <a:outerShdw blurRad="38100" dist="25400" dir="5400000" rotWithShape="0">
+            <a:srgbClr val="000000">
+              <a:alpha val="35000"/>
+            </a:srgbClr>
+          </a:outerShdw>
+        </a:effectLst>
+      </dsp:spPr>
+      <dsp:style>
+        <a:lnRef idx="0">
+          <a:scrgbClr r="0" g="0" b="0"/>
+        </a:lnRef>
+        <a:fillRef idx="3">
+          <a:scrgbClr r="0" g="0" b="0"/>
+        </a:fillRef>
+        <a:effectRef idx="2">
+          <a:scrgbClr r="0" g="0" b="0"/>
+        </a:effectRef>
+        <a:fontRef idx="minor">
+          <a:schemeClr val="lt1"/>
+        </a:fontRef>
+      </dsp:style>
+    </dsp:sp>
+    <dsp:sp modelId="{77FFBDED-4A88-44C9-8537-1003F33AB576}">
+      <dsp:nvSpPr>
+        <dsp:cNvPr id="0" name=""/>
+        <dsp:cNvSpPr/>
+      </dsp:nvSpPr>
+      <dsp:spPr>
+        <a:xfrm>
+          <a:off x="8657468" y="3058459"/>
+          <a:ext cx="2392169" cy="720000"/>
+        </a:xfrm>
+        <a:prstGeom prst="rect">
+          <a:avLst/>
+        </a:prstGeom>
+        <a:noFill/>
+        <a:ln>
+          <a:noFill/>
+        </a:ln>
+        <a:effectLst/>
+      </dsp:spPr>
+      <dsp:style>
+        <a:lnRef idx="0">
+          <a:scrgbClr r="0" g="0" b="0"/>
+        </a:lnRef>
+        <a:fillRef idx="0">
+          <a:scrgbClr r="0" g="0" b="0"/>
+        </a:fillRef>
+        <a:effectRef idx="0">
+          <a:scrgbClr r="0" g="0" b="0"/>
+        </a:effectRef>
+        <a:fontRef idx="minor"/>
+      </dsp:style>
+      <dsp:txBody>
+        <a:bodyPr spcFirstLastPara="0" vert="horz" wrap="square" lIns="0" tIns="0" rIns="0" bIns="0" numCol="1" spcCol="1270" anchor="t" anchorCtr="0">
+          <a:noAutofit/>
+        </a:bodyPr>
+        <a:lstStyle/>
+        <a:p>
+          <a:pPr marL="0" lvl="0" indent="0" algn="ctr" defTabSz="800100">
+            <a:lnSpc>
+              <a:spcPct val="90000"/>
+            </a:lnSpc>
+            <a:spcBef>
+              <a:spcPct val="0"/>
+            </a:spcBef>
+            <a:spcAft>
+              <a:spcPct val="35000"/>
+            </a:spcAft>
+            <a:buNone/>
+            <a:defRPr cap="all"/>
+          </a:pPr>
+          <a:r>
+            <a:rPr lang="en-US" sz="1800" b="1" kern="1200"/>
+            <a:t>Provide extremely unique insight into responses</a:t>
+          </a:r>
+          <a:endParaRPr lang="en-US" sz="1800" kern="1200"/>
+        </a:p>
+      </dsp:txBody>
+      <dsp:txXfrm>
+        <a:off x="8657468" y="3058459"/>
+        <a:ext cx="2392169" cy="720000"/>
+      </dsp:txXfrm>
+    </dsp:sp>
+  </dsp:spTree>
+</dsp:drawing>
+</file>
+
 <file path=ppt/diagrams/layout1.xml><?xml version="1.0" encoding="utf-8"?>
 <dgm:layoutDef xmlns:dgm="http://schemas.openxmlformats.org/drawingml/2006/diagram" xmlns:a="http://schemas.openxmlformats.org/drawingml/2006/main" uniqueId="urn:microsoft.com/office/officeart/2016/7/layout/VerticalSolidActionList">
   <dgm:title val="Vertical Solid Action List"/>
@@ -6489,6 +8503,221 @@
 </dgm:layoutDef>
 </file>
 
+<file path=ppt/diagrams/layout4.xml><?xml version="1.0" encoding="utf-8"?>
+<dgm:layoutDef xmlns:dgm="http://schemas.openxmlformats.org/drawingml/2006/diagram" xmlns:a="http://schemas.openxmlformats.org/drawingml/2006/main" uniqueId="urn:microsoft.com/office/officeart/2018/5/layout/IconCircleLabelList">
+  <dgm:title val="Icon Circle Label List"/>
+  <dgm:desc val="Use to show non-sequential or grouped chunks of information accompanied by a related visuals. Works best with icons or small pictures with short text captions."/>
+  <dgm:catLst>
+    <dgm:cat type="icon" pri="500"/>
+  </dgm:catLst>
+  <dgm:sampData useDef="1">
+    <dgm:dataModel>
+      <dgm:ptLst/>
+      <dgm:bg/>
+      <dgm:whole/>
+    </dgm:dataModel>
+  </dgm:sampData>
+  <dgm:styleData useDef="1">
+    <dgm:dataModel>
+      <dgm:ptLst/>
+      <dgm:bg/>
+      <dgm:whole/>
+    </dgm:dataModel>
+  </dgm:styleData>
+  <dgm:clrData useDef="1">
+    <dgm:dataModel>
+      <dgm:ptLst/>
+      <dgm:bg/>
+      <dgm:whole/>
+    </dgm:dataModel>
+  </dgm:clrData>
+  <dgm:layoutNode name="root">
+    <dgm:varLst>
+      <dgm:dir/>
+      <dgm:resizeHandles val="exact"/>
+    </dgm:varLst>
+    <dgm:choose name="Name0">
+      <dgm:if name="Name1" axis="self" func="var" arg="dir" op="equ" val="norm">
+        <dgm:alg type="snake">
+          <dgm:param type="grDir" val="tL"/>
+          <dgm:param type="flowDir" val="row"/>
+          <dgm:param type="contDir" val="sameDir"/>
+          <dgm:param type="off" val="ctr"/>
+          <dgm:param type="vertAlign" val="mid"/>
+          <dgm:param type="horzAlign" val="ctr"/>
+        </dgm:alg>
+      </dgm:if>
+      <dgm:else name="Name2">
+        <dgm:alg type="snake">
+          <dgm:param type="grDir" val="tR"/>
+          <dgm:param type="flowDir" val="row"/>
+          <dgm:param type="contDir" val="sameDir"/>
+          <dgm:param type="off" val="ctr"/>
+          <dgm:param type="vertAlign" val="mid"/>
+          <dgm:param type="horzAlign" val="ctr"/>
+        </dgm:alg>
+      </dgm:else>
+    </dgm:choose>
+    <dgm:shape xmlns:r="http://schemas.openxmlformats.org/officeDocument/2006/relationships" r:blip="">
+      <dgm:adjLst/>
+    </dgm:shape>
+    <dgm:presOf/>
+    <dgm:choose name="Name3">
+      <dgm:if name="Name4" axis="ch" ptType="node" func="cnt" op="lte" val="2">
+        <dgm:constrLst>
+          <dgm:constr type="h" for="ch" forName="compNode" refType="h" fact="0.4"/>
+          <dgm:constr type="w" for="ch" forName="compNode" val="100"/>
+          <dgm:constr type="w" for="ch" forName="sibTrans" refType="w" refFor="ch" refForName="compNode" fact="0.175"/>
+          <dgm:constr type="sp" refType="w" refFor="ch" refForName="compNode" op="equ" fact="0.25"/>
+          <dgm:constr type="primFontSz" for="des" ptType="node" op="equ" val="44"/>
+          <dgm:constr type="h" for="des" forName="compNode" op="equ"/>
+          <dgm:constr type="h" for="des" forName="textRect" op="equ"/>
+        </dgm:constrLst>
+      </dgm:if>
+      <dgm:if name="Name5" axis="ch" ptType="node" func="cnt" op="lte" val="3">
+        <dgm:constrLst>
+          <dgm:constr type="h" for="ch" forName="compNode" refType="h" fact="0.4"/>
+          <dgm:constr type="w" for="ch" forName="compNode" val="100"/>
+          <dgm:constr type="w" for="ch" forName="sibTrans" refType="w" refFor="ch" refForName="compNode" fact="0.175"/>
+          <dgm:constr type="sp" refType="w" refFor="ch" refForName="compNode" op="equ" fact="0.25"/>
+          <dgm:constr type="primFontSz" for="des" ptType="node" op="equ" val="40"/>
+          <dgm:constr type="h" for="des" forName="compNode" op="equ"/>
+          <dgm:constr type="h" for="des" forName="textRect" op="equ"/>
+        </dgm:constrLst>
+      </dgm:if>
+      <dgm:if name="Name6" axis="ch" ptType="node" func="cnt" op="lte" val="4">
+        <dgm:constrLst>
+          <dgm:constr type="h" for="ch" forName="compNode" refType="h" fact="0.4"/>
+          <dgm:constr type="w" for="ch" forName="compNode" refType="w"/>
+          <dgm:constr type="w" for="ch" forName="sibTrans" refType="w" refFor="ch" refForName="compNode" fact="0.175"/>
+          <dgm:constr type="sp" refType="w" refFor="ch" refForName="compNode" op="equ" fact="0.25"/>
+          <dgm:constr type="primFontSz" for="des" ptType="node" op="equ" val="32"/>
+          <dgm:constr type="h" for="des" forName="compNode" op="equ"/>
+          <dgm:constr type="h" for="des" forName="textRect" op="equ"/>
+        </dgm:constrLst>
+      </dgm:if>
+      <dgm:else name="Name7">
+        <dgm:constrLst>
+          <dgm:constr type="h" for="ch" forName="compNode" refType="h" fact="0.4"/>
+          <dgm:constr type="w" for="ch" forName="compNode" refType="w"/>
+          <dgm:constr type="w" for="ch" forName="sibTrans" refType="w" refFor="ch" refForName="compNode" fact="0.175"/>
+          <dgm:constr type="sp" refType="w" refFor="ch" refForName="compNode" op="equ" fact="0.25"/>
+          <dgm:constr type="primFontSz" for="des" ptType="node" op="equ" val="24"/>
+          <dgm:constr type="h" for="des" forName="compNode" op="equ"/>
+          <dgm:constr type="h" for="des" forName="textRect" op="equ"/>
+        </dgm:constrLst>
+      </dgm:else>
+    </dgm:choose>
+    <dgm:ruleLst>
+      <dgm:rule type="w" for="ch" forName="compNode" val="50" fact="NaN" max="NaN"/>
+    </dgm:ruleLst>
+    <dgm:forEach name="Name8" axis="ch" ptType="node">
+      <dgm:layoutNode name="compNode">
+        <dgm:alg type="composite"/>
+        <dgm:shape xmlns:r="http://schemas.openxmlformats.org/officeDocument/2006/relationships" r:blip="">
+          <dgm:adjLst/>
+        </dgm:shape>
+        <dgm:presOf axis="self"/>
+        <dgm:constrLst>
+          <dgm:constr type="w" for="ch" forName="iconBgRect" refType="w" fact="0.61"/>
+          <dgm:constr type="h" for="ch" forName="iconBgRect" refType="w" refFor="ch" refForName="iconBgRect"/>
+          <dgm:constr type="t" for="ch" forName="iconBgRect"/>
+          <dgm:constr type="ctrX" for="ch" forName="iconBgRect" refType="w" fact="0.5"/>
+          <dgm:constr type="w" for="ch" forName="iconRect" refType="w" fact="0.35"/>
+          <dgm:constr type="h" for="ch" forName="iconRect" refType="w" refFor="ch" refForName="iconRect"/>
+          <dgm:constr type="ctrX" for="ch" forName="iconRect" refType="ctrX" refFor="ch" refForName="iconBgRect"/>
+          <dgm:constr type="ctrY" for="ch" forName="iconRect" refType="ctrY" refFor="ch" refForName="iconBgRect"/>
+          <dgm:constr type="h" for="ch" forName="spaceRect" refType="w" fact="0.19"/>
+          <dgm:constr type="w" for="ch" forName="spaceRect" refType="w"/>
+          <dgm:constr type="l" for="ch" forName="spaceRect"/>
+          <dgm:constr type="t" for="ch" forName="spaceRect" refType="b" refFor="ch" refForName="iconBgRect"/>
+          <dgm:constr type="h" for="ch" forName="textRect" val="20"/>
+          <dgm:constr type="w" for="ch" forName="textRect" refType="w"/>
+          <dgm:constr type="l" for="ch" forName="textRect"/>
+          <dgm:constr type="t" for="ch" forName="textRect" refType="b" refFor="ch" refForName="spaceRect"/>
+        </dgm:constrLst>
+        <dgm:ruleLst>
+          <dgm:rule type="h" val="INF" fact="NaN" max="NaN"/>
+        </dgm:ruleLst>
+        <dgm:layoutNode name="iconBgRect" styleLbl="bgShp">
+          <dgm:alg type="sp"/>
+          <dgm:shape xmlns:r="http://schemas.openxmlformats.org/officeDocument/2006/relationships" type="ellipse" r:blip="">
+            <dgm:adjLst/>
+          </dgm:shape>
+          <dgm:presOf/>
+          <dgm:constrLst/>
+          <dgm:ruleLst/>
+        </dgm:layoutNode>
+        <dgm:layoutNode name="iconRect" styleLbl="node1">
+          <dgm:alg type="sp"/>
+          <dgm:shape xmlns:r="http://schemas.openxmlformats.org/officeDocument/2006/relationships" type="rect" r:blip="" blipPhldr="1">
+            <dgm:adjLst/>
+          </dgm:shape>
+          <dgm:presOf/>
+          <dgm:constrLst/>
+          <dgm:ruleLst/>
+        </dgm:layoutNode>
+        <dgm:layoutNode name="spaceRect">
+          <dgm:alg type="sp"/>
+          <dgm:shape xmlns:r="http://schemas.openxmlformats.org/officeDocument/2006/relationships" r:blip="">
+            <dgm:adjLst/>
+          </dgm:shape>
+          <dgm:presOf/>
+          <dgm:constrLst/>
+          <dgm:ruleLst/>
+        </dgm:layoutNode>
+        <dgm:layoutNode name="textRect" styleLbl="revTx">
+          <dgm:varLst>
+            <dgm:chMax val="1"/>
+            <dgm:chPref val="1"/>
+          </dgm:varLst>
+          <dgm:alg type="tx">
+            <dgm:param type="txAnchorVert" val="t"/>
+          </dgm:alg>
+          <dgm:shape xmlns:r="http://schemas.openxmlformats.org/officeDocument/2006/relationships" type="rect" r:blip="">
+            <dgm:adjLst/>
+          </dgm:shape>
+          <dgm:presOf axis="self" ptType="node"/>
+          <dgm:constrLst>
+            <dgm:constr type="lMarg"/>
+            <dgm:constr type="rMarg"/>
+            <dgm:constr type="tMarg"/>
+            <dgm:constr type="bMarg"/>
+          </dgm:constrLst>
+          <dgm:ruleLst>
+            <dgm:rule type="primFontSz" val="11" fact="NaN" max="NaN"/>
+            <dgm:rule type="h" val="INF" fact="NaN" max="NaN"/>
+          </dgm:ruleLst>
+        </dgm:layoutNode>
+      </dgm:layoutNode>
+      <dgm:forEach name="Name9" axis="followSib" ptType="sibTrans" cnt="1">
+        <dgm:layoutNode name="sibTrans">
+          <dgm:alg type="sp"/>
+          <dgm:shape xmlns:r="http://schemas.openxmlformats.org/officeDocument/2006/relationships" r:blip="">
+            <dgm:adjLst/>
+          </dgm:shape>
+          <dgm:presOf axis="self"/>
+          <dgm:constrLst/>
+          <dgm:ruleLst/>
+        </dgm:layoutNode>
+      </dgm:forEach>
+    </dgm:forEach>
+  </dgm:layoutNode>
+  <dgm:extLst>
+    <a:ext uri="{68A01E43-0DF5-4B5B-8FA6-DAF915123BFB}">
+      <dgm1612:lstStyle xmlns:dgm1612="http://schemas.microsoft.com/office/drawing/2016/12/diagram">
+        <a:lvl1pPr>
+          <a:lnSpc>
+            <a:spcPct val="100000"/>
+          </a:lnSpc>
+          <a:defRPr cap="all"/>
+        </a:lvl1pPr>
+      </dgm1612:lstStyle>
+    </a:ext>
+  </dgm:extLst>
+</dgm:layoutDef>
+</file>
+
 <file path=ppt/diagrams/quickStyle1.xml><?xml version="1.0" encoding="utf-8"?>
 <dgm:styleDef xmlns:dgm="http://schemas.openxmlformats.org/drawingml/2006/diagram" xmlns:a="http://schemas.openxmlformats.org/drawingml/2006/main" uniqueId="urn:microsoft.com/office/officeart/2005/8/quickstyle/simple3">
   <dgm:title val=""/>
@@ -8584,6 +10813,1040 @@
 </file>
 
 <file path=ppt/diagrams/quickStyle3.xml><?xml version="1.0" encoding="utf-8"?>
+<dgm:styleDef xmlns:dgm="http://schemas.openxmlformats.org/drawingml/2006/diagram" xmlns:a="http://schemas.openxmlformats.org/drawingml/2006/main" uniqueId="urn:microsoft.com/office/officeart/2005/8/quickstyle/simple4">
+  <dgm:title val=""/>
+  <dgm:desc val=""/>
+  <dgm:catLst>
+    <dgm:cat type="simple" pri="10400"/>
+  </dgm:catLst>
+  <dgm:scene3d>
+    <a:camera prst="orthographicFront"/>
+    <a:lightRig rig="threePt" dir="t"/>
+  </dgm:scene3d>
+  <dgm:styleLbl name="node0">
+    <dgm:scene3d>
+      <a:camera prst="orthographicFront"/>
+      <a:lightRig rig="threePt" dir="t"/>
+    </dgm:scene3d>
+    <dgm:sp3d/>
+    <dgm:txPr/>
+    <dgm:style>
+      <a:lnRef idx="0">
+        <a:scrgbClr r="0" g="0" b="0"/>
+      </a:lnRef>
+      <a:fillRef idx="3">
+        <a:scrgbClr r="0" g="0" b="0"/>
+      </a:fillRef>
+      <a:effectRef idx="2">
+        <a:scrgbClr r="0" g="0" b="0"/>
+      </a:effectRef>
+      <a:fontRef idx="minor">
+        <a:schemeClr val="lt1"/>
+      </a:fontRef>
+    </dgm:style>
+  </dgm:styleLbl>
+  <dgm:styleLbl name="lnNode1">
+    <dgm:scene3d>
+      <a:camera prst="orthographicFront"/>
+      <a:lightRig rig="threePt" dir="t"/>
+    </dgm:scene3d>
+    <dgm:sp3d/>
+    <dgm:txPr/>
+    <dgm:style>
+      <a:lnRef idx="1">
+        <a:scrgbClr r="0" g="0" b="0"/>
+      </a:lnRef>
+      <a:fillRef idx="3">
+        <a:scrgbClr r="0" g="0" b="0"/>
+      </a:fillRef>
+      <a:effectRef idx="2">
+        <a:scrgbClr r="0" g="0" b="0"/>
+      </a:effectRef>
+      <a:fontRef idx="minor">
+        <a:schemeClr val="lt1"/>
+      </a:fontRef>
+    </dgm:style>
+  </dgm:styleLbl>
+  <dgm:styleLbl name="vennNode1">
+    <dgm:scene3d>
+      <a:camera prst="orthographicFront"/>
+      <a:lightRig rig="threePt" dir="t"/>
+    </dgm:scene3d>
+    <dgm:sp3d/>
+    <dgm:txPr/>
+    <dgm:style>
+      <a:lnRef idx="0">
+        <a:scrgbClr r="0" g="0" b="0"/>
+      </a:lnRef>
+      <a:fillRef idx="3">
+        <a:scrgbClr r="0" g="0" b="0"/>
+      </a:fillRef>
+      <a:effectRef idx="0">
+        <a:scrgbClr r="0" g="0" b="0"/>
+      </a:effectRef>
+      <a:fontRef idx="minor">
+        <a:schemeClr val="tx1"/>
+      </a:fontRef>
+    </dgm:style>
+  </dgm:styleLbl>
+  <dgm:styleLbl name="alignNode1">
+    <dgm:scene3d>
+      <a:camera prst="orthographicFront"/>
+      <a:lightRig rig="threePt" dir="t"/>
+    </dgm:scene3d>
+    <dgm:sp3d/>
+    <dgm:txPr/>
+    <dgm:style>
+      <a:lnRef idx="1">
+        <a:scrgbClr r="0" g="0" b="0"/>
+      </a:lnRef>
+      <a:fillRef idx="3">
+        <a:scrgbClr r="0" g="0" b="0"/>
+      </a:fillRef>
+      <a:effectRef idx="2">
+        <a:scrgbClr r="0" g="0" b="0"/>
+      </a:effectRef>
+      <a:fontRef idx="minor">
+        <a:schemeClr val="lt1"/>
+      </a:fontRef>
+    </dgm:style>
+  </dgm:styleLbl>
+  <dgm:styleLbl name="node1">
+    <dgm:scene3d>
+      <a:camera prst="orthographicFront"/>
+      <a:lightRig rig="threePt" dir="t"/>
+    </dgm:scene3d>
+    <dgm:sp3d/>
+    <dgm:txPr/>
+    <dgm:style>
+      <a:lnRef idx="0">
+        <a:scrgbClr r="0" g="0" b="0"/>
+      </a:lnRef>
+      <a:fillRef idx="3">
+        <a:scrgbClr r="0" g="0" b="0"/>
+      </a:fillRef>
+      <a:effectRef idx="2">
+        <a:scrgbClr r="0" g="0" b="0"/>
+      </a:effectRef>
+      <a:fontRef idx="minor">
+        <a:schemeClr val="lt1"/>
+      </a:fontRef>
+    </dgm:style>
+  </dgm:styleLbl>
+  <dgm:styleLbl name="node2">
+    <dgm:scene3d>
+      <a:camera prst="orthographicFront"/>
+      <a:lightRig rig="threePt" dir="t"/>
+    </dgm:scene3d>
+    <dgm:sp3d/>
+    <dgm:txPr/>
+    <dgm:style>
+      <a:lnRef idx="0">
+        <a:scrgbClr r="0" g="0" b="0"/>
+      </a:lnRef>
+      <a:fillRef idx="3">
+        <a:scrgbClr r="0" g="0" b="0"/>
+      </a:fillRef>
+      <a:effectRef idx="2">
+        <a:scrgbClr r="0" g="0" b="0"/>
+      </a:effectRef>
+      <a:fontRef idx="minor">
+        <a:schemeClr val="lt1"/>
+      </a:fontRef>
+    </dgm:style>
+  </dgm:styleLbl>
+  <dgm:styleLbl name="node3">
+    <dgm:scene3d>
+      <a:camera prst="orthographicFront"/>
+      <a:lightRig rig="threePt" dir="t"/>
+    </dgm:scene3d>
+    <dgm:sp3d/>
+    <dgm:txPr/>
+    <dgm:style>
+      <a:lnRef idx="0">
+        <a:scrgbClr r="0" g="0" b="0"/>
+      </a:lnRef>
+      <a:fillRef idx="3">
+        <a:scrgbClr r="0" g="0" b="0"/>
+      </a:fillRef>
+      <a:effectRef idx="2">
+        <a:scrgbClr r="0" g="0" b="0"/>
+      </a:effectRef>
+      <a:fontRef idx="minor">
+        <a:schemeClr val="lt1"/>
+      </a:fontRef>
+    </dgm:style>
+  </dgm:styleLbl>
+  <dgm:styleLbl name="node4">
+    <dgm:scene3d>
+      <a:camera prst="orthographicFront"/>
+      <a:lightRig rig="threePt" dir="t"/>
+    </dgm:scene3d>
+    <dgm:sp3d/>
+    <dgm:txPr/>
+    <dgm:style>
+      <a:lnRef idx="0">
+        <a:scrgbClr r="0" g="0" b="0"/>
+      </a:lnRef>
+      <a:fillRef idx="3">
+        <a:scrgbClr r="0" g="0" b="0"/>
+      </a:fillRef>
+      <a:effectRef idx="2">
+        <a:scrgbClr r="0" g="0" b="0"/>
+      </a:effectRef>
+      <a:fontRef idx="minor">
+        <a:schemeClr val="lt1"/>
+      </a:fontRef>
+    </dgm:style>
+  </dgm:styleLbl>
+  <dgm:styleLbl name="fgImgPlace1">
+    <dgm:scene3d>
+      <a:camera prst="orthographicFront"/>
+      <a:lightRig rig="threePt" dir="t"/>
+    </dgm:scene3d>
+    <dgm:sp3d/>
+    <dgm:txPr/>
+    <dgm:style>
+      <a:lnRef idx="0">
+        <a:scrgbClr r="0" g="0" b="0"/>
+      </a:lnRef>
+      <a:fillRef idx="1">
+        <a:scrgbClr r="0" g="0" b="0"/>
+      </a:fillRef>
+      <a:effectRef idx="2">
+        <a:scrgbClr r="0" g="0" b="0"/>
+      </a:effectRef>
+      <a:fontRef idx="minor"/>
+    </dgm:style>
+  </dgm:styleLbl>
+  <dgm:styleLbl name="alignImgPlace1">
+    <dgm:scene3d>
+      <a:camera prst="orthographicFront"/>
+      <a:lightRig rig="threePt" dir="t"/>
+    </dgm:scene3d>
+    <dgm:sp3d/>
+    <dgm:txPr/>
+    <dgm:style>
+      <a:lnRef idx="0">
+        <a:scrgbClr r="0" g="0" b="0"/>
+      </a:lnRef>
+      <a:fillRef idx="1">
+        <a:scrgbClr r="0" g="0" b="0"/>
+      </a:fillRef>
+      <a:effectRef idx="2">
+        <a:scrgbClr r="0" g="0" b="0"/>
+      </a:effectRef>
+      <a:fontRef idx="minor"/>
+    </dgm:style>
+  </dgm:styleLbl>
+  <dgm:styleLbl name="bgImgPlace1">
+    <dgm:scene3d>
+      <a:camera prst="orthographicFront"/>
+      <a:lightRig rig="threePt" dir="t"/>
+    </dgm:scene3d>
+    <dgm:sp3d/>
+    <dgm:txPr/>
+    <dgm:style>
+      <a:lnRef idx="0">
+        <a:scrgbClr r="0" g="0" b="0"/>
+      </a:lnRef>
+      <a:fillRef idx="1">
+        <a:scrgbClr r="0" g="0" b="0"/>
+      </a:fillRef>
+      <a:effectRef idx="2">
+        <a:scrgbClr r="0" g="0" b="0"/>
+      </a:effectRef>
+      <a:fontRef idx="minor"/>
+    </dgm:style>
+  </dgm:styleLbl>
+  <dgm:styleLbl name="sibTrans2D1">
+    <dgm:scene3d>
+      <a:camera prst="orthographicFront"/>
+      <a:lightRig rig="threePt" dir="t"/>
+    </dgm:scene3d>
+    <dgm:sp3d/>
+    <dgm:txPr/>
+    <dgm:style>
+      <a:lnRef idx="0">
+        <a:scrgbClr r="0" g="0" b="0"/>
+      </a:lnRef>
+      <a:fillRef idx="3">
+        <a:scrgbClr r="0" g="0" b="0"/>
+      </a:fillRef>
+      <a:effectRef idx="2">
+        <a:scrgbClr r="0" g="0" b="0"/>
+      </a:effectRef>
+      <a:fontRef idx="minor">
+        <a:schemeClr val="lt1"/>
+      </a:fontRef>
+    </dgm:style>
+  </dgm:styleLbl>
+  <dgm:styleLbl name="fgSibTrans2D1">
+    <dgm:scene3d>
+      <a:camera prst="orthographicFront"/>
+      <a:lightRig rig="threePt" dir="t"/>
+    </dgm:scene3d>
+    <dgm:sp3d/>
+    <dgm:txPr/>
+    <dgm:style>
+      <a:lnRef idx="0">
+        <a:scrgbClr r="0" g="0" b="0"/>
+      </a:lnRef>
+      <a:fillRef idx="3">
+        <a:scrgbClr r="0" g="0" b="0"/>
+      </a:fillRef>
+      <a:effectRef idx="2">
+        <a:scrgbClr r="0" g="0" b="0"/>
+      </a:effectRef>
+      <a:fontRef idx="minor">
+        <a:schemeClr val="lt1"/>
+      </a:fontRef>
+    </dgm:style>
+  </dgm:styleLbl>
+  <dgm:styleLbl name="bgSibTrans2D1">
+    <dgm:scene3d>
+      <a:camera prst="orthographicFront"/>
+      <a:lightRig rig="threePt" dir="t"/>
+    </dgm:scene3d>
+    <dgm:sp3d/>
+    <dgm:txPr/>
+    <dgm:style>
+      <a:lnRef idx="0">
+        <a:scrgbClr r="0" g="0" b="0"/>
+      </a:lnRef>
+      <a:fillRef idx="3">
+        <a:scrgbClr r="0" g="0" b="0"/>
+      </a:fillRef>
+      <a:effectRef idx="2">
+        <a:scrgbClr r="0" g="0" b="0"/>
+      </a:effectRef>
+      <a:fontRef idx="minor">
+        <a:schemeClr val="lt1"/>
+      </a:fontRef>
+    </dgm:style>
+  </dgm:styleLbl>
+  <dgm:styleLbl name="sibTrans1D1">
+    <dgm:scene3d>
+      <a:camera prst="orthographicFront"/>
+      <a:lightRig rig="threePt" dir="t"/>
+    </dgm:scene3d>
+    <dgm:sp3d/>
+    <dgm:txPr/>
+    <dgm:style>
+      <a:lnRef idx="1">
+        <a:scrgbClr r="0" g="0" b="0"/>
+      </a:lnRef>
+      <a:fillRef idx="0">
+        <a:scrgbClr r="0" g="0" b="0"/>
+      </a:fillRef>
+      <a:effectRef idx="0">
+        <a:scrgbClr r="0" g="0" b="0"/>
+      </a:effectRef>
+      <a:fontRef idx="minor"/>
+    </dgm:style>
+  </dgm:styleLbl>
+  <dgm:styleLbl name="callout">
+    <dgm:scene3d>
+      <a:camera prst="orthographicFront"/>
+      <a:lightRig rig="threePt" dir="t"/>
+    </dgm:scene3d>
+    <dgm:sp3d/>
+    <dgm:txPr/>
+    <dgm:style>
+      <a:lnRef idx="2">
+        <a:scrgbClr r="0" g="0" b="0"/>
+      </a:lnRef>
+      <a:fillRef idx="1">
+        <a:scrgbClr r="0" g="0" b="0"/>
+      </a:fillRef>
+      <a:effectRef idx="1">
+        <a:scrgbClr r="0" g="0" b="0"/>
+      </a:effectRef>
+      <a:fontRef idx="minor"/>
+    </dgm:style>
+  </dgm:styleLbl>
+  <dgm:styleLbl name="asst0">
+    <dgm:scene3d>
+      <a:camera prst="orthographicFront"/>
+      <a:lightRig rig="threePt" dir="t"/>
+    </dgm:scene3d>
+    <dgm:sp3d/>
+    <dgm:txPr/>
+    <dgm:style>
+      <a:lnRef idx="0">
+        <a:scrgbClr r="0" g="0" b="0"/>
+      </a:lnRef>
+      <a:fillRef idx="3">
+        <a:scrgbClr r="0" g="0" b="0"/>
+      </a:fillRef>
+      <a:effectRef idx="2">
+        <a:scrgbClr r="0" g="0" b="0"/>
+      </a:effectRef>
+      <a:fontRef idx="minor">
+        <a:schemeClr val="lt1"/>
+      </a:fontRef>
+    </dgm:style>
+  </dgm:styleLbl>
+  <dgm:styleLbl name="asst1">
+    <dgm:scene3d>
+      <a:camera prst="orthographicFront"/>
+      <a:lightRig rig="threePt" dir="t"/>
+    </dgm:scene3d>
+    <dgm:sp3d/>
+    <dgm:txPr/>
+    <dgm:style>
+      <a:lnRef idx="0">
+        <a:scrgbClr r="0" g="0" b="0"/>
+      </a:lnRef>
+      <a:fillRef idx="3">
+        <a:scrgbClr r="0" g="0" b="0"/>
+      </a:fillRef>
+      <a:effectRef idx="2">
+        <a:scrgbClr r="0" g="0" b="0"/>
+      </a:effectRef>
+      <a:fontRef idx="minor">
+        <a:schemeClr val="lt1"/>
+      </a:fontRef>
+    </dgm:style>
+  </dgm:styleLbl>
+  <dgm:styleLbl name="asst2">
+    <dgm:scene3d>
+      <a:camera prst="orthographicFront"/>
+      <a:lightRig rig="threePt" dir="t"/>
+    </dgm:scene3d>
+    <dgm:sp3d/>
+    <dgm:txPr/>
+    <dgm:style>
+      <a:lnRef idx="0">
+        <a:scrgbClr r="0" g="0" b="0"/>
+      </a:lnRef>
+      <a:fillRef idx="3">
+        <a:scrgbClr r="0" g="0" b="0"/>
+      </a:fillRef>
+      <a:effectRef idx="2">
+        <a:scrgbClr r="0" g="0" b="0"/>
+      </a:effectRef>
+      <a:fontRef idx="minor">
+        <a:schemeClr val="lt1"/>
+      </a:fontRef>
+    </dgm:style>
+  </dgm:styleLbl>
+  <dgm:styleLbl name="asst3">
+    <dgm:scene3d>
+      <a:camera prst="orthographicFront"/>
+      <a:lightRig rig="threePt" dir="t"/>
+    </dgm:scene3d>
+    <dgm:sp3d/>
+    <dgm:txPr/>
+    <dgm:style>
+      <a:lnRef idx="0">
+        <a:scrgbClr r="0" g="0" b="0"/>
+      </a:lnRef>
+      <a:fillRef idx="3">
+        <a:scrgbClr r="0" g="0" b="0"/>
+      </a:fillRef>
+      <a:effectRef idx="2">
+        <a:scrgbClr r="0" g="0" b="0"/>
+      </a:effectRef>
+      <a:fontRef idx="minor">
+        <a:schemeClr val="lt1"/>
+      </a:fontRef>
+    </dgm:style>
+  </dgm:styleLbl>
+  <dgm:styleLbl name="asst4">
+    <dgm:scene3d>
+      <a:camera prst="orthographicFront"/>
+      <a:lightRig rig="threePt" dir="t"/>
+    </dgm:scene3d>
+    <dgm:sp3d/>
+    <dgm:txPr/>
+    <dgm:style>
+      <a:lnRef idx="0">
+        <a:scrgbClr r="0" g="0" b="0"/>
+      </a:lnRef>
+      <a:fillRef idx="3">
+        <a:scrgbClr r="0" g="0" b="0"/>
+      </a:fillRef>
+      <a:effectRef idx="2">
+        <a:scrgbClr r="0" g="0" b="0"/>
+      </a:effectRef>
+      <a:fontRef idx="minor">
+        <a:schemeClr val="lt1"/>
+      </a:fontRef>
+    </dgm:style>
+  </dgm:styleLbl>
+  <dgm:styleLbl name="parChTrans2D1">
+    <dgm:scene3d>
+      <a:camera prst="orthographicFront"/>
+      <a:lightRig rig="threePt" dir="t"/>
+    </dgm:scene3d>
+    <dgm:sp3d/>
+    <dgm:txPr/>
+    <dgm:style>
+      <a:lnRef idx="0">
+        <a:scrgbClr r="0" g="0" b="0"/>
+      </a:lnRef>
+      <a:fillRef idx="3">
+        <a:scrgbClr r="0" g="0" b="0"/>
+      </a:fillRef>
+      <a:effectRef idx="2">
+        <a:scrgbClr r="0" g="0" b="0"/>
+      </a:effectRef>
+      <a:fontRef idx="minor">
+        <a:schemeClr val="lt1"/>
+      </a:fontRef>
+    </dgm:style>
+  </dgm:styleLbl>
+  <dgm:styleLbl name="parChTrans2D2">
+    <dgm:scene3d>
+      <a:camera prst="orthographicFront"/>
+      <a:lightRig rig="threePt" dir="t"/>
+    </dgm:scene3d>
+    <dgm:sp3d/>
+    <dgm:txPr/>
+    <dgm:style>
+      <a:lnRef idx="0">
+        <a:scrgbClr r="0" g="0" b="0"/>
+      </a:lnRef>
+      <a:fillRef idx="3">
+        <a:scrgbClr r="0" g="0" b="0"/>
+      </a:fillRef>
+      <a:effectRef idx="2">
+        <a:scrgbClr r="0" g="0" b="0"/>
+      </a:effectRef>
+      <a:fontRef idx="minor">
+        <a:schemeClr val="lt1"/>
+      </a:fontRef>
+    </dgm:style>
+  </dgm:styleLbl>
+  <dgm:styleLbl name="parChTrans2D3">
+    <dgm:scene3d>
+      <a:camera prst="orthographicFront"/>
+      <a:lightRig rig="threePt" dir="t"/>
+    </dgm:scene3d>
+    <dgm:sp3d/>
+    <dgm:txPr/>
+    <dgm:style>
+      <a:lnRef idx="1">
+        <a:scrgbClr r="0" g="0" b="0"/>
+      </a:lnRef>
+      <a:fillRef idx="3">
+        <a:scrgbClr r="0" g="0" b="0"/>
+      </a:fillRef>
+      <a:effectRef idx="2">
+        <a:scrgbClr r="0" g="0" b="0"/>
+      </a:effectRef>
+      <a:fontRef idx="minor">
+        <a:schemeClr val="lt1"/>
+      </a:fontRef>
+    </dgm:style>
+  </dgm:styleLbl>
+  <dgm:styleLbl name="parChTrans2D4">
+    <dgm:scene3d>
+      <a:camera prst="orthographicFront"/>
+      <a:lightRig rig="threePt" dir="t"/>
+    </dgm:scene3d>
+    <dgm:sp3d/>
+    <dgm:txPr/>
+    <dgm:style>
+      <a:lnRef idx="1">
+        <a:scrgbClr r="0" g="0" b="0"/>
+      </a:lnRef>
+      <a:fillRef idx="3">
+        <a:scrgbClr r="0" g="0" b="0"/>
+      </a:fillRef>
+      <a:effectRef idx="2">
+        <a:scrgbClr r="0" g="0" b="0"/>
+      </a:effectRef>
+      <a:fontRef idx="minor">
+        <a:schemeClr val="lt1"/>
+      </a:fontRef>
+    </dgm:style>
+  </dgm:styleLbl>
+  <dgm:styleLbl name="parChTrans1D1">
+    <dgm:scene3d>
+      <a:camera prst="orthographicFront"/>
+      <a:lightRig rig="threePt" dir="t"/>
+    </dgm:scene3d>
+    <dgm:sp3d/>
+    <dgm:txPr/>
+    <dgm:style>
+      <a:lnRef idx="1">
+        <a:scrgbClr r="0" g="0" b="0"/>
+      </a:lnRef>
+      <a:fillRef idx="0">
+        <a:scrgbClr r="0" g="0" b="0"/>
+      </a:fillRef>
+      <a:effectRef idx="0">
+        <a:scrgbClr r="0" g="0" b="0"/>
+      </a:effectRef>
+      <a:fontRef idx="minor"/>
+    </dgm:style>
+  </dgm:styleLbl>
+  <dgm:styleLbl name="parChTrans1D2">
+    <dgm:scene3d>
+      <a:camera prst="orthographicFront"/>
+      <a:lightRig rig="threePt" dir="t"/>
+    </dgm:scene3d>
+    <dgm:sp3d/>
+    <dgm:txPr/>
+    <dgm:style>
+      <a:lnRef idx="1">
+        <a:scrgbClr r="0" g="0" b="0"/>
+      </a:lnRef>
+      <a:fillRef idx="0">
+        <a:scrgbClr r="0" g="0" b="0"/>
+      </a:fillRef>
+      <a:effectRef idx="0">
+        <a:scrgbClr r="0" g="0" b="0"/>
+      </a:effectRef>
+      <a:fontRef idx="minor"/>
+    </dgm:style>
+  </dgm:styleLbl>
+  <dgm:styleLbl name="parChTrans1D3">
+    <dgm:scene3d>
+      <a:camera prst="orthographicFront"/>
+      <a:lightRig rig="threePt" dir="t"/>
+    </dgm:scene3d>
+    <dgm:sp3d/>
+    <dgm:txPr/>
+    <dgm:style>
+      <a:lnRef idx="1">
+        <a:scrgbClr r="0" g="0" b="0"/>
+      </a:lnRef>
+      <a:fillRef idx="0">
+        <a:scrgbClr r="0" g="0" b="0"/>
+      </a:fillRef>
+      <a:effectRef idx="0">
+        <a:scrgbClr r="0" g="0" b="0"/>
+      </a:effectRef>
+      <a:fontRef idx="minor"/>
+    </dgm:style>
+  </dgm:styleLbl>
+  <dgm:styleLbl name="parChTrans1D4">
+    <dgm:scene3d>
+      <a:camera prst="orthographicFront"/>
+      <a:lightRig rig="threePt" dir="t"/>
+    </dgm:scene3d>
+    <dgm:sp3d/>
+    <dgm:txPr/>
+    <dgm:style>
+      <a:lnRef idx="1">
+        <a:scrgbClr r="0" g="0" b="0"/>
+      </a:lnRef>
+      <a:fillRef idx="0">
+        <a:scrgbClr r="0" g="0" b="0"/>
+      </a:fillRef>
+      <a:effectRef idx="0">
+        <a:scrgbClr r="0" g="0" b="0"/>
+      </a:effectRef>
+      <a:fontRef idx="minor"/>
+    </dgm:style>
+  </dgm:styleLbl>
+  <dgm:styleLbl name="fgAcc1">
+    <dgm:scene3d>
+      <a:camera prst="orthographicFront"/>
+      <a:lightRig rig="threePt" dir="t"/>
+    </dgm:scene3d>
+    <dgm:sp3d/>
+    <dgm:txPr/>
+    <dgm:style>
+      <a:lnRef idx="1">
+        <a:scrgbClr r="0" g="0" b="0"/>
+      </a:lnRef>
+      <a:fillRef idx="1">
+        <a:scrgbClr r="0" g="0" b="0"/>
+      </a:fillRef>
+      <a:effectRef idx="0">
+        <a:scrgbClr r="0" g="0" b="0"/>
+      </a:effectRef>
+      <a:fontRef idx="minor"/>
+    </dgm:style>
+  </dgm:styleLbl>
+  <dgm:styleLbl name="conFgAcc1">
+    <dgm:scene3d>
+      <a:camera prst="orthographicFront"/>
+      <a:lightRig rig="threePt" dir="t"/>
+    </dgm:scene3d>
+    <dgm:sp3d/>
+    <dgm:txPr/>
+    <dgm:style>
+      <a:lnRef idx="1">
+        <a:scrgbClr r="0" g="0" b="0"/>
+      </a:lnRef>
+      <a:fillRef idx="1">
+        <a:scrgbClr r="0" g="0" b="0"/>
+      </a:fillRef>
+      <a:effectRef idx="0">
+        <a:scrgbClr r="0" g="0" b="0"/>
+      </a:effectRef>
+      <a:fontRef idx="minor"/>
+    </dgm:style>
+  </dgm:styleLbl>
+  <dgm:styleLbl name="alignAcc1">
+    <dgm:scene3d>
+      <a:camera prst="orthographicFront"/>
+      <a:lightRig rig="threePt" dir="t"/>
+    </dgm:scene3d>
+    <dgm:sp3d/>
+    <dgm:txPr/>
+    <dgm:style>
+      <a:lnRef idx="1">
+        <a:scrgbClr r="0" g="0" b="0"/>
+      </a:lnRef>
+      <a:fillRef idx="1">
+        <a:scrgbClr r="0" g="0" b="0"/>
+      </a:fillRef>
+      <a:effectRef idx="0">
+        <a:scrgbClr r="0" g="0" b="0"/>
+      </a:effectRef>
+      <a:fontRef idx="minor"/>
+    </dgm:style>
+  </dgm:styleLbl>
+  <dgm:styleLbl name="trAlignAcc1">
+    <dgm:scene3d>
+      <a:camera prst="orthographicFront"/>
+      <a:lightRig rig="threePt" dir="t"/>
+    </dgm:scene3d>
+    <dgm:sp3d/>
+    <dgm:txPr/>
+    <dgm:style>
+      <a:lnRef idx="1">
+        <a:scrgbClr r="0" g="0" b="0"/>
+      </a:lnRef>
+      <a:fillRef idx="1">
+        <a:scrgbClr r="0" g="0" b="0"/>
+      </a:fillRef>
+      <a:effectRef idx="0">
+        <a:scrgbClr r="0" g="0" b="0"/>
+      </a:effectRef>
+      <a:fontRef idx="minor"/>
+    </dgm:style>
+  </dgm:styleLbl>
+  <dgm:styleLbl name="bgAcc1">
+    <dgm:scene3d>
+      <a:camera prst="orthographicFront"/>
+      <a:lightRig rig="threePt" dir="t"/>
+    </dgm:scene3d>
+    <dgm:sp3d/>
+    <dgm:txPr/>
+    <dgm:style>
+      <a:lnRef idx="1">
+        <a:scrgbClr r="0" g="0" b="0"/>
+      </a:lnRef>
+      <a:fillRef idx="1">
+        <a:scrgbClr r="0" g="0" b="0"/>
+      </a:fillRef>
+      <a:effectRef idx="0">
+        <a:scrgbClr r="0" g="0" b="0"/>
+      </a:effectRef>
+      <a:fontRef idx="minor"/>
+    </dgm:style>
+  </dgm:styleLbl>
+  <dgm:styleLbl name="solidFgAcc1">
+    <dgm:scene3d>
+      <a:camera prst="orthographicFront"/>
+      <a:lightRig rig="threePt" dir="t"/>
+    </dgm:scene3d>
+    <dgm:sp3d/>
+    <dgm:txPr/>
+    <dgm:style>
+      <a:lnRef idx="1">
+        <a:scrgbClr r="0" g="0" b="0"/>
+      </a:lnRef>
+      <a:fillRef idx="1">
+        <a:scrgbClr r="0" g="0" b="0"/>
+      </a:fillRef>
+      <a:effectRef idx="0">
+        <a:scrgbClr r="0" g="0" b="0"/>
+      </a:effectRef>
+      <a:fontRef idx="minor"/>
+    </dgm:style>
+  </dgm:styleLbl>
+  <dgm:styleLbl name="solidAlignAcc1">
+    <dgm:scene3d>
+      <a:camera prst="orthographicFront"/>
+      <a:lightRig rig="threePt" dir="t"/>
+    </dgm:scene3d>
+    <dgm:sp3d/>
+    <dgm:txPr/>
+    <dgm:style>
+      <a:lnRef idx="1">
+        <a:scrgbClr r="0" g="0" b="0"/>
+      </a:lnRef>
+      <a:fillRef idx="1">
+        <a:scrgbClr r="0" g="0" b="0"/>
+      </a:fillRef>
+      <a:effectRef idx="0">
+        <a:scrgbClr r="0" g="0" b="0"/>
+      </a:effectRef>
+      <a:fontRef idx="minor"/>
+    </dgm:style>
+  </dgm:styleLbl>
+  <dgm:styleLbl name="solidBgAcc1">
+    <dgm:scene3d>
+      <a:camera prst="orthographicFront"/>
+      <a:lightRig rig="threePt" dir="t"/>
+    </dgm:scene3d>
+    <dgm:sp3d/>
+    <dgm:txPr/>
+    <dgm:style>
+      <a:lnRef idx="1">
+        <a:scrgbClr r="0" g="0" b="0"/>
+      </a:lnRef>
+      <a:fillRef idx="1">
+        <a:scrgbClr r="0" g="0" b="0"/>
+      </a:fillRef>
+      <a:effectRef idx="0">
+        <a:scrgbClr r="0" g="0" b="0"/>
+      </a:effectRef>
+      <a:fontRef idx="minor"/>
+    </dgm:style>
+  </dgm:styleLbl>
+  <dgm:styleLbl name="fgAccFollowNode1">
+    <dgm:scene3d>
+      <a:camera prst="orthographicFront"/>
+      <a:lightRig rig="threePt" dir="t"/>
+    </dgm:scene3d>
+    <dgm:sp3d/>
+    <dgm:txPr/>
+    <dgm:style>
+      <a:lnRef idx="1">
+        <a:scrgbClr r="0" g="0" b="0"/>
+      </a:lnRef>
+      <a:fillRef idx="1">
+        <a:scrgbClr r="0" g="0" b="0"/>
+      </a:fillRef>
+      <a:effectRef idx="0">
+        <a:scrgbClr r="0" g="0" b="0"/>
+      </a:effectRef>
+      <a:fontRef idx="minor"/>
+    </dgm:style>
+  </dgm:styleLbl>
+  <dgm:styleLbl name="alignAccFollowNode1">
+    <dgm:scene3d>
+      <a:camera prst="orthographicFront"/>
+      <a:lightRig rig="threePt" dir="t"/>
+    </dgm:scene3d>
+    <dgm:sp3d/>
+    <dgm:txPr/>
+    <dgm:style>
+      <a:lnRef idx="1">
+        <a:scrgbClr r="0" g="0" b="0"/>
+      </a:lnRef>
+      <a:fillRef idx="1">
+        <a:scrgbClr r="0" g="0" b="0"/>
+      </a:fillRef>
+      <a:effectRef idx="0">
+        <a:scrgbClr r="0" g="0" b="0"/>
+      </a:effectRef>
+      <a:fontRef idx="minor"/>
+    </dgm:style>
+  </dgm:styleLbl>
+  <dgm:styleLbl name="bgAccFollowNode1">
+    <dgm:scene3d>
+      <a:camera prst="orthographicFront"/>
+      <a:lightRig rig="threePt" dir="t"/>
+    </dgm:scene3d>
+    <dgm:sp3d/>
+    <dgm:txPr/>
+    <dgm:style>
+      <a:lnRef idx="1">
+        <a:scrgbClr r="0" g="0" b="0"/>
+      </a:lnRef>
+      <a:fillRef idx="1">
+        <a:scrgbClr r="0" g="0" b="0"/>
+      </a:fillRef>
+      <a:effectRef idx="0">
+        <a:scrgbClr r="0" g="0" b="0"/>
+      </a:effectRef>
+      <a:fontRef idx="minor"/>
+    </dgm:style>
+  </dgm:styleLbl>
+  <dgm:styleLbl name="fgAcc0">
+    <dgm:scene3d>
+      <a:camera prst="orthographicFront"/>
+      <a:lightRig rig="threePt" dir="t"/>
+    </dgm:scene3d>
+    <dgm:sp3d/>
+    <dgm:txPr/>
+    <dgm:style>
+      <a:lnRef idx="1">
+        <a:scrgbClr r="0" g="0" b="0"/>
+      </a:lnRef>
+      <a:fillRef idx="1">
+        <a:scrgbClr r="0" g="0" b="0"/>
+      </a:fillRef>
+      <a:effectRef idx="0">
+        <a:scrgbClr r="0" g="0" b="0"/>
+      </a:effectRef>
+      <a:fontRef idx="minor"/>
+    </dgm:style>
+  </dgm:styleLbl>
+  <dgm:styleLbl name="fgAcc2">
+    <dgm:scene3d>
+      <a:camera prst="orthographicFront"/>
+      <a:lightRig rig="threePt" dir="t"/>
+    </dgm:scene3d>
+    <dgm:sp3d/>
+    <dgm:txPr/>
+    <dgm:style>
+      <a:lnRef idx="1">
+        <a:scrgbClr r="0" g="0" b="0"/>
+      </a:lnRef>
+      <a:fillRef idx="1">
+        <a:scrgbClr r="0" g="0" b="0"/>
+      </a:fillRef>
+      <a:effectRef idx="0">
+        <a:scrgbClr r="0" g="0" b="0"/>
+      </a:effectRef>
+      <a:fontRef idx="minor"/>
+    </dgm:style>
+  </dgm:styleLbl>
+  <dgm:styleLbl name="fgAcc3">
+    <dgm:scene3d>
+      <a:camera prst="orthographicFront"/>
+      <a:lightRig rig="threePt" dir="t"/>
+    </dgm:scene3d>
+    <dgm:sp3d/>
+    <dgm:txPr/>
+    <dgm:style>
+      <a:lnRef idx="1">
+        <a:scrgbClr r="0" g="0" b="0"/>
+      </a:lnRef>
+      <a:fillRef idx="1">
+        <a:scrgbClr r="0" g="0" b="0"/>
+      </a:fillRef>
+      <a:effectRef idx="0">
+        <a:scrgbClr r="0" g="0" b="0"/>
+      </a:effectRef>
+      <a:fontRef idx="minor"/>
+    </dgm:style>
+  </dgm:styleLbl>
+  <dgm:styleLbl name="fgAcc4">
+    <dgm:scene3d>
+      <a:camera prst="orthographicFront"/>
+      <a:lightRig rig="threePt" dir="t"/>
+    </dgm:scene3d>
+    <dgm:sp3d/>
+    <dgm:txPr/>
+    <dgm:style>
+      <a:lnRef idx="1">
+        <a:scrgbClr r="0" g="0" b="0"/>
+      </a:lnRef>
+      <a:fillRef idx="1">
+        <a:scrgbClr r="0" g="0" b="0"/>
+      </a:fillRef>
+      <a:effectRef idx="0">
+        <a:scrgbClr r="0" g="0" b="0"/>
+      </a:effectRef>
+      <a:fontRef idx="minor"/>
+    </dgm:style>
+  </dgm:styleLbl>
+  <dgm:styleLbl name="bgShp">
+    <dgm:scene3d>
+      <a:camera prst="orthographicFront"/>
+      <a:lightRig rig="threePt" dir="t"/>
+    </dgm:scene3d>
+    <dgm:sp3d/>
+    <dgm:txPr/>
+    <dgm:style>
+      <a:lnRef idx="0">
+        <a:scrgbClr r="0" g="0" b="0"/>
+      </a:lnRef>
+      <a:fillRef idx="1">
+        <a:scrgbClr r="0" g="0" b="0"/>
+      </a:fillRef>
+      <a:effectRef idx="2">
+        <a:scrgbClr r="0" g="0" b="0"/>
+      </a:effectRef>
+      <a:fontRef idx="minor"/>
+    </dgm:style>
+  </dgm:styleLbl>
+  <dgm:styleLbl name="dkBgShp">
+    <dgm:scene3d>
+      <a:camera prst="orthographicFront"/>
+      <a:lightRig rig="threePt" dir="t"/>
+    </dgm:scene3d>
+    <dgm:sp3d/>
+    <dgm:txPr/>
+    <dgm:style>
+      <a:lnRef idx="0">
+        <a:scrgbClr r="0" g="0" b="0"/>
+      </a:lnRef>
+      <a:fillRef idx="1">
+        <a:scrgbClr r="0" g="0" b="0"/>
+      </a:fillRef>
+      <a:effectRef idx="2">
+        <a:scrgbClr r="0" g="0" b="0"/>
+      </a:effectRef>
+      <a:fontRef idx="minor"/>
+    </dgm:style>
+  </dgm:styleLbl>
+  <dgm:styleLbl name="trBgShp">
+    <dgm:scene3d>
+      <a:camera prst="orthographicFront"/>
+      <a:lightRig rig="threePt" dir="t"/>
+    </dgm:scene3d>
+    <dgm:sp3d/>
+    <dgm:txPr/>
+    <dgm:style>
+      <a:lnRef idx="0">
+        <a:scrgbClr r="0" g="0" b="0"/>
+      </a:lnRef>
+      <a:fillRef idx="1">
+        <a:scrgbClr r="0" g="0" b="0"/>
+      </a:fillRef>
+      <a:effectRef idx="0">
+        <a:scrgbClr r="0" g="0" b="0"/>
+      </a:effectRef>
+      <a:fontRef idx="minor"/>
+    </dgm:style>
+  </dgm:styleLbl>
+  <dgm:styleLbl name="fgShp">
+    <dgm:scene3d>
+      <a:camera prst="orthographicFront"/>
+      <a:lightRig rig="threePt" dir="t"/>
+    </dgm:scene3d>
+    <dgm:sp3d/>
+    <dgm:txPr/>
+    <dgm:style>
+      <a:lnRef idx="0">
+        <a:scrgbClr r="0" g="0" b="0"/>
+      </a:lnRef>
+      <a:fillRef idx="3">
+        <a:scrgbClr r="0" g="0" b="0"/>
+      </a:fillRef>
+      <a:effectRef idx="2">
+        <a:scrgbClr r="0" g="0" b="0"/>
+      </a:effectRef>
+      <a:fontRef idx="minor"/>
+    </dgm:style>
+  </dgm:styleLbl>
+  <dgm:styleLbl name="revTx">
+    <dgm:scene3d>
+      <a:camera prst="orthographicFront"/>
+      <a:lightRig rig="threePt" dir="t"/>
+    </dgm:scene3d>
+    <dgm:sp3d/>
+    <dgm:txPr/>
+    <dgm:style>
+      <a:lnRef idx="0">
+        <a:scrgbClr r="0" g="0" b="0"/>
+      </a:lnRef>
+      <a:fillRef idx="0">
+        <a:scrgbClr r="0" g="0" b="0"/>
+      </a:fillRef>
+      <a:effectRef idx="0">
+        <a:scrgbClr r="0" g="0" b="0"/>
+      </a:effectRef>
+      <a:fontRef idx="minor"/>
+    </dgm:style>
+  </dgm:styleLbl>
+</dgm:styleDef>
+</file>
+
+<file path=ppt/diagrams/quickStyle4.xml><?xml version="1.0" encoding="utf-8"?>
 <dgm:styleDef xmlns:dgm="http://schemas.openxmlformats.org/drawingml/2006/diagram" xmlns:a="http://schemas.openxmlformats.org/drawingml/2006/main" uniqueId="urn:microsoft.com/office/officeart/2005/8/quickstyle/simple4">
   <dgm:title val=""/>
   <dgm:desc val=""/>
@@ -17182,6 +20445,780 @@
 </p:sld>
 </file>
 
+<file path=ppt/slides/slide10.xml><?xml version="1.0" encoding="utf-8"?>
+<p:sld xmlns:a="http://schemas.openxmlformats.org/drawingml/2006/main" xmlns:r="http://schemas.openxmlformats.org/officeDocument/2006/relationships" xmlns:p="http://schemas.openxmlformats.org/presentationml/2006/main">
+  <p:cSld>
+    <p:bg>
+      <p:bgPr>
+        <a:solidFill>
+          <a:schemeClr val="bg2"/>
+        </a:solidFill>
+        <a:effectLst/>
+      </p:bgPr>
+    </p:bg>
+    <p:spTree>
+      <p:nvGrpSpPr>
+        <p:cNvPr id="1" name=""/>
+        <p:cNvGrpSpPr/>
+        <p:nvPr/>
+      </p:nvGrpSpPr>
+      <p:grpSpPr>
+        <a:xfrm>
+          <a:off x="0" y="0"/>
+          <a:ext cx="0" cy="0"/>
+          <a:chOff x="0" y="0"/>
+          <a:chExt cx="0" cy="0"/>
+        </a:xfrm>
+      </p:grpSpPr>
+      <p:sp useBgFill="1">
+        <p:nvSpPr>
+          <p:cNvPr id="7" name="Rectangle 6">
+            <a:extLst>
+              <a:ext uri="{FF2B5EF4-FFF2-40B4-BE49-F238E27FC236}">
+                <a16:creationId xmlns:a16="http://schemas.microsoft.com/office/drawing/2014/main" id="{27577DEC-D9A5-404D-9789-702F4319BEC8}"/>
+              </a:ext>
+              <a:ext uri="{C183D7F6-B498-43B3-948B-1728B52AA6E4}">
+                <adec:decorative xmlns:adec="http://schemas.microsoft.com/office/drawing/2017/decorative" val="1"/>
+              </a:ext>
+            </a:extLst>
+          </p:cNvPr>
+          <p:cNvSpPr>
+            <a:spLocks noGrp="1" noRot="1" noChangeAspect="1" noMove="1" noResize="1" noEditPoints="1" noAdjustHandles="1" noChangeArrowheads="1" noChangeShapeType="1" noTextEdit="1"/>
+          </p:cNvSpPr>
+          <p:nvPr>
+            <p:extLst>
+              <p:ext uri="{386F3935-93C4-4BCD-93E2-E3B085C9AB24}">
+                <p16:designElem xmlns:p16="http://schemas.microsoft.com/office/powerpoint/2015/main" val="1"/>
+              </p:ext>
+            </p:extLst>
+          </p:nvPr>
+        </p:nvSpPr>
+        <p:spPr>
+          <a:xfrm>
+            <a:off x="0" y="0"/>
+            <a:ext cx="12192000" cy="6858000"/>
+          </a:xfrm>
+          <a:prstGeom prst="rect">
+            <a:avLst/>
+          </a:prstGeom>
+          <a:ln>
+            <a:noFill/>
+          </a:ln>
+        </p:spPr>
+        <p:style>
+          <a:lnRef idx="2">
+            <a:schemeClr val="accent1">
+              <a:shade val="50000"/>
+            </a:schemeClr>
+          </a:lnRef>
+          <a:fillRef idx="1">
+            <a:schemeClr val="accent1"/>
+          </a:fillRef>
+          <a:effectRef idx="0">
+            <a:schemeClr val="accent1"/>
+          </a:effectRef>
+          <a:fontRef idx="minor">
+            <a:schemeClr val="lt1"/>
+          </a:fontRef>
+        </p:style>
+        <p:txBody>
+          <a:bodyPr rtlCol="0" anchor="ctr"/>
+          <a:lstStyle/>
+          <a:p>
+            <a:pPr algn="ctr"/>
+            <a:endParaRPr lang="en-US"/>
+          </a:p>
+        </p:txBody>
+      </p:sp>
+      <p:sp>
+        <p:nvSpPr>
+          <p:cNvPr id="2" name="TextBox 1">
+            <a:extLst>
+              <a:ext uri="{FF2B5EF4-FFF2-40B4-BE49-F238E27FC236}">
+                <a16:creationId xmlns:a16="http://schemas.microsoft.com/office/drawing/2014/main" id="{BAEB8452-4678-45D0-96FA-0CD78ED1D72C}"/>
+              </a:ext>
+            </a:extLst>
+          </p:cNvPr>
+          <p:cNvSpPr txBox="1"/>
+          <p:nvPr/>
+        </p:nvSpPr>
+        <p:spPr>
+          <a:xfrm>
+            <a:off x="857187" y="2652714"/>
+            <a:ext cx="8093201" cy="1024466"/>
+          </a:xfrm>
+          <a:prstGeom prst="rect">
+            <a:avLst/>
+          </a:prstGeom>
+        </p:spPr>
+        <p:txBody>
+          <a:bodyPr vert="horz" lIns="91440" tIns="45720" rIns="91440" bIns="45720" rtlCol="0" anchor="b">
+            <a:normAutofit/>
+          </a:bodyPr>
+          <a:lstStyle/>
+          <a:p>
+            <a:pPr algn="r">
+              <a:spcBef>
+                <a:spcPct val="0"/>
+              </a:spcBef>
+              <a:spcAft>
+                <a:spcPts val="600"/>
+              </a:spcAft>
+            </a:pPr>
+            <a:r>
+              <a:rPr lang="en-US" sz="5400" b="1" dirty="0">
+                <a:solidFill>
+                  <a:schemeClr val="accent1"/>
+                </a:solidFill>
+                <a:latin typeface="+mj-lt"/>
+                <a:ea typeface="+mj-ea"/>
+                <a:cs typeface="+mj-cs"/>
+              </a:rPr>
+              <a:t> Thank you for listening!</a:t>
+            </a:r>
+          </a:p>
+        </p:txBody>
+      </p:sp>
+      <p:grpSp>
+        <p:nvGrpSpPr>
+          <p:cNvPr id="9" name="Group 8">
+            <a:extLst>
+              <a:ext uri="{FF2B5EF4-FFF2-40B4-BE49-F238E27FC236}">
+                <a16:creationId xmlns:a16="http://schemas.microsoft.com/office/drawing/2014/main" id="{CEEA9366-CEA8-4F23-B065-4337F0D836FE}"/>
+              </a:ext>
+              <a:ext uri="{C183D7F6-B498-43B3-948B-1728B52AA6E4}">
+                <adec:decorative xmlns:adec="http://schemas.microsoft.com/office/drawing/2017/decorative" val="1"/>
+              </a:ext>
+            </a:extLst>
+          </p:cNvPr>
+          <p:cNvGrpSpPr>
+            <a:grpSpLocks noGrp="1" noUngrp="1" noRot="1" noChangeAspect="1" noMove="1" noResize="1"/>
+          </p:cNvGrpSpPr>
+          <p:nvPr>
+            <p:extLst>
+              <p:ext uri="{386F3935-93C4-4BCD-93E2-E3B085C9AB24}">
+                <p16:designElem xmlns:p16="http://schemas.microsoft.com/office/powerpoint/2015/main" val="1"/>
+              </p:ext>
+            </p:extLst>
+          </p:nvPr>
+        </p:nvGrpSpPr>
+        <p:grpSpPr>
+          <a:xfrm>
+            <a:off x="0" y="-8467"/>
+            <a:ext cx="12192000" cy="6866467"/>
+            <a:chOff x="0" y="-8467"/>
+            <a:chExt cx="12192000" cy="6866467"/>
+          </a:xfrm>
+        </p:grpSpPr>
+        <p:cxnSp>
+          <p:nvCxnSpPr>
+            <p:cNvPr id="10" name="Straight Connector 9">
+              <a:extLst>
+                <a:ext uri="{FF2B5EF4-FFF2-40B4-BE49-F238E27FC236}">
+                  <a16:creationId xmlns:a16="http://schemas.microsoft.com/office/drawing/2014/main" id="{904A03D6-39B4-4278-9BE1-A07E024499BE}"/>
+                </a:ext>
+                <a:ext uri="{C183D7F6-B498-43B3-948B-1728B52AA6E4}">
+                  <adec:decorative xmlns:adec="http://schemas.microsoft.com/office/drawing/2017/decorative" val="1"/>
+                </a:ext>
+              </a:extLst>
+            </p:cNvPr>
+            <p:cNvCxnSpPr/>
+            <p:nvPr>
+              <p:extLst>
+                <p:ext uri="{386F3935-93C4-4BCD-93E2-E3B085C9AB24}">
+                  <p16:designElem xmlns:p16="http://schemas.microsoft.com/office/powerpoint/2015/main" val="1"/>
+                </p:ext>
+              </p:extLst>
+            </p:nvPr>
+          </p:nvCxnSpPr>
+          <p:spPr>
+            <a:xfrm>
+              <a:off x="9371012" y="0"/>
+              <a:ext cx="1219200" cy="6858000"/>
+            </a:xfrm>
+            <a:prstGeom prst="line">
+              <a:avLst/>
+            </a:prstGeom>
+            <a:ln w="9525">
+              <a:solidFill>
+                <a:srgbClr val="FFFFFF"/>
+              </a:solidFill>
+            </a:ln>
+          </p:spPr>
+          <p:style>
+            <a:lnRef idx="2">
+              <a:schemeClr val="accent1"/>
+            </a:lnRef>
+            <a:fillRef idx="0">
+              <a:schemeClr val="accent1"/>
+            </a:fillRef>
+            <a:effectRef idx="1">
+              <a:schemeClr val="accent1"/>
+            </a:effectRef>
+            <a:fontRef idx="minor">
+              <a:schemeClr val="tx1"/>
+            </a:fontRef>
+          </p:style>
+        </p:cxnSp>
+        <p:cxnSp>
+          <p:nvCxnSpPr>
+            <p:cNvPr id="11" name="Straight Connector 10">
+              <a:extLst>
+                <a:ext uri="{FF2B5EF4-FFF2-40B4-BE49-F238E27FC236}">
+                  <a16:creationId xmlns:a16="http://schemas.microsoft.com/office/drawing/2014/main" id="{FBE459AF-3736-4886-82E0-9B5DA427B5E0}"/>
+                </a:ext>
+                <a:ext uri="{C183D7F6-B498-43B3-948B-1728B52AA6E4}">
+                  <adec:decorative xmlns:adec="http://schemas.microsoft.com/office/drawing/2017/decorative" val="1"/>
+                </a:ext>
+              </a:extLst>
+            </p:cNvPr>
+            <p:cNvCxnSpPr/>
+            <p:nvPr>
+              <p:extLst>
+                <p:ext uri="{386F3935-93C4-4BCD-93E2-E3B085C9AB24}">
+                  <p16:designElem xmlns:p16="http://schemas.microsoft.com/office/powerpoint/2015/main" val="1"/>
+                </p:ext>
+              </p:extLst>
+            </p:nvPr>
+          </p:nvCxnSpPr>
+          <p:spPr>
+            <a:xfrm flipH="1">
+              <a:off x="7425267" y="3681413"/>
+              <a:ext cx="4763558" cy="3176587"/>
+            </a:xfrm>
+            <a:prstGeom prst="line">
+              <a:avLst/>
+            </a:prstGeom>
+            <a:ln w="9525">
+              <a:solidFill>
+                <a:schemeClr val="bg1">
+                  <a:alpha val="80000"/>
+                </a:schemeClr>
+              </a:solidFill>
+            </a:ln>
+          </p:spPr>
+          <p:style>
+            <a:lnRef idx="2">
+              <a:schemeClr val="accent1"/>
+            </a:lnRef>
+            <a:fillRef idx="0">
+              <a:schemeClr val="accent1"/>
+            </a:fillRef>
+            <a:effectRef idx="1">
+              <a:schemeClr val="accent1"/>
+            </a:effectRef>
+            <a:fontRef idx="minor">
+              <a:schemeClr val="tx1"/>
+            </a:fontRef>
+          </p:style>
+        </p:cxnSp>
+        <p:sp>
+          <p:nvSpPr>
+            <p:cNvPr id="12" name="Rectangle 23">
+              <a:extLst>
+                <a:ext uri="{FF2B5EF4-FFF2-40B4-BE49-F238E27FC236}">
+                  <a16:creationId xmlns:a16="http://schemas.microsoft.com/office/drawing/2014/main" id="{4B6B88EF-180C-4E39-8A3F-A52E87110C66}"/>
+                </a:ext>
+                <a:ext uri="{C183D7F6-B498-43B3-948B-1728B52AA6E4}">
+                  <adec:decorative xmlns:adec="http://schemas.microsoft.com/office/drawing/2017/decorative" val="1"/>
+                </a:ext>
+              </a:extLst>
+            </p:cNvPr>
+            <p:cNvSpPr/>
+            <p:nvPr>
+              <p:extLst>
+                <p:ext uri="{386F3935-93C4-4BCD-93E2-E3B085C9AB24}">
+                  <p16:designElem xmlns:p16="http://schemas.microsoft.com/office/powerpoint/2015/main" val="1"/>
+                </p:ext>
+              </p:extLst>
+            </p:nvPr>
+          </p:nvSpPr>
+          <p:spPr>
+            <a:xfrm>
+              <a:off x="9181476" y="-8467"/>
+              <a:ext cx="3007349" cy="6866467"/>
+            </a:xfrm>
+            <a:custGeom>
+              <a:avLst/>
+              <a:gdLst/>
+              <a:ahLst/>
+              <a:cxnLst/>
+              <a:rect l="l" t="t" r="r" b="b"/>
+              <a:pathLst>
+                <a:path w="3007349" h="6866467">
+                  <a:moveTo>
+                    <a:pt x="2045532" y="0"/>
+                  </a:moveTo>
+                  <a:lnTo>
+                    <a:pt x="3007349" y="0"/>
+                  </a:lnTo>
+                  <a:lnTo>
+                    <a:pt x="3007349" y="6866467"/>
+                  </a:lnTo>
+                  <a:lnTo>
+                    <a:pt x="0" y="6866467"/>
+                  </a:lnTo>
+                  <a:lnTo>
+                    <a:pt x="2045532" y="0"/>
+                  </a:lnTo>
+                  <a:close/>
+                </a:path>
+              </a:pathLst>
+            </a:custGeom>
+            <a:solidFill>
+              <a:schemeClr val="accent1">
+                <a:alpha val="30000"/>
+              </a:schemeClr>
+            </a:solidFill>
+            <a:ln>
+              <a:noFill/>
+            </a:ln>
+            <a:effectLst/>
+          </p:spPr>
+          <p:style>
+            <a:lnRef idx="1">
+              <a:schemeClr val="accent1"/>
+            </a:lnRef>
+            <a:fillRef idx="3">
+              <a:schemeClr val="accent1"/>
+            </a:fillRef>
+            <a:effectRef idx="2">
+              <a:schemeClr val="accent1"/>
+            </a:effectRef>
+            <a:fontRef idx="minor">
+              <a:schemeClr val="lt1"/>
+            </a:fontRef>
+          </p:style>
+        </p:sp>
+        <p:sp>
+          <p:nvSpPr>
+            <p:cNvPr id="13" name="Rectangle 25">
+              <a:extLst>
+                <a:ext uri="{FF2B5EF4-FFF2-40B4-BE49-F238E27FC236}">
+                  <a16:creationId xmlns:a16="http://schemas.microsoft.com/office/drawing/2014/main" id="{52DFAACF-64D0-4621-8FF4-E2F03C3E8D15}"/>
+                </a:ext>
+                <a:ext uri="{C183D7F6-B498-43B3-948B-1728B52AA6E4}">
+                  <adec:decorative xmlns:adec="http://schemas.microsoft.com/office/drawing/2017/decorative" val="1"/>
+                </a:ext>
+              </a:extLst>
+            </p:cNvPr>
+            <p:cNvSpPr/>
+            <p:nvPr>
+              <p:extLst>
+                <p:ext uri="{386F3935-93C4-4BCD-93E2-E3B085C9AB24}">
+                  <p16:designElem xmlns:p16="http://schemas.microsoft.com/office/powerpoint/2015/main" val="1"/>
+                </p:ext>
+              </p:extLst>
+            </p:nvPr>
+          </p:nvSpPr>
+          <p:spPr>
+            <a:xfrm>
+              <a:off x="9603442" y="-8467"/>
+              <a:ext cx="2588558" cy="6866467"/>
+            </a:xfrm>
+            <a:custGeom>
+              <a:avLst/>
+              <a:gdLst/>
+              <a:ahLst/>
+              <a:cxnLst/>
+              <a:rect l="l" t="t" r="r" b="b"/>
+              <a:pathLst>
+                <a:path w="2573311" h="6866467">
+                  <a:moveTo>
+                    <a:pt x="0" y="0"/>
+                  </a:moveTo>
+                  <a:lnTo>
+                    <a:pt x="2573311" y="0"/>
+                  </a:lnTo>
+                  <a:lnTo>
+                    <a:pt x="2573311" y="6866467"/>
+                  </a:lnTo>
+                  <a:lnTo>
+                    <a:pt x="1202336" y="6866467"/>
+                  </a:lnTo>
+                  <a:lnTo>
+                    <a:pt x="0" y="0"/>
+                  </a:lnTo>
+                  <a:close/>
+                </a:path>
+              </a:pathLst>
+            </a:custGeom>
+            <a:solidFill>
+              <a:schemeClr val="accent1">
+                <a:alpha val="20000"/>
+              </a:schemeClr>
+            </a:solidFill>
+            <a:ln>
+              <a:noFill/>
+            </a:ln>
+            <a:effectLst/>
+          </p:spPr>
+          <p:style>
+            <a:lnRef idx="1">
+              <a:schemeClr val="accent1"/>
+            </a:lnRef>
+            <a:fillRef idx="3">
+              <a:schemeClr val="accent1"/>
+            </a:fillRef>
+            <a:effectRef idx="2">
+              <a:schemeClr val="accent1"/>
+            </a:effectRef>
+            <a:fontRef idx="minor">
+              <a:schemeClr val="lt1"/>
+            </a:fontRef>
+          </p:style>
+        </p:sp>
+        <p:sp>
+          <p:nvSpPr>
+            <p:cNvPr id="14" name="Isosceles Triangle 13">
+              <a:extLst>
+                <a:ext uri="{FF2B5EF4-FFF2-40B4-BE49-F238E27FC236}">
+                  <a16:creationId xmlns:a16="http://schemas.microsoft.com/office/drawing/2014/main" id="{36611FF0-65B3-49DB-97C6-1B72AAD0FB02}"/>
+                </a:ext>
+                <a:ext uri="{C183D7F6-B498-43B3-948B-1728B52AA6E4}">
+                  <adec:decorative xmlns:adec="http://schemas.microsoft.com/office/drawing/2017/decorative" val="1"/>
+                </a:ext>
+              </a:extLst>
+            </p:cNvPr>
+            <p:cNvSpPr/>
+            <p:nvPr>
+              <p:extLst>
+                <p:ext uri="{386F3935-93C4-4BCD-93E2-E3B085C9AB24}">
+                  <p16:designElem xmlns:p16="http://schemas.microsoft.com/office/powerpoint/2015/main" val="1"/>
+                </p:ext>
+              </p:extLst>
+            </p:nvPr>
+          </p:nvSpPr>
+          <p:spPr>
+            <a:xfrm>
+              <a:off x="8932333" y="3048000"/>
+              <a:ext cx="3259667" cy="3810000"/>
+            </a:xfrm>
+            <a:prstGeom prst="triangle">
+              <a:avLst>
+                <a:gd name="adj" fmla="val 100000"/>
+              </a:avLst>
+            </a:prstGeom>
+            <a:solidFill>
+              <a:schemeClr val="accent2">
+                <a:alpha val="72000"/>
+              </a:schemeClr>
+            </a:solidFill>
+            <a:ln>
+              <a:noFill/>
+            </a:ln>
+            <a:effectLst/>
+          </p:spPr>
+          <p:style>
+            <a:lnRef idx="1">
+              <a:schemeClr val="accent1"/>
+            </a:lnRef>
+            <a:fillRef idx="3">
+              <a:schemeClr val="accent1"/>
+            </a:fillRef>
+            <a:effectRef idx="2">
+              <a:schemeClr val="accent1"/>
+            </a:effectRef>
+            <a:fontRef idx="minor">
+              <a:schemeClr val="lt1"/>
+            </a:fontRef>
+          </p:style>
+        </p:sp>
+        <p:sp>
+          <p:nvSpPr>
+            <p:cNvPr id="15" name="Rectangle 27">
+              <a:extLst>
+                <a:ext uri="{FF2B5EF4-FFF2-40B4-BE49-F238E27FC236}">
+                  <a16:creationId xmlns:a16="http://schemas.microsoft.com/office/drawing/2014/main" id="{0F7407FE-86B1-4890-9D80-9406FBF29E46}"/>
+                </a:ext>
+                <a:ext uri="{C183D7F6-B498-43B3-948B-1728B52AA6E4}">
+                  <adec:decorative xmlns:adec="http://schemas.microsoft.com/office/drawing/2017/decorative" val="1"/>
+                </a:ext>
+              </a:extLst>
+            </p:cNvPr>
+            <p:cNvSpPr/>
+            <p:nvPr>
+              <p:extLst>
+                <p:ext uri="{386F3935-93C4-4BCD-93E2-E3B085C9AB24}">
+                  <p16:designElem xmlns:p16="http://schemas.microsoft.com/office/powerpoint/2015/main" val="1"/>
+                </p:ext>
+              </p:extLst>
+            </p:nvPr>
+          </p:nvSpPr>
+          <p:spPr>
+            <a:xfrm>
+              <a:off x="9334500" y="-8467"/>
+              <a:ext cx="2854326" cy="6866467"/>
+            </a:xfrm>
+            <a:custGeom>
+              <a:avLst/>
+              <a:gdLst/>
+              <a:ahLst/>
+              <a:cxnLst/>
+              <a:rect l="l" t="t" r="r" b="b"/>
+              <a:pathLst>
+                <a:path w="2858013" h="6866467">
+                  <a:moveTo>
+                    <a:pt x="0" y="0"/>
+                  </a:moveTo>
+                  <a:lnTo>
+                    <a:pt x="2858013" y="0"/>
+                  </a:lnTo>
+                  <a:lnTo>
+                    <a:pt x="2858013" y="6866467"/>
+                  </a:lnTo>
+                  <a:lnTo>
+                    <a:pt x="2473942" y="6866467"/>
+                  </a:lnTo>
+                  <a:lnTo>
+                    <a:pt x="0" y="0"/>
+                  </a:lnTo>
+                  <a:close/>
+                </a:path>
+              </a:pathLst>
+            </a:custGeom>
+            <a:solidFill>
+              <a:schemeClr val="accent2">
+                <a:lumMod val="75000"/>
+                <a:alpha val="70000"/>
+              </a:schemeClr>
+            </a:solidFill>
+            <a:ln>
+              <a:noFill/>
+            </a:ln>
+            <a:effectLst/>
+          </p:spPr>
+          <p:style>
+            <a:lnRef idx="1">
+              <a:schemeClr val="accent1"/>
+            </a:lnRef>
+            <a:fillRef idx="3">
+              <a:schemeClr val="accent1"/>
+            </a:fillRef>
+            <a:effectRef idx="2">
+              <a:schemeClr val="accent1"/>
+            </a:effectRef>
+            <a:fontRef idx="minor">
+              <a:schemeClr val="lt1"/>
+            </a:fontRef>
+          </p:style>
+        </p:sp>
+        <p:sp>
+          <p:nvSpPr>
+            <p:cNvPr id="16" name="Rectangle 29">
+              <a:extLst>
+                <a:ext uri="{FF2B5EF4-FFF2-40B4-BE49-F238E27FC236}">
+                  <a16:creationId xmlns:a16="http://schemas.microsoft.com/office/drawing/2014/main" id="{EBD42D5B-8F87-45B3-98B3-C66944F92E65}"/>
+                </a:ext>
+                <a:ext uri="{C183D7F6-B498-43B3-948B-1728B52AA6E4}">
+                  <adec:decorative xmlns:adec="http://schemas.microsoft.com/office/drawing/2017/decorative" val="1"/>
+                </a:ext>
+              </a:extLst>
+            </p:cNvPr>
+            <p:cNvSpPr/>
+            <p:nvPr>
+              <p:extLst>
+                <p:ext uri="{386F3935-93C4-4BCD-93E2-E3B085C9AB24}">
+                  <p16:designElem xmlns:p16="http://schemas.microsoft.com/office/powerpoint/2015/main" val="1"/>
+                </p:ext>
+              </p:extLst>
+            </p:nvPr>
+          </p:nvSpPr>
+          <p:spPr>
+            <a:xfrm>
+              <a:off x="10938999" y="-8467"/>
+              <a:ext cx="1249825" cy="6866467"/>
+            </a:xfrm>
+            <a:custGeom>
+              <a:avLst/>
+              <a:gdLst/>
+              <a:ahLst/>
+              <a:cxnLst/>
+              <a:rect l="l" t="t" r="r" b="b"/>
+              <a:pathLst>
+                <a:path w="1249825" h="6858000">
+                  <a:moveTo>
+                    <a:pt x="0" y="0"/>
+                  </a:moveTo>
+                  <a:lnTo>
+                    <a:pt x="1249825" y="0"/>
+                  </a:lnTo>
+                  <a:lnTo>
+                    <a:pt x="1249825" y="6858000"/>
+                  </a:lnTo>
+                  <a:lnTo>
+                    <a:pt x="1109382" y="6858000"/>
+                  </a:lnTo>
+                  <a:lnTo>
+                    <a:pt x="0" y="0"/>
+                  </a:lnTo>
+                  <a:close/>
+                </a:path>
+              </a:pathLst>
+            </a:custGeom>
+            <a:solidFill>
+              <a:schemeClr val="accent1">
+                <a:alpha val="65000"/>
+              </a:schemeClr>
+            </a:solidFill>
+            <a:ln>
+              <a:noFill/>
+            </a:ln>
+            <a:effectLst/>
+          </p:spPr>
+          <p:style>
+            <a:lnRef idx="1">
+              <a:schemeClr val="accent1"/>
+            </a:lnRef>
+            <a:fillRef idx="3">
+              <a:schemeClr val="accent1"/>
+            </a:fillRef>
+            <a:effectRef idx="2">
+              <a:schemeClr val="accent1"/>
+            </a:effectRef>
+            <a:fontRef idx="minor">
+              <a:schemeClr val="lt1"/>
+            </a:fontRef>
+          </p:style>
+        </p:sp>
+        <p:sp>
+          <p:nvSpPr>
+            <p:cNvPr id="17" name="Isosceles Triangle 16">
+              <a:extLst>
+                <a:ext uri="{FF2B5EF4-FFF2-40B4-BE49-F238E27FC236}">
+                  <a16:creationId xmlns:a16="http://schemas.microsoft.com/office/drawing/2014/main" id="{F5E04699-59E1-4468-9E7C-83070EEB4204}"/>
+                </a:ext>
+                <a:ext uri="{C183D7F6-B498-43B3-948B-1728B52AA6E4}">
+                  <adec:decorative xmlns:adec="http://schemas.microsoft.com/office/drawing/2017/decorative" val="1"/>
+                </a:ext>
+              </a:extLst>
+            </p:cNvPr>
+            <p:cNvSpPr/>
+            <p:nvPr>
+              <p:extLst>
+                <p:ext uri="{386F3935-93C4-4BCD-93E2-E3B085C9AB24}">
+                  <p16:designElem xmlns:p16="http://schemas.microsoft.com/office/powerpoint/2015/main" val="1"/>
+                </p:ext>
+              </p:extLst>
+            </p:nvPr>
+          </p:nvSpPr>
+          <p:spPr>
+            <a:xfrm>
+              <a:off x="10371666" y="3589867"/>
+              <a:ext cx="1817159" cy="3268133"/>
+            </a:xfrm>
+            <a:prstGeom prst="triangle">
+              <a:avLst>
+                <a:gd name="adj" fmla="val 100000"/>
+              </a:avLst>
+            </a:prstGeom>
+            <a:solidFill>
+              <a:schemeClr val="accent1">
+                <a:alpha val="80000"/>
+              </a:schemeClr>
+            </a:solidFill>
+            <a:ln>
+              <a:noFill/>
+            </a:ln>
+            <a:effectLst/>
+          </p:spPr>
+          <p:style>
+            <a:lnRef idx="1">
+              <a:schemeClr val="accent1"/>
+            </a:lnRef>
+            <a:fillRef idx="3">
+              <a:schemeClr val="accent1"/>
+            </a:fillRef>
+            <a:effectRef idx="2">
+              <a:schemeClr val="accent1"/>
+            </a:effectRef>
+            <a:fontRef idx="minor">
+              <a:schemeClr val="lt1"/>
+            </a:fontRef>
+          </p:style>
+        </p:sp>
+        <p:sp>
+          <p:nvSpPr>
+            <p:cNvPr id="18" name="Isosceles Triangle 17">
+              <a:extLst>
+                <a:ext uri="{FF2B5EF4-FFF2-40B4-BE49-F238E27FC236}">
+                  <a16:creationId xmlns:a16="http://schemas.microsoft.com/office/drawing/2014/main" id="{F2AE8F13-9A52-4D7F-9637-321EA7CF3212}"/>
+                </a:ext>
+                <a:ext uri="{C183D7F6-B498-43B3-948B-1728B52AA6E4}">
+                  <adec:decorative xmlns:adec="http://schemas.microsoft.com/office/drawing/2017/decorative" val="1"/>
+                </a:ext>
+              </a:extLst>
+            </p:cNvPr>
+            <p:cNvSpPr/>
+            <p:nvPr>
+              <p:extLst>
+                <p:ext uri="{386F3935-93C4-4BCD-93E2-E3B085C9AB24}">
+                  <p16:designElem xmlns:p16="http://schemas.microsoft.com/office/powerpoint/2015/main" val="1"/>
+                </p:ext>
+              </p:extLst>
+            </p:nvPr>
+          </p:nvSpPr>
+          <p:spPr>
+            <a:xfrm rot="10800000">
+              <a:off x="0" y="0"/>
+              <a:ext cx="842596" cy="5666154"/>
+            </a:xfrm>
+            <a:prstGeom prst="triangle">
+              <a:avLst>
+                <a:gd name="adj" fmla="val 100000"/>
+              </a:avLst>
+            </a:prstGeom>
+            <a:solidFill>
+              <a:schemeClr val="accent1">
+                <a:alpha val="85000"/>
+              </a:schemeClr>
+            </a:solidFill>
+            <a:ln>
+              <a:noFill/>
+            </a:ln>
+            <a:effectLst/>
+          </p:spPr>
+          <p:style>
+            <a:lnRef idx="1">
+              <a:schemeClr val="accent1"/>
+            </a:lnRef>
+            <a:fillRef idx="3">
+              <a:schemeClr val="accent1"/>
+            </a:fillRef>
+            <a:effectRef idx="2">
+              <a:schemeClr val="accent1"/>
+            </a:effectRef>
+            <a:fontRef idx="minor">
+              <a:schemeClr val="lt1"/>
+            </a:fontRef>
+          </p:style>
+        </p:sp>
+      </p:grpSp>
+    </p:spTree>
+    <p:extLst>
+      <p:ext uri="{BB962C8B-B14F-4D97-AF65-F5344CB8AC3E}">
+        <p14:creationId xmlns:p14="http://schemas.microsoft.com/office/powerpoint/2010/main" val="923352979"/>
+      </p:ext>
+    </p:extLst>
+  </p:cSld>
+  <p:clrMapOvr>
+    <a:overrideClrMapping bg1="dk1" tx1="lt1" bg2="dk2" tx2="lt2" accent1="accent1" accent2="accent2" accent3="accent3" accent4="accent4" accent5="accent5" accent6="accent6" hlink="hlink" folHlink="folHlink"/>
+  </p:clrMapOvr>
+  <mc:AlternateContent xmlns:mc="http://schemas.openxmlformats.org/markup-compatibility/2006">
+    <mc:Choice xmlns:p14="http://schemas.microsoft.com/office/powerpoint/2010/main" Requires="p14">
+      <p:transition spd="med" p14:dur="700">
+        <p:fade/>
+      </p:transition>
+    </mc:Choice>
+    <mc:Fallback>
+      <p:transition spd="med">
+        <p:fade/>
+      </p:transition>
+    </mc:Fallback>
+  </mc:AlternateContent>
+</p:sld>
+</file>
+
 <file path=ppt/slides/slide2.xml><?xml version="1.0" encoding="utf-8"?>
 <p:sld xmlns:a="http://schemas.openxmlformats.org/drawingml/2006/main" xmlns:r="http://schemas.openxmlformats.org/officeDocument/2006/relationships" xmlns:p="http://schemas.openxmlformats.org/presentationml/2006/main">
   <p:cSld>
@@ -22907,7 +26944,7 @@
               <a:buChar char=""/>
             </a:pPr>
             <a:r>
-              <a:rPr lang="en-US" sz="2600" dirty="0">
+              <a:rPr lang="en-US" sz="2600" u="sng" dirty="0">
                 <a:solidFill>
                   <a:schemeClr val="tx1">
                     <a:lumMod val="75000"/>
@@ -25476,7 +29513,7 @@
     <p:bg>
       <p:bgPr>
         <a:solidFill>
-          <a:schemeClr val="bg2"/>
+          <a:schemeClr val="bg1"/>
         </a:solidFill>
         <a:effectLst/>
       </p:bgPr>
@@ -25497,10 +29534,10 @@
       </p:grpSpPr>
       <p:sp useBgFill="1">
         <p:nvSpPr>
-          <p:cNvPr id="7" name="Rectangle 6">
+          <p:cNvPr id="39" name="Rectangle 23">
             <a:extLst>
               <a:ext uri="{FF2B5EF4-FFF2-40B4-BE49-F238E27FC236}">
-                <a16:creationId xmlns:a16="http://schemas.microsoft.com/office/drawing/2014/main" id="{27577DEC-D9A5-404D-9789-702F4319BEC8}"/>
+                <a16:creationId xmlns:a16="http://schemas.microsoft.com/office/drawing/2014/main" id="{9F4444CE-BC8D-4D61-B303-4C05614E62AB}"/>
               </a:ext>
               <a:ext uri="{C183D7F6-B498-43B3-948B-1728B52AA6E4}">
                 <adec:decorative xmlns:adec="http://schemas.microsoft.com/office/drawing/2017/decorative" val="1"/>
@@ -25557,68 +29594,54 @@
       </p:sp>
       <p:sp>
         <p:nvSpPr>
-          <p:cNvPr id="2" name="TextBox 1">
+          <p:cNvPr id="2" name="Title 1">
             <a:extLst>
               <a:ext uri="{FF2B5EF4-FFF2-40B4-BE49-F238E27FC236}">
-                <a16:creationId xmlns:a16="http://schemas.microsoft.com/office/drawing/2014/main" id="{BAEB8452-4678-45D0-96FA-0CD78ED1D72C}"/>
+                <a16:creationId xmlns:a16="http://schemas.microsoft.com/office/drawing/2014/main" id="{60076C26-0D05-4BFE-B2F7-C1A369DFBA33}"/>
               </a:ext>
             </a:extLst>
           </p:cNvPr>
-          <p:cNvSpPr txBox="1"/>
-          <p:nvPr/>
+          <p:cNvSpPr>
+            <a:spLocks noGrp="1"/>
+          </p:cNvSpPr>
+          <p:nvPr>
+            <p:ph type="title"/>
+          </p:nvPr>
         </p:nvSpPr>
         <p:spPr>
           <a:xfrm>
-            <a:off x="857187" y="2652714"/>
-            <a:ext cx="8093201" cy="1024466"/>
+            <a:off x="1286933" y="609600"/>
+            <a:ext cx="10197494" cy="1099457"/>
           </a:xfrm>
-          <a:prstGeom prst="rect">
-            <a:avLst/>
-          </a:prstGeom>
         </p:spPr>
         <p:txBody>
-          <a:bodyPr vert="horz" lIns="91440" tIns="45720" rIns="91440" bIns="45720" rtlCol="0" anchor="b">
+          <a:bodyPr vert="horz" lIns="91440" tIns="45720" rIns="91440" bIns="45720" rtlCol="0" anchor="t">
             <a:normAutofit/>
           </a:bodyPr>
           <a:lstStyle/>
           <a:p>
-            <a:pPr algn="r">
-              <a:spcBef>
-                <a:spcPct val="0"/>
-              </a:spcBef>
-              <a:spcAft>
-                <a:spcPts val="600"/>
-              </a:spcAft>
-            </a:pPr>
             <a:r>
-              <a:rPr lang="en-US" sz="5400" b="1" dirty="0">
-                <a:solidFill>
-                  <a:schemeClr val="accent1"/>
-                </a:solidFill>
-                <a:latin typeface="+mj-lt"/>
-                <a:ea typeface="+mj-ea"/>
-                <a:cs typeface="+mj-cs"/>
-              </a:rPr>
-              <a:t> Thank you for listening!</a:t>
+              <a:rPr lang="en-US"/>
+              <a:t>What impact do we make?</a:t>
             </a:r>
           </a:p>
         </p:txBody>
       </p:sp>
-      <p:grpSp>
-        <p:nvGrpSpPr>
-          <p:cNvPr id="9" name="Group 8">
+      <p:sp>
+        <p:nvSpPr>
+          <p:cNvPr id="40" name="Isosceles Triangle 25">
             <a:extLst>
               <a:ext uri="{FF2B5EF4-FFF2-40B4-BE49-F238E27FC236}">
-                <a16:creationId xmlns:a16="http://schemas.microsoft.com/office/drawing/2014/main" id="{CEEA9366-CEA8-4F23-B065-4337F0D836FE}"/>
+                <a16:creationId xmlns:a16="http://schemas.microsoft.com/office/drawing/2014/main" id="{73772B81-181F-48B7-8826-4D9686D15DF5}"/>
               </a:ext>
               <a:ext uri="{C183D7F6-B498-43B3-948B-1728B52AA6E4}">
                 <adec:decorative xmlns:adec="http://schemas.microsoft.com/office/drawing/2017/decorative" val="1"/>
               </a:ext>
             </a:extLst>
           </p:cNvPr>
-          <p:cNvGrpSpPr>
-            <a:grpSpLocks noGrp="1" noUngrp="1" noRot="1" noChangeAspect="1" noMove="1" noResize="1"/>
-          </p:cNvGrpSpPr>
+          <p:cNvSpPr>
+            <a:spLocks noGrp="1" noRot="1" noChangeAspect="1" noMove="1" noResize="1" noEditPoints="1" noAdjustHandles="1" noChangeArrowheads="1" noChangeShapeType="1" noTextEdit="1"/>
+          </p:cNvSpPr>
           <p:nvPr>
             <p:extLst>
               <p:ext uri="{386F3935-93C4-4BCD-93E2-E3B085C9AB24}">
@@ -25626,608 +29649,137 @@
               </p:ext>
             </p:extLst>
           </p:nvPr>
-        </p:nvGrpSpPr>
-        <p:grpSpPr>
-          <a:xfrm>
-            <a:off x="0" y="-8467"/>
-            <a:ext cx="12192000" cy="6866467"/>
-            <a:chOff x="0" y="-8467"/>
-            <a:chExt cx="12192000" cy="6866467"/>
+        </p:nvSpPr>
+        <p:spPr>
+          <a:xfrm rot="10800000">
+            <a:off x="0" y="0"/>
+            <a:ext cx="842596" cy="5666154"/>
           </a:xfrm>
-        </p:grpSpPr>
-        <p:cxnSp>
-          <p:nvCxnSpPr>
-            <p:cNvPr id="10" name="Straight Connector 9">
-              <a:extLst>
-                <a:ext uri="{FF2B5EF4-FFF2-40B4-BE49-F238E27FC236}">
-                  <a16:creationId xmlns:a16="http://schemas.microsoft.com/office/drawing/2014/main" id="{904A03D6-39B4-4278-9BE1-A07E024499BE}"/>
-                </a:ext>
-                <a:ext uri="{C183D7F6-B498-43B3-948B-1728B52AA6E4}">
-                  <adec:decorative xmlns:adec="http://schemas.microsoft.com/office/drawing/2017/decorative" val="1"/>
-                </a:ext>
-              </a:extLst>
-            </p:cNvPr>
-            <p:cNvCxnSpPr/>
-            <p:nvPr>
-              <p:extLst>
-                <p:ext uri="{386F3935-93C4-4BCD-93E2-E3B085C9AB24}">
-                  <p16:designElem xmlns:p16="http://schemas.microsoft.com/office/powerpoint/2015/main" val="1"/>
-                </p:ext>
-              </p:extLst>
-            </p:nvPr>
-          </p:nvCxnSpPr>
-          <p:spPr>
-            <a:xfrm>
-              <a:off x="9371012" y="0"/>
-              <a:ext cx="1219200" cy="6858000"/>
-            </a:xfrm>
-            <a:prstGeom prst="line">
-              <a:avLst/>
-            </a:prstGeom>
-            <a:ln w="9525">
-              <a:solidFill>
-                <a:srgbClr val="FFFFFF"/>
-              </a:solidFill>
-            </a:ln>
-          </p:spPr>
-          <p:style>
-            <a:lnRef idx="2">
-              <a:schemeClr val="accent1"/>
-            </a:lnRef>
-            <a:fillRef idx="0">
-              <a:schemeClr val="accent1"/>
-            </a:fillRef>
-            <a:effectRef idx="1">
-              <a:schemeClr val="accent1"/>
-            </a:effectRef>
-            <a:fontRef idx="minor">
-              <a:schemeClr val="tx1"/>
-            </a:fontRef>
-          </p:style>
-        </p:cxnSp>
-        <p:cxnSp>
-          <p:nvCxnSpPr>
-            <p:cNvPr id="11" name="Straight Connector 10">
-              <a:extLst>
-                <a:ext uri="{FF2B5EF4-FFF2-40B4-BE49-F238E27FC236}">
-                  <a16:creationId xmlns:a16="http://schemas.microsoft.com/office/drawing/2014/main" id="{FBE459AF-3736-4886-82E0-9B5DA427B5E0}"/>
-                </a:ext>
-                <a:ext uri="{C183D7F6-B498-43B3-948B-1728B52AA6E4}">
-                  <adec:decorative xmlns:adec="http://schemas.microsoft.com/office/drawing/2017/decorative" val="1"/>
-                </a:ext>
-              </a:extLst>
-            </p:cNvPr>
-            <p:cNvCxnSpPr/>
-            <p:nvPr>
-              <p:extLst>
-                <p:ext uri="{386F3935-93C4-4BCD-93E2-E3B085C9AB24}">
-                  <p16:designElem xmlns:p16="http://schemas.microsoft.com/office/powerpoint/2015/main" val="1"/>
-                </p:ext>
-              </p:extLst>
-            </p:nvPr>
-          </p:nvCxnSpPr>
-          <p:spPr>
-            <a:xfrm flipH="1">
-              <a:off x="7425267" y="3681413"/>
-              <a:ext cx="4763558" cy="3176587"/>
-            </a:xfrm>
-            <a:prstGeom prst="line">
-              <a:avLst/>
-            </a:prstGeom>
-            <a:ln w="9525">
-              <a:solidFill>
-                <a:schemeClr val="bg1">
-                  <a:alpha val="80000"/>
-                </a:schemeClr>
-              </a:solidFill>
-            </a:ln>
-          </p:spPr>
-          <p:style>
-            <a:lnRef idx="2">
-              <a:schemeClr val="accent1"/>
-            </a:lnRef>
-            <a:fillRef idx="0">
-              <a:schemeClr val="accent1"/>
-            </a:fillRef>
-            <a:effectRef idx="1">
-              <a:schemeClr val="accent1"/>
-            </a:effectRef>
-            <a:fontRef idx="minor">
-              <a:schemeClr val="tx1"/>
-            </a:fontRef>
-          </p:style>
-        </p:cxnSp>
-        <p:sp>
-          <p:nvSpPr>
-            <p:cNvPr id="12" name="Rectangle 23">
-              <a:extLst>
-                <a:ext uri="{FF2B5EF4-FFF2-40B4-BE49-F238E27FC236}">
-                  <a16:creationId xmlns:a16="http://schemas.microsoft.com/office/drawing/2014/main" id="{4B6B88EF-180C-4E39-8A3F-A52E87110C66}"/>
-                </a:ext>
-                <a:ext uri="{C183D7F6-B498-43B3-948B-1728B52AA6E4}">
-                  <adec:decorative xmlns:adec="http://schemas.microsoft.com/office/drawing/2017/decorative" val="1"/>
-                </a:ext>
-              </a:extLst>
-            </p:cNvPr>
-            <p:cNvSpPr/>
-            <p:nvPr>
-              <p:extLst>
-                <p:ext uri="{386F3935-93C4-4BCD-93E2-E3B085C9AB24}">
-                  <p16:designElem xmlns:p16="http://schemas.microsoft.com/office/powerpoint/2015/main" val="1"/>
-                </p:ext>
-              </p:extLst>
-            </p:nvPr>
-          </p:nvSpPr>
-          <p:spPr>
-            <a:xfrm>
-              <a:off x="9181476" y="-8467"/>
-              <a:ext cx="3007349" cy="6866467"/>
-            </a:xfrm>
-            <a:custGeom>
-              <a:avLst/>
-              <a:gdLst/>
-              <a:ahLst/>
-              <a:cxnLst/>
-              <a:rect l="l" t="t" r="r" b="b"/>
-              <a:pathLst>
-                <a:path w="3007349" h="6866467">
-                  <a:moveTo>
-                    <a:pt x="2045532" y="0"/>
-                  </a:moveTo>
-                  <a:lnTo>
-                    <a:pt x="3007349" y="0"/>
-                  </a:lnTo>
-                  <a:lnTo>
-                    <a:pt x="3007349" y="6866467"/>
-                  </a:lnTo>
-                  <a:lnTo>
-                    <a:pt x="0" y="6866467"/>
-                  </a:lnTo>
-                  <a:lnTo>
-                    <a:pt x="2045532" y="0"/>
-                  </a:lnTo>
-                  <a:close/>
-                </a:path>
-              </a:pathLst>
-            </a:custGeom>
-            <a:solidFill>
-              <a:schemeClr val="accent1">
-                <a:alpha val="30000"/>
-              </a:schemeClr>
-            </a:solidFill>
-            <a:ln>
-              <a:noFill/>
-            </a:ln>
-            <a:effectLst/>
-          </p:spPr>
-          <p:style>
-            <a:lnRef idx="1">
-              <a:schemeClr val="accent1"/>
-            </a:lnRef>
-            <a:fillRef idx="3">
-              <a:schemeClr val="accent1"/>
-            </a:fillRef>
-            <a:effectRef idx="2">
-              <a:schemeClr val="accent1"/>
-            </a:effectRef>
-            <a:fontRef idx="minor">
-              <a:schemeClr val="lt1"/>
-            </a:fontRef>
-          </p:style>
-        </p:sp>
-        <p:sp>
-          <p:nvSpPr>
-            <p:cNvPr id="13" name="Rectangle 25">
-              <a:extLst>
-                <a:ext uri="{FF2B5EF4-FFF2-40B4-BE49-F238E27FC236}">
-                  <a16:creationId xmlns:a16="http://schemas.microsoft.com/office/drawing/2014/main" id="{52DFAACF-64D0-4621-8FF4-E2F03C3E8D15}"/>
-                </a:ext>
-                <a:ext uri="{C183D7F6-B498-43B3-948B-1728B52AA6E4}">
-                  <adec:decorative xmlns:adec="http://schemas.microsoft.com/office/drawing/2017/decorative" val="1"/>
-                </a:ext>
-              </a:extLst>
-            </p:cNvPr>
-            <p:cNvSpPr/>
-            <p:nvPr>
-              <p:extLst>
-                <p:ext uri="{386F3935-93C4-4BCD-93E2-E3B085C9AB24}">
-                  <p16:designElem xmlns:p16="http://schemas.microsoft.com/office/powerpoint/2015/main" val="1"/>
-                </p:ext>
-              </p:extLst>
-            </p:nvPr>
-          </p:nvSpPr>
-          <p:spPr>
-            <a:xfrm>
-              <a:off x="9603442" y="-8467"/>
-              <a:ext cx="2588558" cy="6866467"/>
-            </a:xfrm>
-            <a:custGeom>
-              <a:avLst/>
-              <a:gdLst/>
-              <a:ahLst/>
-              <a:cxnLst/>
-              <a:rect l="l" t="t" r="r" b="b"/>
-              <a:pathLst>
-                <a:path w="2573311" h="6866467">
-                  <a:moveTo>
-                    <a:pt x="0" y="0"/>
-                  </a:moveTo>
-                  <a:lnTo>
-                    <a:pt x="2573311" y="0"/>
-                  </a:lnTo>
-                  <a:lnTo>
-                    <a:pt x="2573311" y="6866467"/>
-                  </a:lnTo>
-                  <a:lnTo>
-                    <a:pt x="1202336" y="6866467"/>
-                  </a:lnTo>
-                  <a:lnTo>
-                    <a:pt x="0" y="0"/>
-                  </a:lnTo>
-                  <a:close/>
-                </a:path>
-              </a:pathLst>
-            </a:custGeom>
-            <a:solidFill>
-              <a:schemeClr val="accent1">
-                <a:alpha val="20000"/>
-              </a:schemeClr>
-            </a:solidFill>
-            <a:ln>
-              <a:noFill/>
-            </a:ln>
-            <a:effectLst/>
-          </p:spPr>
-          <p:style>
-            <a:lnRef idx="1">
-              <a:schemeClr val="accent1"/>
-            </a:lnRef>
-            <a:fillRef idx="3">
-              <a:schemeClr val="accent1"/>
-            </a:fillRef>
-            <a:effectRef idx="2">
-              <a:schemeClr val="accent1"/>
-            </a:effectRef>
-            <a:fontRef idx="minor">
-              <a:schemeClr val="lt1"/>
-            </a:fontRef>
-          </p:style>
-        </p:sp>
-        <p:sp>
-          <p:nvSpPr>
-            <p:cNvPr id="14" name="Isosceles Triangle 13">
-              <a:extLst>
-                <a:ext uri="{FF2B5EF4-FFF2-40B4-BE49-F238E27FC236}">
-                  <a16:creationId xmlns:a16="http://schemas.microsoft.com/office/drawing/2014/main" id="{36611FF0-65B3-49DB-97C6-1B72AAD0FB02}"/>
-                </a:ext>
-                <a:ext uri="{C183D7F6-B498-43B3-948B-1728B52AA6E4}">
-                  <adec:decorative xmlns:adec="http://schemas.microsoft.com/office/drawing/2017/decorative" val="1"/>
-                </a:ext>
-              </a:extLst>
-            </p:cNvPr>
-            <p:cNvSpPr/>
-            <p:nvPr>
-              <p:extLst>
-                <p:ext uri="{386F3935-93C4-4BCD-93E2-E3B085C9AB24}">
-                  <p16:designElem xmlns:p16="http://schemas.microsoft.com/office/powerpoint/2015/main" val="1"/>
-                </p:ext>
-              </p:extLst>
-            </p:nvPr>
-          </p:nvSpPr>
-          <p:spPr>
-            <a:xfrm>
-              <a:off x="8932333" y="3048000"/>
-              <a:ext cx="3259667" cy="3810000"/>
-            </a:xfrm>
-            <a:prstGeom prst="triangle">
-              <a:avLst>
-                <a:gd name="adj" fmla="val 100000"/>
-              </a:avLst>
-            </a:prstGeom>
-            <a:solidFill>
-              <a:schemeClr val="accent2">
-                <a:alpha val="72000"/>
-              </a:schemeClr>
-            </a:solidFill>
-            <a:ln>
-              <a:noFill/>
-            </a:ln>
-            <a:effectLst/>
-          </p:spPr>
-          <p:style>
-            <a:lnRef idx="1">
-              <a:schemeClr val="accent1"/>
-            </a:lnRef>
-            <a:fillRef idx="3">
-              <a:schemeClr val="accent1"/>
-            </a:fillRef>
-            <a:effectRef idx="2">
-              <a:schemeClr val="accent1"/>
-            </a:effectRef>
-            <a:fontRef idx="minor">
-              <a:schemeClr val="lt1"/>
-            </a:fontRef>
-          </p:style>
-        </p:sp>
-        <p:sp>
-          <p:nvSpPr>
-            <p:cNvPr id="15" name="Rectangle 27">
-              <a:extLst>
-                <a:ext uri="{FF2B5EF4-FFF2-40B4-BE49-F238E27FC236}">
-                  <a16:creationId xmlns:a16="http://schemas.microsoft.com/office/drawing/2014/main" id="{0F7407FE-86B1-4890-9D80-9406FBF29E46}"/>
-                </a:ext>
-                <a:ext uri="{C183D7F6-B498-43B3-948B-1728B52AA6E4}">
-                  <adec:decorative xmlns:adec="http://schemas.microsoft.com/office/drawing/2017/decorative" val="1"/>
-                </a:ext>
-              </a:extLst>
-            </p:cNvPr>
-            <p:cNvSpPr/>
-            <p:nvPr>
-              <p:extLst>
-                <p:ext uri="{386F3935-93C4-4BCD-93E2-E3B085C9AB24}">
-                  <p16:designElem xmlns:p16="http://schemas.microsoft.com/office/powerpoint/2015/main" val="1"/>
-                </p:ext>
-              </p:extLst>
-            </p:nvPr>
-          </p:nvSpPr>
-          <p:spPr>
-            <a:xfrm>
-              <a:off x="9334500" y="-8467"/>
-              <a:ext cx="2854326" cy="6866467"/>
-            </a:xfrm>
-            <a:custGeom>
-              <a:avLst/>
-              <a:gdLst/>
-              <a:ahLst/>
-              <a:cxnLst/>
-              <a:rect l="l" t="t" r="r" b="b"/>
-              <a:pathLst>
-                <a:path w="2858013" h="6866467">
-                  <a:moveTo>
-                    <a:pt x="0" y="0"/>
-                  </a:moveTo>
-                  <a:lnTo>
-                    <a:pt x="2858013" y="0"/>
-                  </a:lnTo>
-                  <a:lnTo>
-                    <a:pt x="2858013" y="6866467"/>
-                  </a:lnTo>
-                  <a:lnTo>
-                    <a:pt x="2473942" y="6866467"/>
-                  </a:lnTo>
-                  <a:lnTo>
-                    <a:pt x="0" y="0"/>
-                  </a:lnTo>
-                  <a:close/>
-                </a:path>
-              </a:pathLst>
-            </a:custGeom>
-            <a:solidFill>
-              <a:schemeClr val="accent2">
-                <a:lumMod val="75000"/>
-                <a:alpha val="70000"/>
-              </a:schemeClr>
-            </a:solidFill>
-            <a:ln>
-              <a:noFill/>
-            </a:ln>
-            <a:effectLst/>
-          </p:spPr>
-          <p:style>
-            <a:lnRef idx="1">
-              <a:schemeClr val="accent1"/>
-            </a:lnRef>
-            <a:fillRef idx="3">
-              <a:schemeClr val="accent1"/>
-            </a:fillRef>
-            <a:effectRef idx="2">
-              <a:schemeClr val="accent1"/>
-            </a:effectRef>
-            <a:fontRef idx="minor">
-              <a:schemeClr val="lt1"/>
-            </a:fontRef>
-          </p:style>
-        </p:sp>
-        <p:sp>
-          <p:nvSpPr>
-            <p:cNvPr id="16" name="Rectangle 29">
-              <a:extLst>
-                <a:ext uri="{FF2B5EF4-FFF2-40B4-BE49-F238E27FC236}">
-                  <a16:creationId xmlns:a16="http://schemas.microsoft.com/office/drawing/2014/main" id="{EBD42D5B-8F87-45B3-98B3-C66944F92E65}"/>
-                </a:ext>
-                <a:ext uri="{C183D7F6-B498-43B3-948B-1728B52AA6E4}">
-                  <adec:decorative xmlns:adec="http://schemas.microsoft.com/office/drawing/2017/decorative" val="1"/>
-                </a:ext>
-              </a:extLst>
-            </p:cNvPr>
-            <p:cNvSpPr/>
-            <p:nvPr>
-              <p:extLst>
-                <p:ext uri="{386F3935-93C4-4BCD-93E2-E3B085C9AB24}">
-                  <p16:designElem xmlns:p16="http://schemas.microsoft.com/office/powerpoint/2015/main" val="1"/>
-                </p:ext>
-              </p:extLst>
-            </p:nvPr>
-          </p:nvSpPr>
-          <p:spPr>
-            <a:xfrm>
-              <a:off x="10938999" y="-8467"/>
-              <a:ext cx="1249825" cy="6866467"/>
-            </a:xfrm>
-            <a:custGeom>
-              <a:avLst/>
-              <a:gdLst/>
-              <a:ahLst/>
-              <a:cxnLst/>
-              <a:rect l="l" t="t" r="r" b="b"/>
-              <a:pathLst>
-                <a:path w="1249825" h="6858000">
-                  <a:moveTo>
-                    <a:pt x="0" y="0"/>
-                  </a:moveTo>
-                  <a:lnTo>
-                    <a:pt x="1249825" y="0"/>
-                  </a:lnTo>
-                  <a:lnTo>
-                    <a:pt x="1249825" y="6858000"/>
-                  </a:lnTo>
-                  <a:lnTo>
-                    <a:pt x="1109382" y="6858000"/>
-                  </a:lnTo>
-                  <a:lnTo>
-                    <a:pt x="0" y="0"/>
-                  </a:lnTo>
-                  <a:close/>
-                </a:path>
-              </a:pathLst>
-            </a:custGeom>
-            <a:solidFill>
-              <a:schemeClr val="accent1">
-                <a:alpha val="65000"/>
-              </a:schemeClr>
-            </a:solidFill>
-            <a:ln>
-              <a:noFill/>
-            </a:ln>
-            <a:effectLst/>
-          </p:spPr>
-          <p:style>
-            <a:lnRef idx="1">
-              <a:schemeClr val="accent1"/>
-            </a:lnRef>
-            <a:fillRef idx="3">
-              <a:schemeClr val="accent1"/>
-            </a:fillRef>
-            <a:effectRef idx="2">
-              <a:schemeClr val="accent1"/>
-            </a:effectRef>
-            <a:fontRef idx="minor">
-              <a:schemeClr val="lt1"/>
-            </a:fontRef>
-          </p:style>
-        </p:sp>
-        <p:sp>
-          <p:nvSpPr>
-            <p:cNvPr id="17" name="Isosceles Triangle 16">
-              <a:extLst>
-                <a:ext uri="{FF2B5EF4-FFF2-40B4-BE49-F238E27FC236}">
-                  <a16:creationId xmlns:a16="http://schemas.microsoft.com/office/drawing/2014/main" id="{F5E04699-59E1-4468-9E7C-83070EEB4204}"/>
-                </a:ext>
-                <a:ext uri="{C183D7F6-B498-43B3-948B-1728B52AA6E4}">
-                  <adec:decorative xmlns:adec="http://schemas.microsoft.com/office/drawing/2017/decorative" val="1"/>
-                </a:ext>
-              </a:extLst>
-            </p:cNvPr>
-            <p:cNvSpPr/>
-            <p:nvPr>
-              <p:extLst>
-                <p:ext uri="{386F3935-93C4-4BCD-93E2-E3B085C9AB24}">
-                  <p16:designElem xmlns:p16="http://schemas.microsoft.com/office/powerpoint/2015/main" val="1"/>
-                </p:ext>
-              </p:extLst>
-            </p:nvPr>
-          </p:nvSpPr>
-          <p:spPr>
-            <a:xfrm>
-              <a:off x="10371666" y="3589867"/>
-              <a:ext cx="1817159" cy="3268133"/>
-            </a:xfrm>
-            <a:prstGeom prst="triangle">
-              <a:avLst>
-                <a:gd name="adj" fmla="val 100000"/>
-              </a:avLst>
-            </a:prstGeom>
-            <a:solidFill>
-              <a:schemeClr val="accent1">
-                <a:alpha val="80000"/>
-              </a:schemeClr>
-            </a:solidFill>
-            <a:ln>
-              <a:noFill/>
-            </a:ln>
-            <a:effectLst/>
-          </p:spPr>
-          <p:style>
-            <a:lnRef idx="1">
-              <a:schemeClr val="accent1"/>
-            </a:lnRef>
-            <a:fillRef idx="3">
-              <a:schemeClr val="accent1"/>
-            </a:fillRef>
-            <a:effectRef idx="2">
-              <a:schemeClr val="accent1"/>
-            </a:effectRef>
-            <a:fontRef idx="minor">
-              <a:schemeClr val="lt1"/>
-            </a:fontRef>
-          </p:style>
-        </p:sp>
-        <p:sp>
-          <p:nvSpPr>
-            <p:cNvPr id="18" name="Isosceles Triangle 17">
-              <a:extLst>
-                <a:ext uri="{FF2B5EF4-FFF2-40B4-BE49-F238E27FC236}">
-                  <a16:creationId xmlns:a16="http://schemas.microsoft.com/office/drawing/2014/main" id="{F2AE8F13-9A52-4D7F-9637-321EA7CF3212}"/>
-                </a:ext>
-                <a:ext uri="{C183D7F6-B498-43B3-948B-1728B52AA6E4}">
-                  <adec:decorative xmlns:adec="http://schemas.microsoft.com/office/drawing/2017/decorative" val="1"/>
-                </a:ext>
-              </a:extLst>
-            </p:cNvPr>
-            <p:cNvSpPr/>
-            <p:nvPr>
-              <p:extLst>
-                <p:ext uri="{386F3935-93C4-4BCD-93E2-E3B085C9AB24}">
-                  <p16:designElem xmlns:p16="http://schemas.microsoft.com/office/powerpoint/2015/main" val="1"/>
-                </p:ext>
-              </p:extLst>
-            </p:nvPr>
-          </p:nvSpPr>
-          <p:spPr>
-            <a:xfrm rot="10800000">
-              <a:off x="0" y="0"/>
-              <a:ext cx="842596" cy="5666154"/>
-            </a:xfrm>
-            <a:prstGeom prst="triangle">
-              <a:avLst>
-                <a:gd name="adj" fmla="val 100000"/>
-              </a:avLst>
-            </a:prstGeom>
-            <a:solidFill>
-              <a:schemeClr val="accent1">
-                <a:alpha val="85000"/>
-              </a:schemeClr>
-            </a:solidFill>
-            <a:ln>
-              <a:noFill/>
-            </a:ln>
-            <a:effectLst/>
-          </p:spPr>
-          <p:style>
-            <a:lnRef idx="1">
-              <a:schemeClr val="accent1"/>
-            </a:lnRef>
-            <a:fillRef idx="3">
-              <a:schemeClr val="accent1"/>
-            </a:fillRef>
-            <a:effectRef idx="2">
-              <a:schemeClr val="accent1"/>
-            </a:effectRef>
-            <a:fontRef idx="minor">
-              <a:schemeClr val="lt1"/>
-            </a:fontRef>
-          </p:style>
-        </p:sp>
-      </p:grpSp>
+          <a:prstGeom prst="triangle">
+            <a:avLst>
+              <a:gd name="adj" fmla="val 100000"/>
+            </a:avLst>
+          </a:prstGeom>
+          <a:solidFill>
+            <a:schemeClr val="accent1">
+              <a:alpha val="85000"/>
+            </a:schemeClr>
+          </a:solidFill>
+          <a:ln>
+            <a:noFill/>
+          </a:ln>
+          <a:effectLst/>
+        </p:spPr>
+        <p:style>
+          <a:lnRef idx="1">
+            <a:schemeClr val="accent1"/>
+          </a:lnRef>
+          <a:fillRef idx="3">
+            <a:schemeClr val="accent1"/>
+          </a:fillRef>
+          <a:effectRef idx="2">
+            <a:schemeClr val="accent1"/>
+          </a:effectRef>
+          <a:fontRef idx="minor">
+            <a:schemeClr val="lt1"/>
+          </a:fontRef>
+        </p:style>
+      </p:sp>
+      <p:sp>
+        <p:nvSpPr>
+          <p:cNvPr id="28" name="Isosceles Triangle 27">
+            <a:extLst>
+              <a:ext uri="{FF2B5EF4-FFF2-40B4-BE49-F238E27FC236}">
+                <a16:creationId xmlns:a16="http://schemas.microsoft.com/office/drawing/2014/main" id="{B2205F6E-03C6-4E92-877C-E2482F6599AA}"/>
+              </a:ext>
+              <a:ext uri="{C183D7F6-B498-43B3-948B-1728B52AA6E4}">
+                <adec:decorative xmlns:adec="http://schemas.microsoft.com/office/drawing/2017/decorative" val="1"/>
+              </a:ext>
+            </a:extLst>
+          </p:cNvPr>
+          <p:cNvSpPr>
+            <a:spLocks noGrp="1" noRot="1" noChangeAspect="1" noMove="1" noResize="1" noEditPoints="1" noAdjustHandles="1" noChangeArrowheads="1" noChangeShapeType="1" noTextEdit="1"/>
+          </p:cNvSpPr>
+          <p:nvPr>
+            <p:extLst>
+              <p:ext uri="{386F3935-93C4-4BCD-93E2-E3B085C9AB24}">
+                <p16:designElem xmlns:p16="http://schemas.microsoft.com/office/powerpoint/2015/main" val="1"/>
+              </p:ext>
+            </p:extLst>
+          </p:nvPr>
+        </p:nvSpPr>
+        <p:spPr>
+          <a:xfrm flipH="1">
+            <a:off x="11743267" y="4013200"/>
+            <a:ext cx="448733" cy="2844800"/>
+          </a:xfrm>
+          <a:prstGeom prst="triangle">
+            <a:avLst>
+              <a:gd name="adj" fmla="val 0"/>
+            </a:avLst>
+          </a:prstGeom>
+          <a:solidFill>
+            <a:schemeClr val="accent1">
+              <a:alpha val="85000"/>
+            </a:schemeClr>
+          </a:solidFill>
+          <a:ln>
+            <a:noFill/>
+          </a:ln>
+          <a:effectLst/>
+        </p:spPr>
+        <p:style>
+          <a:lnRef idx="1">
+            <a:schemeClr val="accent1"/>
+          </a:lnRef>
+          <a:fillRef idx="3">
+            <a:schemeClr val="accent1"/>
+          </a:fillRef>
+          <a:effectRef idx="2">
+            <a:schemeClr val="accent1"/>
+          </a:effectRef>
+          <a:fontRef idx="minor">
+            <a:schemeClr val="lt1"/>
+          </a:fontRef>
+        </p:style>
+      </p:sp>
+      <p:graphicFrame>
+        <p:nvGraphicFramePr>
+          <p:cNvPr id="41" name="TextBox 16">
+            <a:extLst>
+              <a:ext uri="{FF2B5EF4-FFF2-40B4-BE49-F238E27FC236}">
+                <a16:creationId xmlns:a16="http://schemas.microsoft.com/office/drawing/2014/main" id="{A8543F87-297C-435E-AD5A-3D1D4312FC73}"/>
+              </a:ext>
+            </a:extLst>
+          </p:cNvPr>
+          <p:cNvGraphicFramePr/>
+          <p:nvPr>
+            <p:extLst>
+              <p:ext uri="{D42A27DB-BD31-4B8C-83A1-F6EECF244321}">
+                <p14:modId xmlns:p14="http://schemas.microsoft.com/office/powerpoint/2010/main" val="2491804500"/>
+              </p:ext>
+            </p:extLst>
+          </p:nvPr>
+        </p:nvGraphicFramePr>
+        <p:xfrm>
+          <a:off x="579360" y="1616764"/>
+          <a:ext cx="11274709" cy="4923183"/>
+        </p:xfrm>
+        <a:graphic>
+          <a:graphicData uri="http://schemas.openxmlformats.org/drawingml/2006/diagram">
+            <dgm:relIds xmlns:dgm="http://schemas.openxmlformats.org/drawingml/2006/diagram" xmlns:r="http://schemas.openxmlformats.org/officeDocument/2006/relationships" r:dm="rId2" r:lo="rId3" r:qs="rId4" r:cs="rId5"/>
+          </a:graphicData>
+        </a:graphic>
+      </p:graphicFrame>
     </p:spTree>
     <p:extLst>
       <p:ext uri="{BB962C8B-B14F-4D97-AF65-F5344CB8AC3E}">
-        <p14:creationId xmlns:p14="http://schemas.microsoft.com/office/powerpoint/2010/main" val="923352979"/>
+        <p14:creationId xmlns:p14="http://schemas.microsoft.com/office/powerpoint/2010/main" val="1398940576"/>
       </p:ext>
     </p:extLst>
   </p:cSld>
   <p:clrMapOvr>
-    <a:overrideClrMapping bg1="dk1" tx1="lt1" bg2="dk2" tx2="lt2" accent1="accent1" accent2="accent2" accent3="accent3" accent4="accent4" accent5="accent5" accent6="accent6" hlink="hlink" folHlink="folHlink"/>
+    <a:masterClrMapping/>
   </p:clrMapOvr>
   <mc:AlternateContent xmlns:mc="http://schemas.openxmlformats.org/markup-compatibility/2006">
     <mc:Choice xmlns:p14="http://schemas.microsoft.com/office/powerpoint/2010/main" Requires="p14">

</xml_diff>